<commit_message>
update of function for fracture energy calculation and of pictures
Correction of unit (J --> J/m²)
</commit_message>
<xml_diff>
--- a/mechanicalContact/spallationIndentationScratch/_pictures/Sketches_chippedSegmentGeometry.pptx
+++ b/mechanicalContact/spallationIndentationScratch/_pictures/Sketches_chippedSegmentGeometry.pptx
@@ -5,11 +5,13 @@
     <p:sldMasterId id="2147483648" r:id="rId1"/>
   </p:sldMasterIdLst>
   <p:notesMasterIdLst>
-    <p:notesMasterId r:id="rId4"/>
+    <p:notesMasterId r:id="rId6"/>
   </p:notesMasterIdLst>
   <p:sldIdLst>
     <p:sldId id="257" r:id="rId2"/>
     <p:sldId id="256" r:id="rId3"/>
+    <p:sldId id="258" r:id="rId4"/>
+    <p:sldId id="259" r:id="rId5"/>
   </p:sldIdLst>
   <p:sldSz cx="9144000" cy="6858000" type="screen4x3"/>
   <p:notesSz cx="6858000" cy="9144000"/>
@@ -193,7 +195,7 @@
           <a:p>
             <a:fld id="{CC6931EE-6622-4FE6-960C-740A787E8629}" type="datetimeFigureOut">
               <a:rPr lang="en-IE" smtClean="0"/>
-              <a:t>05/10/2016</a:t>
+              <a:t>14/04/2017</a:t>
             </a:fld>
             <a:endParaRPr lang="en-IE"/>
           </a:p>
@@ -642,7 +644,7 @@
           <a:p>
             <a:fld id="{FC950D17-7299-4B36-8CE5-03DC686728C8}" type="datetimeFigureOut">
               <a:rPr lang="en-IE" smtClean="0"/>
-              <a:t>05/10/2016</a:t>
+              <a:t>14/04/2017</a:t>
             </a:fld>
             <a:endParaRPr lang="en-IE"/>
           </a:p>
@@ -812,7 +814,7 @@
           <a:p>
             <a:fld id="{FC950D17-7299-4B36-8CE5-03DC686728C8}" type="datetimeFigureOut">
               <a:rPr lang="en-IE" smtClean="0"/>
-              <a:t>05/10/2016</a:t>
+              <a:t>14/04/2017</a:t>
             </a:fld>
             <a:endParaRPr lang="en-IE"/>
           </a:p>
@@ -992,7 +994,7 @@
           <a:p>
             <a:fld id="{FC950D17-7299-4B36-8CE5-03DC686728C8}" type="datetimeFigureOut">
               <a:rPr lang="en-IE" smtClean="0"/>
-              <a:t>05/10/2016</a:t>
+              <a:t>14/04/2017</a:t>
             </a:fld>
             <a:endParaRPr lang="en-IE"/>
           </a:p>
@@ -1162,7 +1164,7 @@
           <a:p>
             <a:fld id="{FC950D17-7299-4B36-8CE5-03DC686728C8}" type="datetimeFigureOut">
               <a:rPr lang="en-IE" smtClean="0"/>
-              <a:t>05/10/2016</a:t>
+              <a:t>14/04/2017</a:t>
             </a:fld>
             <a:endParaRPr lang="en-IE"/>
           </a:p>
@@ -1408,7 +1410,7 @@
           <a:p>
             <a:fld id="{FC950D17-7299-4B36-8CE5-03DC686728C8}" type="datetimeFigureOut">
               <a:rPr lang="en-IE" smtClean="0"/>
-              <a:t>05/10/2016</a:t>
+              <a:t>14/04/2017</a:t>
             </a:fld>
             <a:endParaRPr lang="en-IE"/>
           </a:p>
@@ -1696,7 +1698,7 @@
           <a:p>
             <a:fld id="{FC950D17-7299-4B36-8CE5-03DC686728C8}" type="datetimeFigureOut">
               <a:rPr lang="en-IE" smtClean="0"/>
-              <a:t>05/10/2016</a:t>
+              <a:t>14/04/2017</a:t>
             </a:fld>
             <a:endParaRPr lang="en-IE"/>
           </a:p>
@@ -2118,7 +2120,7 @@
           <a:p>
             <a:fld id="{FC950D17-7299-4B36-8CE5-03DC686728C8}" type="datetimeFigureOut">
               <a:rPr lang="en-IE" smtClean="0"/>
-              <a:t>05/10/2016</a:t>
+              <a:t>14/04/2017</a:t>
             </a:fld>
             <a:endParaRPr lang="en-IE"/>
           </a:p>
@@ -2236,7 +2238,7 @@
           <a:p>
             <a:fld id="{FC950D17-7299-4B36-8CE5-03DC686728C8}" type="datetimeFigureOut">
               <a:rPr lang="en-IE" smtClean="0"/>
-              <a:t>05/10/2016</a:t>
+              <a:t>14/04/2017</a:t>
             </a:fld>
             <a:endParaRPr lang="en-IE"/>
           </a:p>
@@ -2331,7 +2333,7 @@
           <a:p>
             <a:fld id="{FC950D17-7299-4B36-8CE5-03DC686728C8}" type="datetimeFigureOut">
               <a:rPr lang="en-IE" smtClean="0"/>
-              <a:t>05/10/2016</a:t>
+              <a:t>14/04/2017</a:t>
             </a:fld>
             <a:endParaRPr lang="en-IE"/>
           </a:p>
@@ -2608,7 +2610,7 @@
           <a:p>
             <a:fld id="{FC950D17-7299-4B36-8CE5-03DC686728C8}" type="datetimeFigureOut">
               <a:rPr lang="en-IE" smtClean="0"/>
-              <a:t>05/10/2016</a:t>
+              <a:t>14/04/2017</a:t>
             </a:fld>
             <a:endParaRPr lang="en-IE"/>
           </a:p>
@@ -2861,7 +2863,7 @@
           <a:p>
             <a:fld id="{FC950D17-7299-4B36-8CE5-03DC686728C8}" type="datetimeFigureOut">
               <a:rPr lang="en-IE" smtClean="0"/>
-              <a:t>05/10/2016</a:t>
+              <a:t>14/04/2017</a:t>
             </a:fld>
             <a:endParaRPr lang="en-IE"/>
           </a:p>
@@ -3074,7 +3076,7 @@
           <a:p>
             <a:fld id="{FC950D17-7299-4B36-8CE5-03DC686728C8}" type="datetimeFigureOut">
               <a:rPr lang="en-IE" smtClean="0"/>
-              <a:t>05/10/2016</a:t>
+              <a:t>14/04/2017</a:t>
             </a:fld>
             <a:endParaRPr lang="en-IE"/>
           </a:p>
@@ -5623,7 +5625,6 @@
               <a:rPr lang="en-IE" sz="1400" i="1" dirty="0"/>
               <a:t> E.G., "An overview of the potential of quantitative coating adhesion measurement by scratch testing", Tribology Intern., 39, 2009, pp. 99-114.</a:t>
             </a:r>
-            <a:endParaRPr lang="en-IE" sz="1400" i="1" dirty="0"/>
           </a:p>
         </p:txBody>
       </p:sp>
@@ -5669,6 +5670,2447 @@
     <p:extLst>
       <p:ext uri="{BB962C8B-B14F-4D97-AF65-F5344CB8AC3E}">
         <p14:creationId xmlns:p14="http://schemas.microsoft.com/office/powerpoint/2010/main" val="1316023225"/>
+      </p:ext>
+    </p:extLst>
+  </p:cSld>
+  <p:clrMapOvr>
+    <a:masterClrMapping/>
+  </p:clrMapOvr>
+</p:sld>
+</file>
+
+<file path=ppt/slides/slide3.xml><?xml version="1.0" encoding="utf-8"?>
+<p:sld xmlns:a="http://schemas.openxmlformats.org/drawingml/2006/main" xmlns:r="http://schemas.openxmlformats.org/officeDocument/2006/relationships" xmlns:p="http://schemas.openxmlformats.org/presentationml/2006/main">
+  <p:cSld>
+    <p:spTree>
+      <p:nvGrpSpPr>
+        <p:cNvPr id="1" name=""/>
+        <p:cNvGrpSpPr/>
+        <p:nvPr/>
+      </p:nvGrpSpPr>
+      <p:grpSpPr>
+        <a:xfrm>
+          <a:off x="0" y="0"/>
+          <a:ext cx="0" cy="0"/>
+          <a:chOff x="0" y="0"/>
+          <a:chExt cx="0" cy="0"/>
+        </a:xfrm>
+      </p:grpSpPr>
+      <p:cxnSp>
+        <p:nvCxnSpPr>
+          <p:cNvPr id="7" name="Straight Connector 6"/>
+          <p:cNvCxnSpPr/>
+          <p:nvPr/>
+        </p:nvCxnSpPr>
+        <p:spPr>
+          <a:xfrm flipV="1">
+            <a:off x="4543843" y="2696837"/>
+            <a:ext cx="1260000" cy="360000"/>
+          </a:xfrm>
+          <a:prstGeom prst="line">
+            <a:avLst/>
+          </a:prstGeom>
+          <a:ln w="28575">
+            <a:solidFill>
+              <a:schemeClr val="tx1"/>
+            </a:solidFill>
+          </a:ln>
+        </p:spPr>
+        <p:style>
+          <a:lnRef idx="1">
+            <a:schemeClr val="accent1"/>
+          </a:lnRef>
+          <a:fillRef idx="0">
+            <a:schemeClr val="accent1"/>
+          </a:fillRef>
+          <a:effectRef idx="0">
+            <a:schemeClr val="accent1"/>
+          </a:effectRef>
+          <a:fontRef idx="minor">
+            <a:schemeClr val="tx1"/>
+          </a:fontRef>
+        </p:style>
+      </p:cxnSp>
+      <p:cxnSp>
+        <p:nvCxnSpPr>
+          <p:cNvPr id="10" name="Straight Connector 9"/>
+          <p:cNvCxnSpPr/>
+          <p:nvPr/>
+        </p:nvCxnSpPr>
+        <p:spPr>
+          <a:xfrm>
+            <a:off x="4543843" y="3421903"/>
+            <a:ext cx="1280333" cy="360000"/>
+          </a:xfrm>
+          <a:prstGeom prst="line">
+            <a:avLst/>
+          </a:prstGeom>
+          <a:ln w="28575">
+            <a:solidFill>
+              <a:schemeClr val="tx1"/>
+            </a:solidFill>
+          </a:ln>
+        </p:spPr>
+        <p:style>
+          <a:lnRef idx="1">
+            <a:schemeClr val="accent1"/>
+          </a:lnRef>
+          <a:fillRef idx="0">
+            <a:schemeClr val="accent1"/>
+          </a:fillRef>
+          <a:effectRef idx="0">
+            <a:schemeClr val="accent1"/>
+          </a:effectRef>
+          <a:fontRef idx="minor">
+            <a:schemeClr val="tx1"/>
+          </a:fontRef>
+        </p:style>
+      </p:cxnSp>
+      <p:cxnSp>
+        <p:nvCxnSpPr>
+          <p:cNvPr id="32" name="Straight Connector 31"/>
+          <p:cNvCxnSpPr/>
+          <p:nvPr/>
+        </p:nvCxnSpPr>
+        <p:spPr>
+          <a:xfrm flipH="1">
+            <a:off x="5593665" y="2537143"/>
+            <a:ext cx="635402" cy="370244"/>
+          </a:xfrm>
+          <a:prstGeom prst="line">
+            <a:avLst/>
+          </a:prstGeom>
+          <a:ln w="28575">
+            <a:solidFill>
+              <a:schemeClr val="tx1"/>
+            </a:solidFill>
+            <a:headEnd type="none" w="med" len="med"/>
+            <a:tailEnd type="triangle" w="med" len="med"/>
+          </a:ln>
+        </p:spPr>
+        <p:style>
+          <a:lnRef idx="1">
+            <a:schemeClr val="accent1"/>
+          </a:lnRef>
+          <a:fillRef idx="0">
+            <a:schemeClr val="accent1"/>
+          </a:fillRef>
+          <a:effectRef idx="0">
+            <a:schemeClr val="accent1"/>
+          </a:effectRef>
+          <a:fontRef idx="minor">
+            <a:schemeClr val="tx1"/>
+          </a:fontRef>
+        </p:style>
+      </p:cxnSp>
+      <p:sp>
+        <p:nvSpPr>
+          <p:cNvPr id="37" name="TextBox 36"/>
+          <p:cNvSpPr txBox="1"/>
+          <p:nvPr/>
+        </p:nvSpPr>
+        <p:spPr>
+          <a:xfrm>
+            <a:off x="5869027" y="2112412"/>
+            <a:ext cx="1440160" cy="461665"/>
+          </a:xfrm>
+          <a:prstGeom prst="rect">
+            <a:avLst/>
+          </a:prstGeom>
+          <a:noFill/>
+        </p:spPr>
+        <p:txBody>
+          <a:bodyPr wrap="square" rtlCol="0">
+            <a:spAutoFit/>
+          </a:bodyPr>
+          <a:lstStyle/>
+          <a:p>
+            <a:r>
+              <a:rPr lang="en-IE" sz="1200" dirty="0" smtClean="0"/>
+              <a:t>Chipped coating segment</a:t>
+            </a:r>
+            <a:endParaRPr lang="en-IE" sz="1200" dirty="0"/>
+          </a:p>
+        </p:txBody>
+      </p:sp>
+      <p:cxnSp>
+        <p:nvCxnSpPr>
+          <p:cNvPr id="40" name="Straight Connector 39"/>
+          <p:cNvCxnSpPr/>
+          <p:nvPr/>
+        </p:nvCxnSpPr>
+        <p:spPr>
+          <a:xfrm>
+            <a:off x="4768957" y="2382676"/>
+            <a:ext cx="516868" cy="441342"/>
+          </a:xfrm>
+          <a:prstGeom prst="line">
+            <a:avLst/>
+          </a:prstGeom>
+          <a:ln w="28575">
+            <a:solidFill>
+              <a:schemeClr val="tx1"/>
+            </a:solidFill>
+            <a:headEnd type="none" w="med" len="med"/>
+            <a:tailEnd type="triangle" w="med" len="med"/>
+          </a:ln>
+        </p:spPr>
+        <p:style>
+          <a:lnRef idx="1">
+            <a:schemeClr val="accent1"/>
+          </a:lnRef>
+          <a:fillRef idx="0">
+            <a:schemeClr val="accent1"/>
+          </a:fillRef>
+          <a:effectRef idx="0">
+            <a:schemeClr val="accent1"/>
+          </a:effectRef>
+          <a:fontRef idx="minor">
+            <a:schemeClr val="tx1"/>
+          </a:fontRef>
+        </p:style>
+      </p:cxnSp>
+      <p:sp>
+        <p:nvSpPr>
+          <p:cNvPr id="41" name="TextBox 40"/>
+          <p:cNvSpPr txBox="1"/>
+          <p:nvPr/>
+        </p:nvSpPr>
+        <p:spPr>
+          <a:xfrm>
+            <a:off x="4025685" y="2105677"/>
+            <a:ext cx="1440160" cy="276999"/>
+          </a:xfrm>
+          <a:prstGeom prst="rect">
+            <a:avLst/>
+          </a:prstGeom>
+          <a:noFill/>
+        </p:spPr>
+        <p:txBody>
+          <a:bodyPr wrap="square" rtlCol="0">
+            <a:spAutoFit/>
+          </a:bodyPr>
+          <a:lstStyle/>
+          <a:p>
+            <a:r>
+              <a:rPr lang="en-IE" sz="1200" dirty="0" smtClean="0"/>
+              <a:t>Radial crack</a:t>
+            </a:r>
+            <a:endParaRPr lang="en-IE" sz="1200" dirty="0"/>
+          </a:p>
+        </p:txBody>
+      </p:sp>
+      <p:sp>
+        <p:nvSpPr>
+          <p:cNvPr id="44" name="TextBox 43"/>
+          <p:cNvSpPr txBox="1"/>
+          <p:nvPr/>
+        </p:nvSpPr>
+        <p:spPr>
+          <a:xfrm>
+            <a:off x="4644008" y="3235545"/>
+            <a:ext cx="1440160" cy="276999"/>
+          </a:xfrm>
+          <a:prstGeom prst="rect">
+            <a:avLst/>
+          </a:prstGeom>
+          <a:noFill/>
+        </p:spPr>
+        <p:txBody>
+          <a:bodyPr wrap="square" rtlCol="0">
+            <a:spAutoFit/>
+          </a:bodyPr>
+          <a:lstStyle/>
+          <a:p>
+            <a:pPr algn="ctr"/>
+            <a:r>
+              <a:rPr lang="en-IE" sz="1200" dirty="0" smtClean="0"/>
+              <a:t>L</a:t>
+            </a:r>
+            <a:endParaRPr lang="en-IE" sz="1200" dirty="0"/>
+          </a:p>
+        </p:txBody>
+      </p:sp>
+      <p:cxnSp>
+        <p:nvCxnSpPr>
+          <p:cNvPr id="45" name="Straight Connector 44"/>
+          <p:cNvCxnSpPr>
+            <a:stCxn id="57" idx="3"/>
+          </p:cNvCxnSpPr>
+          <p:nvPr/>
+        </p:nvCxnSpPr>
+        <p:spPr>
+          <a:xfrm>
+            <a:off x="4546385" y="3236824"/>
+            <a:ext cx="1277791" cy="73"/>
+          </a:xfrm>
+          <a:prstGeom prst="line">
+            <a:avLst/>
+          </a:prstGeom>
+          <a:ln w="28575">
+            <a:solidFill>
+              <a:schemeClr val="tx1"/>
+            </a:solidFill>
+            <a:headEnd type="triangle" w="med" len="med"/>
+            <a:tailEnd type="triangle" w="med" len="med"/>
+          </a:ln>
+        </p:spPr>
+        <p:style>
+          <a:lnRef idx="1">
+            <a:schemeClr val="accent1"/>
+          </a:lnRef>
+          <a:fillRef idx="0">
+            <a:schemeClr val="accent1"/>
+          </a:fillRef>
+          <a:effectRef idx="0">
+            <a:schemeClr val="accent1"/>
+          </a:effectRef>
+          <a:fontRef idx="minor">
+            <a:schemeClr val="tx1"/>
+          </a:fontRef>
+        </p:style>
+      </p:cxnSp>
+      <p:sp>
+        <p:nvSpPr>
+          <p:cNvPr id="35" name="Arc 34"/>
+          <p:cNvSpPr/>
+          <p:nvPr/>
+        </p:nvSpPr>
+        <p:spPr>
+          <a:xfrm>
+            <a:off x="4651857" y="2852936"/>
+            <a:ext cx="396044" cy="424302"/>
+          </a:xfrm>
+          <a:prstGeom prst="arc">
+            <a:avLst>
+              <a:gd name="adj1" fmla="val 18872415"/>
+              <a:gd name="adj2" fmla="val 164123"/>
+            </a:avLst>
+          </a:prstGeom>
+          <a:ln w="28575">
+            <a:solidFill>
+              <a:schemeClr val="tx1"/>
+            </a:solidFill>
+          </a:ln>
+        </p:spPr>
+        <p:style>
+          <a:lnRef idx="1">
+            <a:schemeClr val="accent1"/>
+          </a:lnRef>
+          <a:fillRef idx="0">
+            <a:schemeClr val="accent1"/>
+          </a:fillRef>
+          <a:effectRef idx="0">
+            <a:schemeClr val="accent1"/>
+          </a:effectRef>
+          <a:fontRef idx="minor">
+            <a:schemeClr val="tx1"/>
+          </a:fontRef>
+        </p:style>
+        <p:txBody>
+          <a:bodyPr rtlCol="0" anchor="ctr"/>
+          <a:lstStyle/>
+          <a:p>
+            <a:pPr algn="ctr"/>
+            <a:endParaRPr lang="en-IE"/>
+          </a:p>
+        </p:txBody>
+      </p:sp>
+      <p:sp>
+        <p:nvSpPr>
+          <p:cNvPr id="50" name="TextBox 49"/>
+          <p:cNvSpPr txBox="1"/>
+          <p:nvPr/>
+        </p:nvSpPr>
+        <p:spPr>
+          <a:xfrm>
+            <a:off x="4450080" y="2830949"/>
+            <a:ext cx="1440160" cy="276999"/>
+          </a:xfrm>
+          <a:prstGeom prst="rect">
+            <a:avLst/>
+          </a:prstGeom>
+          <a:noFill/>
+        </p:spPr>
+        <p:txBody>
+          <a:bodyPr wrap="square" rtlCol="0">
+            <a:spAutoFit/>
+          </a:bodyPr>
+          <a:lstStyle/>
+          <a:p>
+            <a:pPr algn="ctr"/>
+            <a:r>
+              <a:rPr lang="el-GR" sz="1200" dirty="0" smtClean="0"/>
+              <a:t>β</a:t>
+            </a:r>
+            <a:endParaRPr lang="en-IE" sz="1200" dirty="0"/>
+          </a:p>
+        </p:txBody>
+      </p:sp>
+      <p:cxnSp>
+        <p:nvCxnSpPr>
+          <p:cNvPr id="52" name="Straight Connector 51"/>
+          <p:cNvCxnSpPr/>
+          <p:nvPr/>
+        </p:nvCxnSpPr>
+        <p:spPr>
+          <a:xfrm>
+            <a:off x="4555203" y="2841312"/>
+            <a:ext cx="0" cy="220671"/>
+          </a:xfrm>
+          <a:prstGeom prst="line">
+            <a:avLst/>
+          </a:prstGeom>
+          <a:ln w="28575">
+            <a:solidFill>
+              <a:schemeClr val="tx1"/>
+            </a:solidFill>
+            <a:headEnd type="none" w="med" len="med"/>
+            <a:tailEnd type="triangle" w="med" len="med"/>
+          </a:ln>
+        </p:spPr>
+        <p:style>
+          <a:lnRef idx="1">
+            <a:schemeClr val="accent1"/>
+          </a:lnRef>
+          <a:fillRef idx="0">
+            <a:schemeClr val="accent1"/>
+          </a:fillRef>
+          <a:effectRef idx="0">
+            <a:schemeClr val="accent1"/>
+          </a:effectRef>
+          <a:fontRef idx="minor">
+            <a:schemeClr val="tx1"/>
+          </a:fontRef>
+        </p:style>
+      </p:cxnSp>
+      <p:cxnSp>
+        <p:nvCxnSpPr>
+          <p:cNvPr id="54" name="Straight Connector 53"/>
+          <p:cNvCxnSpPr/>
+          <p:nvPr/>
+        </p:nvCxnSpPr>
+        <p:spPr>
+          <a:xfrm flipV="1">
+            <a:off x="4548239" y="3402209"/>
+            <a:ext cx="0" cy="220671"/>
+          </a:xfrm>
+          <a:prstGeom prst="line">
+            <a:avLst/>
+          </a:prstGeom>
+          <a:ln w="28575">
+            <a:solidFill>
+              <a:schemeClr val="tx1"/>
+            </a:solidFill>
+            <a:headEnd type="none" w="med" len="med"/>
+            <a:tailEnd type="triangle" w="med" len="med"/>
+          </a:ln>
+        </p:spPr>
+        <p:style>
+          <a:lnRef idx="1">
+            <a:schemeClr val="accent1"/>
+          </a:lnRef>
+          <a:fillRef idx="0">
+            <a:schemeClr val="accent1"/>
+          </a:fillRef>
+          <a:effectRef idx="0">
+            <a:schemeClr val="accent1"/>
+          </a:effectRef>
+          <a:fontRef idx="minor">
+            <a:schemeClr val="tx1"/>
+          </a:fontRef>
+        </p:style>
+      </p:cxnSp>
+      <p:sp>
+        <p:nvSpPr>
+          <p:cNvPr id="55" name="TextBox 54"/>
+          <p:cNvSpPr txBox="1"/>
+          <p:nvPr/>
+        </p:nvSpPr>
+        <p:spPr>
+          <a:xfrm>
+            <a:off x="3840337" y="3600731"/>
+            <a:ext cx="1440160" cy="276999"/>
+          </a:xfrm>
+          <a:prstGeom prst="rect">
+            <a:avLst/>
+          </a:prstGeom>
+          <a:noFill/>
+        </p:spPr>
+        <p:txBody>
+          <a:bodyPr wrap="square" rtlCol="0">
+            <a:spAutoFit/>
+          </a:bodyPr>
+          <a:lstStyle/>
+          <a:p>
+            <a:pPr algn="ctr"/>
+            <a:r>
+              <a:rPr lang="en-IE" sz="1200" dirty="0" smtClean="0"/>
+              <a:t>2a</a:t>
+            </a:r>
+            <a:endParaRPr lang="en-IE" sz="1200" dirty="0"/>
+          </a:p>
+        </p:txBody>
+      </p:sp>
+      <p:sp>
+        <p:nvSpPr>
+          <p:cNvPr id="60" name="TextBox 59"/>
+          <p:cNvSpPr txBox="1"/>
+          <p:nvPr/>
+        </p:nvSpPr>
+        <p:spPr>
+          <a:xfrm>
+            <a:off x="2493179" y="4221088"/>
+            <a:ext cx="4124048" cy="646331"/>
+          </a:xfrm>
+          <a:prstGeom prst="rect">
+            <a:avLst/>
+          </a:prstGeom>
+          <a:noFill/>
+        </p:spPr>
+        <p:txBody>
+          <a:bodyPr wrap="square" rtlCol="0">
+            <a:spAutoFit/>
+          </a:bodyPr>
+          <a:lstStyle/>
+          <a:p>
+            <a:pPr algn="ctr"/>
+            <a:r>
+              <a:rPr lang="en-IE" i="1" u="sng" dirty="0" smtClean="0"/>
+              <a:t>Sketch of the geometry of a chipped segment of coating, in case of scratch test.</a:t>
+            </a:r>
+            <a:endParaRPr lang="en-IE" i="1" u="sng" dirty="0"/>
+          </a:p>
+        </p:txBody>
+      </p:sp>
+      <p:sp>
+        <p:nvSpPr>
+          <p:cNvPr id="46" name="TextBox 45"/>
+          <p:cNvSpPr txBox="1"/>
+          <p:nvPr/>
+        </p:nvSpPr>
+        <p:spPr>
+          <a:xfrm>
+            <a:off x="1234578" y="332656"/>
+            <a:ext cx="6674844" cy="800219"/>
+          </a:xfrm>
+          <a:prstGeom prst="rect">
+            <a:avLst/>
+          </a:prstGeom>
+          <a:noFill/>
+        </p:spPr>
+        <p:txBody>
+          <a:bodyPr wrap="square" rtlCol="0">
+            <a:spAutoFit/>
+          </a:bodyPr>
+          <a:lstStyle/>
+          <a:p>
+            <a:pPr algn="ctr"/>
+            <a:r>
+              <a:rPr lang="en-IE" b="1" u="sng" dirty="0" smtClean="0"/>
+              <a:t>Model of </a:t>
+            </a:r>
+            <a:r>
+              <a:rPr lang="en-IE" b="1" u="sng" dirty="0" err="1" smtClean="0"/>
+              <a:t>Thouless</a:t>
+            </a:r>
+            <a:endParaRPr lang="en-IE" b="1" u="sng" dirty="0"/>
+          </a:p>
+          <a:p>
+            <a:pPr marL="285750" indent="-285750" algn="ctr">
+              <a:buFont typeface="Wingdings" panose="05000000000000000000" pitchFamily="2" charset="2"/>
+              <a:buChar char="§"/>
+            </a:pPr>
+            <a:r>
+              <a:rPr lang="en-IE" sz="1400" i="1" dirty="0" err="1"/>
+              <a:t>Thouless</a:t>
+            </a:r>
+            <a:r>
+              <a:rPr lang="en-IE" sz="1400" i="1" dirty="0"/>
+              <a:t> M. D., “An analysis of spalling in the </a:t>
+            </a:r>
+            <a:r>
+              <a:rPr lang="en-IE" sz="1400" i="1" dirty="0" err="1"/>
+              <a:t>microscratch</a:t>
+            </a:r>
+            <a:r>
+              <a:rPr lang="en-IE" sz="1400" i="1" dirty="0"/>
+              <a:t> test”, Engineering Fracture Mechanics, Volume 61, Issue 1, August 1998, Pages 75–81.</a:t>
+            </a:r>
+          </a:p>
+        </p:txBody>
+      </p:sp>
+      <p:cxnSp>
+        <p:nvCxnSpPr>
+          <p:cNvPr id="48" name="Straight Connector 47"/>
+          <p:cNvCxnSpPr/>
+          <p:nvPr/>
+        </p:nvCxnSpPr>
+        <p:spPr>
+          <a:xfrm>
+            <a:off x="5800051" y="2687897"/>
+            <a:ext cx="24125" cy="1098000"/>
+          </a:xfrm>
+          <a:prstGeom prst="line">
+            <a:avLst/>
+          </a:prstGeom>
+          <a:ln w="28575">
+            <a:solidFill>
+              <a:schemeClr val="tx1"/>
+            </a:solidFill>
+          </a:ln>
+        </p:spPr>
+        <p:style>
+          <a:lnRef idx="1">
+            <a:schemeClr val="accent1"/>
+          </a:lnRef>
+          <a:fillRef idx="0">
+            <a:schemeClr val="accent1"/>
+          </a:fillRef>
+          <a:effectRef idx="0">
+            <a:schemeClr val="accent1"/>
+          </a:effectRef>
+          <a:fontRef idx="minor">
+            <a:schemeClr val="tx1"/>
+          </a:fontRef>
+        </p:style>
+      </p:cxnSp>
+      <p:sp>
+        <p:nvSpPr>
+          <p:cNvPr id="57" name="Isosceles Triangle 56"/>
+          <p:cNvSpPr/>
+          <p:nvPr/>
+        </p:nvSpPr>
+        <p:spPr>
+          <a:xfrm rot="16200000">
+            <a:off x="3389477" y="2259916"/>
+            <a:ext cx="360000" cy="1953816"/>
+          </a:xfrm>
+          <a:prstGeom prst="triangle">
+            <a:avLst/>
+          </a:prstGeom>
+          <a:pattFill prst="wdDnDiag">
+            <a:fgClr>
+              <a:schemeClr val="bg1">
+                <a:lumMod val="65000"/>
+              </a:schemeClr>
+            </a:fgClr>
+            <a:bgClr>
+              <a:schemeClr val="bg1"/>
+            </a:bgClr>
+          </a:pattFill>
+          <a:ln>
+            <a:solidFill>
+              <a:schemeClr val="tx1"/>
+            </a:solidFill>
+          </a:ln>
+        </p:spPr>
+        <p:style>
+          <a:lnRef idx="2">
+            <a:schemeClr val="accent1">
+              <a:shade val="50000"/>
+            </a:schemeClr>
+          </a:lnRef>
+          <a:fillRef idx="1">
+            <a:schemeClr val="accent1"/>
+          </a:fillRef>
+          <a:effectRef idx="0">
+            <a:schemeClr val="accent1"/>
+          </a:effectRef>
+          <a:fontRef idx="minor">
+            <a:schemeClr val="lt1"/>
+          </a:fontRef>
+        </p:style>
+        <p:txBody>
+          <a:bodyPr rtlCol="0" anchor="ctr"/>
+          <a:lstStyle/>
+          <a:p>
+            <a:pPr algn="ctr"/>
+            <a:endParaRPr lang="en-IE"/>
+          </a:p>
+        </p:txBody>
+      </p:sp>
+      <p:cxnSp>
+        <p:nvCxnSpPr>
+          <p:cNvPr id="24" name="Straight Connector 23"/>
+          <p:cNvCxnSpPr/>
+          <p:nvPr/>
+        </p:nvCxnSpPr>
+        <p:spPr>
+          <a:xfrm>
+            <a:off x="3660317" y="2803936"/>
+            <a:ext cx="516868" cy="441342"/>
+          </a:xfrm>
+          <a:prstGeom prst="line">
+            <a:avLst/>
+          </a:prstGeom>
+          <a:ln w="28575">
+            <a:solidFill>
+              <a:schemeClr val="tx1"/>
+            </a:solidFill>
+            <a:headEnd type="none" w="med" len="med"/>
+            <a:tailEnd type="triangle" w="med" len="med"/>
+          </a:ln>
+        </p:spPr>
+        <p:style>
+          <a:lnRef idx="1">
+            <a:schemeClr val="accent1"/>
+          </a:lnRef>
+          <a:fillRef idx="0">
+            <a:schemeClr val="accent1"/>
+          </a:fillRef>
+          <a:effectRef idx="0">
+            <a:schemeClr val="accent1"/>
+          </a:effectRef>
+          <a:fontRef idx="minor">
+            <a:schemeClr val="tx1"/>
+          </a:fontRef>
+        </p:style>
+      </p:cxnSp>
+      <p:sp>
+        <p:nvSpPr>
+          <p:cNvPr id="31" name="TextBox 30"/>
+          <p:cNvSpPr txBox="1"/>
+          <p:nvPr/>
+        </p:nvSpPr>
+        <p:spPr>
+          <a:xfrm>
+            <a:off x="2917045" y="2526937"/>
+            <a:ext cx="1440160" cy="276999"/>
+          </a:xfrm>
+          <a:prstGeom prst="rect">
+            <a:avLst/>
+          </a:prstGeom>
+          <a:noFill/>
+        </p:spPr>
+        <p:txBody>
+          <a:bodyPr wrap="square" rtlCol="0">
+            <a:spAutoFit/>
+          </a:bodyPr>
+          <a:lstStyle/>
+          <a:p>
+            <a:r>
+              <a:rPr lang="en-IE" sz="1200" dirty="0" smtClean="0"/>
+              <a:t>Indenter / Stylus</a:t>
+            </a:r>
+            <a:endParaRPr lang="en-IE" sz="1200" dirty="0"/>
+          </a:p>
+        </p:txBody>
+      </p:sp>
+      <p:cxnSp>
+        <p:nvCxnSpPr>
+          <p:cNvPr id="59" name="Straight Connector 58"/>
+          <p:cNvCxnSpPr/>
+          <p:nvPr/>
+        </p:nvCxnSpPr>
+        <p:spPr>
+          <a:xfrm>
+            <a:off x="4560102" y="3071790"/>
+            <a:ext cx="1277791" cy="73"/>
+          </a:xfrm>
+          <a:prstGeom prst="line">
+            <a:avLst/>
+          </a:prstGeom>
+          <a:ln w="19050">
+            <a:solidFill>
+              <a:schemeClr val="tx1"/>
+            </a:solidFill>
+            <a:prstDash val="dash"/>
+            <a:headEnd type="none" w="med" len="med"/>
+            <a:tailEnd type="none" w="med" len="med"/>
+          </a:ln>
+        </p:spPr>
+        <p:style>
+          <a:lnRef idx="1">
+            <a:schemeClr val="accent1"/>
+          </a:lnRef>
+          <a:fillRef idx="0">
+            <a:schemeClr val="accent1"/>
+          </a:fillRef>
+          <a:effectRef idx="0">
+            <a:schemeClr val="accent1"/>
+          </a:effectRef>
+          <a:fontRef idx="minor">
+            <a:schemeClr val="tx1"/>
+          </a:fontRef>
+        </p:style>
+      </p:cxnSp>
+      <p:cxnSp>
+        <p:nvCxnSpPr>
+          <p:cNvPr id="25" name="Straight Connector 24"/>
+          <p:cNvCxnSpPr/>
+          <p:nvPr/>
+        </p:nvCxnSpPr>
+        <p:spPr>
+          <a:xfrm>
+            <a:off x="2630912" y="2419868"/>
+            <a:ext cx="713825" cy="0"/>
+          </a:xfrm>
+          <a:prstGeom prst="line">
+            <a:avLst/>
+          </a:prstGeom>
+          <a:ln w="38100">
+            <a:solidFill>
+              <a:schemeClr val="tx1"/>
+            </a:solidFill>
+            <a:headEnd type="none" w="med" len="med"/>
+            <a:tailEnd type="triangle" w="med" len="med"/>
+          </a:ln>
+        </p:spPr>
+        <p:style>
+          <a:lnRef idx="1">
+            <a:schemeClr val="accent1"/>
+          </a:lnRef>
+          <a:fillRef idx="0">
+            <a:schemeClr val="accent1"/>
+          </a:fillRef>
+          <a:effectRef idx="0">
+            <a:schemeClr val="accent1"/>
+          </a:effectRef>
+          <a:fontRef idx="minor">
+            <a:schemeClr val="tx1"/>
+          </a:fontRef>
+        </p:style>
+      </p:cxnSp>
+      <p:sp>
+        <p:nvSpPr>
+          <p:cNvPr id="26" name="TextBox 25"/>
+          <p:cNvSpPr txBox="1"/>
+          <p:nvPr/>
+        </p:nvSpPr>
+        <p:spPr>
+          <a:xfrm>
+            <a:off x="2267744" y="2143889"/>
+            <a:ext cx="1440160" cy="276999"/>
+          </a:xfrm>
+          <a:prstGeom prst="rect">
+            <a:avLst/>
+          </a:prstGeom>
+          <a:noFill/>
+        </p:spPr>
+        <p:txBody>
+          <a:bodyPr wrap="square" rtlCol="0">
+            <a:spAutoFit/>
+          </a:bodyPr>
+          <a:lstStyle/>
+          <a:p>
+            <a:pPr algn="ctr"/>
+            <a:r>
+              <a:rPr lang="en-IE" sz="1200" dirty="0" smtClean="0"/>
+              <a:t>Scratch direction</a:t>
+            </a:r>
+            <a:endParaRPr lang="en-IE" sz="1200" dirty="0"/>
+          </a:p>
+        </p:txBody>
+      </p:sp>
+    </p:spTree>
+    <p:extLst>
+      <p:ext uri="{BB962C8B-B14F-4D97-AF65-F5344CB8AC3E}">
+        <p14:creationId xmlns:p14="http://schemas.microsoft.com/office/powerpoint/2010/main" val="4216968698"/>
+      </p:ext>
+    </p:extLst>
+  </p:cSld>
+  <p:clrMapOvr>
+    <a:masterClrMapping/>
+  </p:clrMapOvr>
+</p:sld>
+</file>
+
+<file path=ppt/slides/slide4.xml><?xml version="1.0" encoding="utf-8"?>
+<p:sld xmlns:a="http://schemas.openxmlformats.org/drawingml/2006/main" xmlns:r="http://schemas.openxmlformats.org/officeDocument/2006/relationships" xmlns:p="http://schemas.openxmlformats.org/presentationml/2006/main">
+  <p:cSld>
+    <p:spTree>
+      <p:nvGrpSpPr>
+        <p:cNvPr id="1" name=""/>
+        <p:cNvGrpSpPr/>
+        <p:nvPr/>
+      </p:nvGrpSpPr>
+      <p:grpSpPr>
+        <a:xfrm>
+          <a:off x="0" y="0"/>
+          <a:ext cx="0" cy="0"/>
+          <a:chOff x="0" y="0"/>
+          <a:chExt cx="0" cy="0"/>
+        </a:xfrm>
+      </p:grpSpPr>
+      <p:sp>
+        <p:nvSpPr>
+          <p:cNvPr id="4" name="Oval 3"/>
+          <p:cNvSpPr/>
+          <p:nvPr/>
+        </p:nvSpPr>
+        <p:spPr>
+          <a:xfrm>
+            <a:off x="1259632" y="3119433"/>
+            <a:ext cx="360040" cy="360040"/>
+          </a:xfrm>
+          <a:prstGeom prst="ellipse">
+            <a:avLst/>
+          </a:prstGeom>
+          <a:solidFill>
+            <a:schemeClr val="bg1">
+              <a:lumMod val="65000"/>
+            </a:schemeClr>
+          </a:solidFill>
+          <a:ln>
+            <a:solidFill>
+              <a:schemeClr val="tx1"/>
+            </a:solidFill>
+          </a:ln>
+        </p:spPr>
+        <p:style>
+          <a:lnRef idx="2">
+            <a:schemeClr val="accent1">
+              <a:shade val="50000"/>
+            </a:schemeClr>
+          </a:lnRef>
+          <a:fillRef idx="1">
+            <a:schemeClr val="accent1"/>
+          </a:fillRef>
+          <a:effectRef idx="0">
+            <a:schemeClr val="accent1"/>
+          </a:effectRef>
+          <a:fontRef idx="minor">
+            <a:schemeClr val="lt1"/>
+          </a:fontRef>
+        </p:style>
+        <p:txBody>
+          <a:bodyPr rtlCol="0" anchor="ctr"/>
+          <a:lstStyle/>
+          <a:p>
+            <a:pPr algn="ctr"/>
+            <a:endParaRPr lang="en-IE"/>
+          </a:p>
+        </p:txBody>
+      </p:sp>
+      <p:sp>
+        <p:nvSpPr>
+          <p:cNvPr id="5" name="Isosceles Triangle 4"/>
+          <p:cNvSpPr/>
+          <p:nvPr/>
+        </p:nvSpPr>
+        <p:spPr>
+          <a:xfrm>
+            <a:off x="6378280" y="3157368"/>
+            <a:ext cx="432000" cy="360000"/>
+          </a:xfrm>
+          <a:prstGeom prst="triangle">
+            <a:avLst/>
+          </a:prstGeom>
+          <a:solidFill>
+            <a:schemeClr val="bg1">
+              <a:lumMod val="65000"/>
+            </a:schemeClr>
+          </a:solidFill>
+          <a:ln>
+            <a:solidFill>
+              <a:schemeClr val="tx1"/>
+            </a:solidFill>
+          </a:ln>
+        </p:spPr>
+        <p:style>
+          <a:lnRef idx="2">
+            <a:schemeClr val="accent1">
+              <a:shade val="50000"/>
+            </a:schemeClr>
+          </a:lnRef>
+          <a:fillRef idx="1">
+            <a:schemeClr val="accent1"/>
+          </a:fillRef>
+          <a:effectRef idx="0">
+            <a:schemeClr val="accent1"/>
+          </a:effectRef>
+          <a:fontRef idx="minor">
+            <a:schemeClr val="lt1"/>
+          </a:fontRef>
+        </p:style>
+        <p:txBody>
+          <a:bodyPr rtlCol="0" anchor="ctr"/>
+          <a:lstStyle/>
+          <a:p>
+            <a:pPr algn="ctr"/>
+            <a:endParaRPr lang="en-IE"/>
+          </a:p>
+        </p:txBody>
+      </p:sp>
+      <p:cxnSp>
+        <p:nvCxnSpPr>
+          <p:cNvPr id="7" name="Straight Connector 6"/>
+          <p:cNvCxnSpPr>
+            <a:stCxn id="4" idx="0"/>
+          </p:cNvCxnSpPr>
+          <p:nvPr/>
+        </p:nvCxnSpPr>
+        <p:spPr>
+          <a:xfrm flipV="1">
+            <a:off x="1439652" y="2759393"/>
+            <a:ext cx="1260000" cy="360000"/>
+          </a:xfrm>
+          <a:prstGeom prst="line">
+            <a:avLst/>
+          </a:prstGeom>
+          <a:ln w="28575">
+            <a:solidFill>
+              <a:schemeClr val="tx1"/>
+            </a:solidFill>
+          </a:ln>
+        </p:spPr>
+        <p:style>
+          <a:lnRef idx="1">
+            <a:schemeClr val="accent1"/>
+          </a:lnRef>
+          <a:fillRef idx="0">
+            <a:schemeClr val="accent1"/>
+          </a:fillRef>
+          <a:effectRef idx="0">
+            <a:schemeClr val="accent1"/>
+          </a:effectRef>
+          <a:fontRef idx="minor">
+            <a:schemeClr val="tx1"/>
+          </a:fontRef>
+        </p:style>
+      </p:cxnSp>
+      <p:cxnSp>
+        <p:nvCxnSpPr>
+          <p:cNvPr id="10" name="Straight Connector 9"/>
+          <p:cNvCxnSpPr/>
+          <p:nvPr/>
+        </p:nvCxnSpPr>
+        <p:spPr>
+          <a:xfrm>
+            <a:off x="1439650" y="3479473"/>
+            <a:ext cx="1260000" cy="360000"/>
+          </a:xfrm>
+          <a:prstGeom prst="line">
+            <a:avLst/>
+          </a:prstGeom>
+          <a:ln w="28575">
+            <a:solidFill>
+              <a:schemeClr val="tx1"/>
+            </a:solidFill>
+          </a:ln>
+        </p:spPr>
+        <p:style>
+          <a:lnRef idx="1">
+            <a:schemeClr val="accent1"/>
+          </a:lnRef>
+          <a:fillRef idx="0">
+            <a:schemeClr val="accent1"/>
+          </a:fillRef>
+          <a:effectRef idx="0">
+            <a:schemeClr val="accent1"/>
+          </a:effectRef>
+          <a:fontRef idx="minor">
+            <a:schemeClr val="tx1"/>
+          </a:fontRef>
+        </p:style>
+      </p:cxnSp>
+      <p:sp>
+        <p:nvSpPr>
+          <p:cNvPr id="12" name="Arc 11"/>
+          <p:cNvSpPr/>
+          <p:nvPr/>
+        </p:nvSpPr>
+        <p:spPr>
+          <a:xfrm>
+            <a:off x="1979872" y="2759393"/>
+            <a:ext cx="1440000" cy="1080080"/>
+          </a:xfrm>
+          <a:prstGeom prst="arc">
+            <a:avLst>
+              <a:gd name="adj1" fmla="val 16200000"/>
+              <a:gd name="adj2" fmla="val 5410194"/>
+            </a:avLst>
+          </a:prstGeom>
+          <a:ln w="28575">
+            <a:solidFill>
+              <a:schemeClr val="tx1"/>
+            </a:solidFill>
+          </a:ln>
+        </p:spPr>
+        <p:style>
+          <a:lnRef idx="1">
+            <a:schemeClr val="accent1"/>
+          </a:lnRef>
+          <a:fillRef idx="0">
+            <a:schemeClr val="accent1"/>
+          </a:fillRef>
+          <a:effectRef idx="0">
+            <a:schemeClr val="accent1"/>
+          </a:effectRef>
+          <a:fontRef idx="minor">
+            <a:schemeClr val="tx1"/>
+          </a:fontRef>
+        </p:style>
+        <p:txBody>
+          <a:bodyPr rtlCol="0" anchor="ctr"/>
+          <a:lstStyle/>
+          <a:p>
+            <a:pPr algn="ctr"/>
+            <a:endParaRPr lang="en-IE"/>
+          </a:p>
+        </p:txBody>
+      </p:sp>
+      <p:sp>
+        <p:nvSpPr>
+          <p:cNvPr id="15" name="Arc 14"/>
+          <p:cNvSpPr/>
+          <p:nvPr/>
+        </p:nvSpPr>
+        <p:spPr>
+          <a:xfrm>
+            <a:off x="5850128" y="2606704"/>
+            <a:ext cx="1476000" cy="1764136"/>
+          </a:xfrm>
+          <a:prstGeom prst="arc">
+            <a:avLst>
+              <a:gd name="adj1" fmla="val 16200000"/>
+              <a:gd name="adj2" fmla="val 1441878"/>
+            </a:avLst>
+          </a:prstGeom>
+          <a:ln w="28575">
+            <a:solidFill>
+              <a:schemeClr val="tx1"/>
+            </a:solidFill>
+          </a:ln>
+        </p:spPr>
+        <p:style>
+          <a:lnRef idx="1">
+            <a:schemeClr val="accent1"/>
+          </a:lnRef>
+          <a:fillRef idx="0">
+            <a:schemeClr val="accent1"/>
+          </a:fillRef>
+          <a:effectRef idx="0">
+            <a:schemeClr val="accent1"/>
+          </a:effectRef>
+          <a:fontRef idx="minor">
+            <a:schemeClr val="tx1"/>
+          </a:fontRef>
+        </p:style>
+        <p:txBody>
+          <a:bodyPr rtlCol="0" anchor="ctr"/>
+          <a:lstStyle/>
+          <a:p>
+            <a:pPr algn="ctr"/>
+            <a:endParaRPr lang="en-IE"/>
+          </a:p>
+        </p:txBody>
+      </p:sp>
+      <p:cxnSp>
+        <p:nvCxnSpPr>
+          <p:cNvPr id="16" name="Straight Connector 15"/>
+          <p:cNvCxnSpPr/>
+          <p:nvPr/>
+        </p:nvCxnSpPr>
+        <p:spPr>
+          <a:xfrm flipH="1" flipV="1">
+            <a:off x="6602144" y="2617368"/>
+            <a:ext cx="0" cy="540000"/>
+          </a:xfrm>
+          <a:prstGeom prst="line">
+            <a:avLst/>
+          </a:prstGeom>
+          <a:ln w="28575">
+            <a:solidFill>
+              <a:schemeClr val="tx1"/>
+            </a:solidFill>
+          </a:ln>
+        </p:spPr>
+        <p:style>
+          <a:lnRef idx="1">
+            <a:schemeClr val="accent1"/>
+          </a:lnRef>
+          <a:fillRef idx="0">
+            <a:schemeClr val="accent1"/>
+          </a:fillRef>
+          <a:effectRef idx="0">
+            <a:schemeClr val="accent1"/>
+          </a:effectRef>
+          <a:fontRef idx="minor">
+            <a:schemeClr val="tx1"/>
+          </a:fontRef>
+        </p:style>
+      </p:cxnSp>
+      <p:cxnSp>
+        <p:nvCxnSpPr>
+          <p:cNvPr id="21" name="Straight Connector 20"/>
+          <p:cNvCxnSpPr/>
+          <p:nvPr/>
+        </p:nvCxnSpPr>
+        <p:spPr>
+          <a:xfrm flipH="1" flipV="1">
+            <a:off x="6810280" y="3517368"/>
+            <a:ext cx="468000" cy="270000"/>
+          </a:xfrm>
+          <a:prstGeom prst="line">
+            <a:avLst/>
+          </a:prstGeom>
+          <a:ln w="28575">
+            <a:solidFill>
+              <a:schemeClr val="tx1"/>
+            </a:solidFill>
+          </a:ln>
+        </p:spPr>
+        <p:style>
+          <a:lnRef idx="1">
+            <a:schemeClr val="accent1"/>
+          </a:lnRef>
+          <a:fillRef idx="0">
+            <a:schemeClr val="accent1"/>
+          </a:fillRef>
+          <a:effectRef idx="0">
+            <a:schemeClr val="accent1"/>
+          </a:effectRef>
+          <a:fontRef idx="minor">
+            <a:schemeClr val="tx1"/>
+          </a:fontRef>
+        </p:style>
+      </p:cxnSp>
+      <p:cxnSp>
+        <p:nvCxnSpPr>
+          <p:cNvPr id="24" name="Straight Connector 23"/>
+          <p:cNvCxnSpPr/>
+          <p:nvPr/>
+        </p:nvCxnSpPr>
+        <p:spPr>
+          <a:xfrm>
+            <a:off x="922784" y="2858091"/>
+            <a:ext cx="516868" cy="441342"/>
+          </a:xfrm>
+          <a:prstGeom prst="line">
+            <a:avLst/>
+          </a:prstGeom>
+          <a:ln w="28575">
+            <a:solidFill>
+              <a:schemeClr val="tx1"/>
+            </a:solidFill>
+            <a:headEnd type="none" w="med" len="med"/>
+            <a:tailEnd type="triangle" w="med" len="med"/>
+          </a:ln>
+        </p:spPr>
+        <p:style>
+          <a:lnRef idx="1">
+            <a:schemeClr val="accent1"/>
+          </a:lnRef>
+          <a:fillRef idx="0">
+            <a:schemeClr val="accent1"/>
+          </a:fillRef>
+          <a:effectRef idx="0">
+            <a:schemeClr val="accent1"/>
+          </a:effectRef>
+          <a:fontRef idx="minor">
+            <a:schemeClr val="tx1"/>
+          </a:fontRef>
+        </p:style>
+      </p:cxnSp>
+      <p:cxnSp>
+        <p:nvCxnSpPr>
+          <p:cNvPr id="27" name="Straight Connector 26"/>
+          <p:cNvCxnSpPr/>
+          <p:nvPr/>
+        </p:nvCxnSpPr>
+        <p:spPr>
+          <a:xfrm>
+            <a:off x="6085276" y="2985434"/>
+            <a:ext cx="516868" cy="441342"/>
+          </a:xfrm>
+          <a:prstGeom prst="line">
+            <a:avLst/>
+          </a:prstGeom>
+          <a:ln w="28575">
+            <a:solidFill>
+              <a:schemeClr val="tx1"/>
+            </a:solidFill>
+            <a:headEnd type="none" w="med" len="med"/>
+            <a:tailEnd type="triangle" w="med" len="med"/>
+          </a:ln>
+        </p:spPr>
+        <p:style>
+          <a:lnRef idx="1">
+            <a:schemeClr val="accent1"/>
+          </a:lnRef>
+          <a:fillRef idx="0">
+            <a:schemeClr val="accent1"/>
+          </a:fillRef>
+          <a:effectRef idx="0">
+            <a:schemeClr val="accent1"/>
+          </a:effectRef>
+          <a:fontRef idx="minor">
+            <a:schemeClr val="tx1"/>
+          </a:fontRef>
+        </p:style>
+      </p:cxnSp>
+      <p:cxnSp>
+        <p:nvCxnSpPr>
+          <p:cNvPr id="28" name="Straight Connector 27"/>
+          <p:cNvCxnSpPr/>
+          <p:nvPr/>
+        </p:nvCxnSpPr>
+        <p:spPr>
+          <a:xfrm flipV="1">
+            <a:off x="6606472" y="2869610"/>
+            <a:ext cx="530043" cy="324334"/>
+          </a:xfrm>
+          <a:prstGeom prst="line">
+            <a:avLst/>
+          </a:prstGeom>
+          <a:ln w="28575">
+            <a:solidFill>
+              <a:schemeClr val="tx1"/>
+            </a:solidFill>
+            <a:headEnd type="triangle" w="med" len="med"/>
+            <a:tailEnd type="triangle" w="med" len="med"/>
+          </a:ln>
+        </p:spPr>
+        <p:style>
+          <a:lnRef idx="1">
+            <a:schemeClr val="accent1"/>
+          </a:lnRef>
+          <a:fillRef idx="0">
+            <a:schemeClr val="accent1"/>
+          </a:fillRef>
+          <a:effectRef idx="0">
+            <a:schemeClr val="accent1"/>
+          </a:effectRef>
+          <a:fontRef idx="minor">
+            <a:schemeClr val="tx1"/>
+          </a:fontRef>
+        </p:style>
+      </p:cxnSp>
+      <p:cxnSp>
+        <p:nvCxnSpPr>
+          <p:cNvPr id="32" name="Straight Connector 31"/>
+          <p:cNvCxnSpPr/>
+          <p:nvPr/>
+        </p:nvCxnSpPr>
+        <p:spPr>
+          <a:xfrm flipH="1">
+            <a:off x="2987824" y="2594713"/>
+            <a:ext cx="635402" cy="370244"/>
+          </a:xfrm>
+          <a:prstGeom prst="line">
+            <a:avLst/>
+          </a:prstGeom>
+          <a:ln w="28575">
+            <a:solidFill>
+              <a:schemeClr val="tx1"/>
+            </a:solidFill>
+            <a:headEnd type="none" w="med" len="med"/>
+            <a:tailEnd type="triangle" w="med" len="med"/>
+          </a:ln>
+        </p:spPr>
+        <p:style>
+          <a:lnRef idx="1">
+            <a:schemeClr val="accent1"/>
+          </a:lnRef>
+          <a:fillRef idx="0">
+            <a:schemeClr val="accent1"/>
+          </a:fillRef>
+          <a:effectRef idx="0">
+            <a:schemeClr val="accent1"/>
+          </a:effectRef>
+          <a:fontRef idx="minor">
+            <a:schemeClr val="tx1"/>
+          </a:fontRef>
+        </p:style>
+      </p:cxnSp>
+      <p:cxnSp>
+        <p:nvCxnSpPr>
+          <p:cNvPr id="34" name="Straight Connector 33"/>
+          <p:cNvCxnSpPr/>
+          <p:nvPr/>
+        </p:nvCxnSpPr>
+        <p:spPr>
+          <a:xfrm flipH="1">
+            <a:off x="7134619" y="3056532"/>
+            <a:ext cx="635402" cy="370244"/>
+          </a:xfrm>
+          <a:prstGeom prst="line">
+            <a:avLst/>
+          </a:prstGeom>
+          <a:ln w="28575">
+            <a:solidFill>
+              <a:schemeClr val="tx1"/>
+            </a:solidFill>
+            <a:headEnd type="none" w="med" len="med"/>
+            <a:tailEnd type="triangle" w="med" len="med"/>
+          </a:ln>
+        </p:spPr>
+        <p:style>
+          <a:lnRef idx="1">
+            <a:schemeClr val="accent1"/>
+          </a:lnRef>
+          <a:fillRef idx="0">
+            <a:schemeClr val="accent1"/>
+          </a:fillRef>
+          <a:effectRef idx="0">
+            <a:schemeClr val="accent1"/>
+          </a:effectRef>
+          <a:fontRef idx="minor">
+            <a:schemeClr val="tx1"/>
+          </a:fontRef>
+        </p:style>
+      </p:cxnSp>
+      <p:sp>
+        <p:nvSpPr>
+          <p:cNvPr id="31" name="TextBox 30"/>
+          <p:cNvSpPr txBox="1"/>
+          <p:nvPr/>
+        </p:nvSpPr>
+        <p:spPr>
+          <a:xfrm>
+            <a:off x="179512" y="2581092"/>
+            <a:ext cx="1440160" cy="276999"/>
+          </a:xfrm>
+          <a:prstGeom prst="rect">
+            <a:avLst/>
+          </a:prstGeom>
+          <a:noFill/>
+        </p:spPr>
+        <p:txBody>
+          <a:bodyPr wrap="square" rtlCol="0">
+            <a:spAutoFit/>
+          </a:bodyPr>
+          <a:lstStyle/>
+          <a:p>
+            <a:r>
+              <a:rPr lang="en-IE" sz="1200" dirty="0" smtClean="0"/>
+              <a:t>Indenter / Stylus</a:t>
+            </a:r>
+            <a:endParaRPr lang="en-IE" sz="1200" dirty="0"/>
+          </a:p>
+        </p:txBody>
+      </p:sp>
+      <p:sp>
+        <p:nvSpPr>
+          <p:cNvPr id="36" name="TextBox 35"/>
+          <p:cNvSpPr txBox="1"/>
+          <p:nvPr/>
+        </p:nvSpPr>
+        <p:spPr>
+          <a:xfrm>
+            <a:off x="5506096" y="2754778"/>
+            <a:ext cx="1440160" cy="276999"/>
+          </a:xfrm>
+          <a:prstGeom prst="rect">
+            <a:avLst/>
+          </a:prstGeom>
+          <a:noFill/>
+        </p:spPr>
+        <p:txBody>
+          <a:bodyPr wrap="square" rtlCol="0">
+            <a:spAutoFit/>
+          </a:bodyPr>
+          <a:lstStyle/>
+          <a:p>
+            <a:r>
+              <a:rPr lang="en-IE" sz="1200" dirty="0" smtClean="0"/>
+              <a:t>Indenter</a:t>
+            </a:r>
+            <a:endParaRPr lang="en-IE" sz="1200" dirty="0"/>
+          </a:p>
+        </p:txBody>
+      </p:sp>
+      <p:sp>
+        <p:nvSpPr>
+          <p:cNvPr id="37" name="TextBox 36"/>
+          <p:cNvSpPr txBox="1"/>
+          <p:nvPr/>
+        </p:nvSpPr>
+        <p:spPr>
+          <a:xfrm>
+            <a:off x="3263186" y="2169982"/>
+            <a:ext cx="1440160" cy="461665"/>
+          </a:xfrm>
+          <a:prstGeom prst="rect">
+            <a:avLst/>
+          </a:prstGeom>
+          <a:noFill/>
+        </p:spPr>
+        <p:txBody>
+          <a:bodyPr wrap="square" rtlCol="0">
+            <a:spAutoFit/>
+          </a:bodyPr>
+          <a:lstStyle/>
+          <a:p>
+            <a:r>
+              <a:rPr lang="en-IE" sz="1200" dirty="0" smtClean="0"/>
+              <a:t>Chipped coating segment</a:t>
+            </a:r>
+            <a:endParaRPr lang="en-IE" sz="1200" dirty="0"/>
+          </a:p>
+        </p:txBody>
+      </p:sp>
+      <p:sp>
+        <p:nvSpPr>
+          <p:cNvPr id="39" name="TextBox 38"/>
+          <p:cNvSpPr txBox="1"/>
+          <p:nvPr/>
+        </p:nvSpPr>
+        <p:spPr>
+          <a:xfrm>
+            <a:off x="7452320" y="2628583"/>
+            <a:ext cx="1440160" cy="461665"/>
+          </a:xfrm>
+          <a:prstGeom prst="rect">
+            <a:avLst/>
+          </a:prstGeom>
+          <a:noFill/>
+        </p:spPr>
+        <p:txBody>
+          <a:bodyPr wrap="square" rtlCol="0">
+            <a:spAutoFit/>
+          </a:bodyPr>
+          <a:lstStyle/>
+          <a:p>
+            <a:r>
+              <a:rPr lang="en-IE" sz="1200" dirty="0" smtClean="0"/>
+              <a:t>Chipped coating segment</a:t>
+            </a:r>
+            <a:endParaRPr lang="en-IE" sz="1200" dirty="0"/>
+          </a:p>
+        </p:txBody>
+      </p:sp>
+      <p:cxnSp>
+        <p:nvCxnSpPr>
+          <p:cNvPr id="40" name="Straight Connector 39"/>
+          <p:cNvCxnSpPr/>
+          <p:nvPr/>
+        </p:nvCxnSpPr>
+        <p:spPr>
+          <a:xfrm>
+            <a:off x="2124329" y="2456660"/>
+            <a:ext cx="57303" cy="424928"/>
+          </a:xfrm>
+          <a:prstGeom prst="line">
+            <a:avLst/>
+          </a:prstGeom>
+          <a:ln w="28575">
+            <a:solidFill>
+              <a:schemeClr val="tx1"/>
+            </a:solidFill>
+            <a:headEnd type="none" w="med" len="med"/>
+            <a:tailEnd type="triangle" w="med" len="med"/>
+          </a:ln>
+        </p:spPr>
+        <p:style>
+          <a:lnRef idx="1">
+            <a:schemeClr val="accent1"/>
+          </a:lnRef>
+          <a:fillRef idx="0">
+            <a:schemeClr val="accent1"/>
+          </a:fillRef>
+          <a:effectRef idx="0">
+            <a:schemeClr val="accent1"/>
+          </a:effectRef>
+          <a:fontRef idx="minor">
+            <a:schemeClr val="tx1"/>
+          </a:fontRef>
+        </p:style>
+      </p:cxnSp>
+      <p:sp>
+        <p:nvSpPr>
+          <p:cNvPr id="41" name="TextBox 40"/>
+          <p:cNvSpPr txBox="1"/>
+          <p:nvPr/>
+        </p:nvSpPr>
+        <p:spPr>
+          <a:xfrm>
+            <a:off x="1578742" y="2201107"/>
+            <a:ext cx="1440160" cy="276999"/>
+          </a:xfrm>
+          <a:prstGeom prst="rect">
+            <a:avLst/>
+          </a:prstGeom>
+          <a:noFill/>
+        </p:spPr>
+        <p:txBody>
+          <a:bodyPr wrap="square" rtlCol="0">
+            <a:spAutoFit/>
+          </a:bodyPr>
+          <a:lstStyle/>
+          <a:p>
+            <a:r>
+              <a:rPr lang="en-IE" sz="1200" dirty="0" smtClean="0"/>
+              <a:t>Radial crack</a:t>
+            </a:r>
+            <a:endParaRPr lang="en-IE" sz="1200" dirty="0"/>
+          </a:p>
+        </p:txBody>
+      </p:sp>
+      <p:cxnSp>
+        <p:nvCxnSpPr>
+          <p:cNvPr id="42" name="Straight Connector 41"/>
+          <p:cNvCxnSpPr/>
+          <p:nvPr/>
+        </p:nvCxnSpPr>
+        <p:spPr>
+          <a:xfrm>
+            <a:off x="6010152" y="2409855"/>
+            <a:ext cx="516868" cy="441342"/>
+          </a:xfrm>
+          <a:prstGeom prst="line">
+            <a:avLst/>
+          </a:prstGeom>
+          <a:ln w="28575">
+            <a:solidFill>
+              <a:schemeClr val="tx1"/>
+            </a:solidFill>
+            <a:headEnd type="none" w="med" len="med"/>
+            <a:tailEnd type="triangle" w="med" len="med"/>
+          </a:ln>
+        </p:spPr>
+        <p:style>
+          <a:lnRef idx="1">
+            <a:schemeClr val="accent1"/>
+          </a:lnRef>
+          <a:fillRef idx="0">
+            <a:schemeClr val="accent1"/>
+          </a:fillRef>
+          <a:effectRef idx="0">
+            <a:schemeClr val="accent1"/>
+          </a:effectRef>
+          <a:fontRef idx="minor">
+            <a:schemeClr val="tx1"/>
+          </a:fontRef>
+        </p:style>
+      </p:cxnSp>
+      <p:sp>
+        <p:nvSpPr>
+          <p:cNvPr id="43" name="TextBox 42"/>
+          <p:cNvSpPr txBox="1"/>
+          <p:nvPr/>
+        </p:nvSpPr>
+        <p:spPr>
+          <a:xfrm>
+            <a:off x="5266880" y="2132856"/>
+            <a:ext cx="1440160" cy="276999"/>
+          </a:xfrm>
+          <a:prstGeom prst="rect">
+            <a:avLst/>
+          </a:prstGeom>
+          <a:noFill/>
+        </p:spPr>
+        <p:txBody>
+          <a:bodyPr wrap="square" rtlCol="0">
+            <a:spAutoFit/>
+          </a:bodyPr>
+          <a:lstStyle/>
+          <a:p>
+            <a:r>
+              <a:rPr lang="en-IE" sz="1200" dirty="0" smtClean="0"/>
+              <a:t>Radial crack</a:t>
+            </a:r>
+            <a:endParaRPr lang="en-IE" sz="1200" dirty="0"/>
+          </a:p>
+        </p:txBody>
+      </p:sp>
+      <p:sp>
+        <p:nvSpPr>
+          <p:cNvPr id="44" name="TextBox 43"/>
+          <p:cNvSpPr txBox="1"/>
+          <p:nvPr/>
+        </p:nvSpPr>
+        <p:spPr>
+          <a:xfrm>
+            <a:off x="1802184" y="3224009"/>
+            <a:ext cx="1440160" cy="276999"/>
+          </a:xfrm>
+          <a:prstGeom prst="rect">
+            <a:avLst/>
+          </a:prstGeom>
+          <a:noFill/>
+        </p:spPr>
+        <p:txBody>
+          <a:bodyPr wrap="square" rtlCol="0">
+            <a:spAutoFit/>
+          </a:bodyPr>
+          <a:lstStyle/>
+          <a:p>
+            <a:pPr algn="ctr"/>
+            <a:r>
+              <a:rPr lang="en-IE" sz="1200" dirty="0" smtClean="0"/>
+              <a:t>L</a:t>
+            </a:r>
+            <a:endParaRPr lang="en-IE" sz="1200" dirty="0"/>
+          </a:p>
+        </p:txBody>
+      </p:sp>
+      <p:cxnSp>
+        <p:nvCxnSpPr>
+          <p:cNvPr id="45" name="Straight Connector 44"/>
+          <p:cNvCxnSpPr/>
+          <p:nvPr/>
+        </p:nvCxnSpPr>
+        <p:spPr>
+          <a:xfrm>
+            <a:off x="1619672" y="3296315"/>
+            <a:ext cx="1805184" cy="0"/>
+          </a:xfrm>
+          <a:prstGeom prst="line">
+            <a:avLst/>
+          </a:prstGeom>
+          <a:ln w="28575">
+            <a:solidFill>
+              <a:schemeClr val="tx1"/>
+            </a:solidFill>
+            <a:headEnd type="triangle" w="med" len="med"/>
+            <a:tailEnd type="triangle" w="med" len="med"/>
+          </a:ln>
+        </p:spPr>
+        <p:style>
+          <a:lnRef idx="1">
+            <a:schemeClr val="accent1"/>
+          </a:lnRef>
+          <a:fillRef idx="0">
+            <a:schemeClr val="accent1"/>
+          </a:fillRef>
+          <a:effectRef idx="0">
+            <a:schemeClr val="accent1"/>
+          </a:effectRef>
+          <a:fontRef idx="minor">
+            <a:schemeClr val="tx1"/>
+          </a:fontRef>
+        </p:style>
+      </p:cxnSp>
+      <p:sp>
+        <p:nvSpPr>
+          <p:cNvPr id="47" name="TextBox 46"/>
+          <p:cNvSpPr txBox="1"/>
+          <p:nvPr/>
+        </p:nvSpPr>
+        <p:spPr>
+          <a:xfrm rot="19800000">
+            <a:off x="6198953" y="2964949"/>
+            <a:ext cx="1440160" cy="276999"/>
+          </a:xfrm>
+          <a:prstGeom prst="rect">
+            <a:avLst/>
+          </a:prstGeom>
+          <a:noFill/>
+        </p:spPr>
+        <p:txBody>
+          <a:bodyPr wrap="square" rtlCol="0">
+            <a:spAutoFit/>
+          </a:bodyPr>
+          <a:lstStyle/>
+          <a:p>
+            <a:pPr algn="ctr"/>
+            <a:r>
+              <a:rPr lang="en-IE" sz="1200" dirty="0" smtClean="0"/>
+              <a:t>L</a:t>
+            </a:r>
+            <a:endParaRPr lang="en-IE" sz="1200" dirty="0"/>
+          </a:p>
+        </p:txBody>
+      </p:sp>
+      <p:sp>
+        <p:nvSpPr>
+          <p:cNvPr id="35" name="Arc 34"/>
+          <p:cNvSpPr/>
+          <p:nvPr/>
+        </p:nvSpPr>
+        <p:spPr>
+          <a:xfrm>
+            <a:off x="1547664" y="2891162"/>
+            <a:ext cx="396044" cy="424302"/>
+          </a:xfrm>
+          <a:prstGeom prst="arc">
+            <a:avLst>
+              <a:gd name="adj1" fmla="val 19396671"/>
+              <a:gd name="adj2" fmla="val 353118"/>
+            </a:avLst>
+          </a:prstGeom>
+          <a:ln w="28575">
+            <a:solidFill>
+              <a:schemeClr val="tx1"/>
+            </a:solidFill>
+          </a:ln>
+        </p:spPr>
+        <p:style>
+          <a:lnRef idx="1">
+            <a:schemeClr val="accent1"/>
+          </a:lnRef>
+          <a:fillRef idx="0">
+            <a:schemeClr val="accent1"/>
+          </a:fillRef>
+          <a:effectRef idx="0">
+            <a:schemeClr val="accent1"/>
+          </a:effectRef>
+          <a:fontRef idx="minor">
+            <a:schemeClr val="tx1"/>
+          </a:fontRef>
+        </p:style>
+        <p:txBody>
+          <a:bodyPr rtlCol="0" anchor="ctr"/>
+          <a:lstStyle/>
+          <a:p>
+            <a:pPr algn="ctr"/>
+            <a:endParaRPr lang="en-IE"/>
+          </a:p>
+        </p:txBody>
+      </p:sp>
+      <p:sp>
+        <p:nvSpPr>
+          <p:cNvPr id="49" name="Arc 48"/>
+          <p:cNvSpPr/>
+          <p:nvPr/>
+        </p:nvSpPr>
+        <p:spPr>
+          <a:xfrm rot="18000000">
+            <a:off x="6502343" y="3003923"/>
+            <a:ext cx="282865" cy="255533"/>
+          </a:xfrm>
+          <a:prstGeom prst="arc">
+            <a:avLst>
+              <a:gd name="adj1" fmla="val 18619117"/>
+              <a:gd name="adj2" fmla="val 2604193"/>
+            </a:avLst>
+          </a:prstGeom>
+          <a:ln w="28575">
+            <a:solidFill>
+              <a:schemeClr val="tx1"/>
+            </a:solidFill>
+          </a:ln>
+        </p:spPr>
+        <p:style>
+          <a:lnRef idx="1">
+            <a:schemeClr val="accent1"/>
+          </a:lnRef>
+          <a:fillRef idx="0">
+            <a:schemeClr val="accent1"/>
+          </a:fillRef>
+          <a:effectRef idx="0">
+            <a:schemeClr val="accent1"/>
+          </a:effectRef>
+          <a:fontRef idx="minor">
+            <a:schemeClr val="tx1"/>
+          </a:fontRef>
+        </p:style>
+        <p:txBody>
+          <a:bodyPr rtlCol="0" anchor="ctr"/>
+          <a:lstStyle/>
+          <a:p>
+            <a:pPr algn="ctr"/>
+            <a:endParaRPr lang="en-IE"/>
+          </a:p>
+        </p:txBody>
+      </p:sp>
+      <p:sp>
+        <p:nvSpPr>
+          <p:cNvPr id="50" name="TextBox 49"/>
+          <p:cNvSpPr txBox="1"/>
+          <p:nvPr/>
+        </p:nvSpPr>
+        <p:spPr>
+          <a:xfrm>
+            <a:off x="1404249" y="2872332"/>
+            <a:ext cx="1440160" cy="276999"/>
+          </a:xfrm>
+          <a:prstGeom prst="rect">
+            <a:avLst/>
+          </a:prstGeom>
+          <a:noFill/>
+        </p:spPr>
+        <p:txBody>
+          <a:bodyPr wrap="square" rtlCol="0">
+            <a:spAutoFit/>
+          </a:bodyPr>
+          <a:lstStyle/>
+          <a:p>
+            <a:pPr algn="ctr"/>
+            <a:r>
+              <a:rPr lang="el-GR" sz="1200" dirty="0" smtClean="0"/>
+              <a:t>β</a:t>
+            </a:r>
+            <a:endParaRPr lang="en-IE" sz="1200" dirty="0"/>
+          </a:p>
+        </p:txBody>
+      </p:sp>
+      <p:sp>
+        <p:nvSpPr>
+          <p:cNvPr id="51" name="TextBox 50"/>
+          <p:cNvSpPr txBox="1"/>
+          <p:nvPr/>
+        </p:nvSpPr>
+        <p:spPr>
+          <a:xfrm>
+            <a:off x="6012160" y="2733628"/>
+            <a:ext cx="1440160" cy="276999"/>
+          </a:xfrm>
+          <a:prstGeom prst="rect">
+            <a:avLst/>
+          </a:prstGeom>
+          <a:noFill/>
+        </p:spPr>
+        <p:txBody>
+          <a:bodyPr wrap="square" rtlCol="0">
+            <a:spAutoFit/>
+          </a:bodyPr>
+          <a:lstStyle/>
+          <a:p>
+            <a:pPr algn="ctr"/>
+            <a:r>
+              <a:rPr lang="el-GR" sz="1200" dirty="0" smtClean="0"/>
+              <a:t>β</a:t>
+            </a:r>
+            <a:endParaRPr lang="en-IE" sz="1200" dirty="0"/>
+          </a:p>
+        </p:txBody>
+      </p:sp>
+      <p:cxnSp>
+        <p:nvCxnSpPr>
+          <p:cNvPr id="52" name="Straight Connector 51"/>
+          <p:cNvCxnSpPr/>
+          <p:nvPr/>
+        </p:nvCxnSpPr>
+        <p:spPr>
+          <a:xfrm>
+            <a:off x="1451010" y="2898882"/>
+            <a:ext cx="0" cy="220671"/>
+          </a:xfrm>
+          <a:prstGeom prst="line">
+            <a:avLst/>
+          </a:prstGeom>
+          <a:ln w="28575">
+            <a:solidFill>
+              <a:schemeClr val="tx1"/>
+            </a:solidFill>
+            <a:headEnd type="none" w="med" len="med"/>
+            <a:tailEnd type="triangle" w="med" len="med"/>
+          </a:ln>
+        </p:spPr>
+        <p:style>
+          <a:lnRef idx="1">
+            <a:schemeClr val="accent1"/>
+          </a:lnRef>
+          <a:fillRef idx="0">
+            <a:schemeClr val="accent1"/>
+          </a:fillRef>
+          <a:effectRef idx="0">
+            <a:schemeClr val="accent1"/>
+          </a:effectRef>
+          <a:fontRef idx="minor">
+            <a:schemeClr val="tx1"/>
+          </a:fontRef>
+        </p:style>
+      </p:cxnSp>
+      <p:cxnSp>
+        <p:nvCxnSpPr>
+          <p:cNvPr id="54" name="Straight Connector 53"/>
+          <p:cNvCxnSpPr/>
+          <p:nvPr/>
+        </p:nvCxnSpPr>
+        <p:spPr>
+          <a:xfrm flipV="1">
+            <a:off x="1444046" y="3459779"/>
+            <a:ext cx="0" cy="220671"/>
+          </a:xfrm>
+          <a:prstGeom prst="line">
+            <a:avLst/>
+          </a:prstGeom>
+          <a:ln w="28575">
+            <a:solidFill>
+              <a:schemeClr val="tx1"/>
+            </a:solidFill>
+            <a:headEnd type="none" w="med" len="med"/>
+            <a:tailEnd type="triangle" w="med" len="med"/>
+          </a:ln>
+        </p:spPr>
+        <p:style>
+          <a:lnRef idx="1">
+            <a:schemeClr val="accent1"/>
+          </a:lnRef>
+          <a:fillRef idx="0">
+            <a:schemeClr val="accent1"/>
+          </a:fillRef>
+          <a:effectRef idx="0">
+            <a:schemeClr val="accent1"/>
+          </a:effectRef>
+          <a:fontRef idx="minor">
+            <a:schemeClr val="tx1"/>
+          </a:fontRef>
+        </p:style>
+      </p:cxnSp>
+      <p:sp>
+        <p:nvSpPr>
+          <p:cNvPr id="55" name="TextBox 54"/>
+          <p:cNvSpPr txBox="1"/>
+          <p:nvPr/>
+        </p:nvSpPr>
+        <p:spPr>
+          <a:xfrm>
+            <a:off x="736144" y="3658301"/>
+            <a:ext cx="1440160" cy="276999"/>
+          </a:xfrm>
+          <a:prstGeom prst="rect">
+            <a:avLst/>
+          </a:prstGeom>
+          <a:noFill/>
+        </p:spPr>
+        <p:txBody>
+          <a:bodyPr wrap="square" rtlCol="0">
+            <a:spAutoFit/>
+          </a:bodyPr>
+          <a:lstStyle/>
+          <a:p>
+            <a:pPr algn="ctr"/>
+            <a:r>
+              <a:rPr lang="en-IE" sz="1200" dirty="0" smtClean="0"/>
+              <a:t>2a</a:t>
+            </a:r>
+            <a:endParaRPr lang="en-IE" sz="1200" dirty="0"/>
+          </a:p>
+        </p:txBody>
+      </p:sp>
+      <p:sp>
+        <p:nvSpPr>
+          <p:cNvPr id="56" name="TextBox 55"/>
+          <p:cNvSpPr txBox="1"/>
+          <p:nvPr/>
+        </p:nvSpPr>
+        <p:spPr>
+          <a:xfrm>
+            <a:off x="5292080" y="3548216"/>
+            <a:ext cx="1440160" cy="276999"/>
+          </a:xfrm>
+          <a:prstGeom prst="rect">
+            <a:avLst/>
+          </a:prstGeom>
+          <a:noFill/>
+        </p:spPr>
+        <p:txBody>
+          <a:bodyPr wrap="square" rtlCol="0">
+            <a:spAutoFit/>
+          </a:bodyPr>
+          <a:lstStyle/>
+          <a:p>
+            <a:pPr algn="ctr"/>
+            <a:r>
+              <a:rPr lang="en-IE" sz="1200" dirty="0" smtClean="0"/>
+              <a:t>2a</a:t>
+            </a:r>
+            <a:endParaRPr lang="en-IE" sz="1200" dirty="0"/>
+          </a:p>
+        </p:txBody>
+      </p:sp>
+      <p:cxnSp>
+        <p:nvCxnSpPr>
+          <p:cNvPr id="58" name="Straight Connector 57"/>
+          <p:cNvCxnSpPr/>
+          <p:nvPr/>
+        </p:nvCxnSpPr>
+        <p:spPr>
+          <a:xfrm>
+            <a:off x="6051284" y="3462760"/>
+            <a:ext cx="216000" cy="359276"/>
+          </a:xfrm>
+          <a:prstGeom prst="line">
+            <a:avLst/>
+          </a:prstGeom>
+          <a:ln w="28575">
+            <a:solidFill>
+              <a:schemeClr val="tx1"/>
+            </a:solidFill>
+            <a:headEnd type="triangle" w="med" len="med"/>
+            <a:tailEnd type="triangle" w="med" len="med"/>
+          </a:ln>
+        </p:spPr>
+        <p:style>
+          <a:lnRef idx="1">
+            <a:schemeClr val="accent1"/>
+          </a:lnRef>
+          <a:fillRef idx="0">
+            <a:schemeClr val="accent1"/>
+          </a:fillRef>
+          <a:effectRef idx="0">
+            <a:schemeClr val="accent1"/>
+          </a:effectRef>
+          <a:fontRef idx="minor">
+            <a:schemeClr val="tx1"/>
+          </a:fontRef>
+        </p:style>
+      </p:cxnSp>
+      <p:cxnSp>
+        <p:nvCxnSpPr>
+          <p:cNvPr id="53" name="Straight Connector 52"/>
+          <p:cNvCxnSpPr/>
+          <p:nvPr/>
+        </p:nvCxnSpPr>
+        <p:spPr>
+          <a:xfrm flipH="1">
+            <a:off x="5986960" y="3158065"/>
+            <a:ext cx="601168" cy="330707"/>
+          </a:xfrm>
+          <a:prstGeom prst="line">
+            <a:avLst/>
+          </a:prstGeom>
+          <a:ln>
+            <a:solidFill>
+              <a:schemeClr val="tx1"/>
+            </a:solidFill>
+            <a:prstDash val="dash"/>
+          </a:ln>
+        </p:spPr>
+        <p:style>
+          <a:lnRef idx="1">
+            <a:schemeClr val="accent1"/>
+          </a:lnRef>
+          <a:fillRef idx="0">
+            <a:schemeClr val="accent1"/>
+          </a:fillRef>
+          <a:effectRef idx="0">
+            <a:schemeClr val="accent1"/>
+          </a:effectRef>
+          <a:fontRef idx="minor">
+            <a:schemeClr val="tx1"/>
+          </a:fontRef>
+        </p:style>
+      </p:cxnSp>
+      <p:cxnSp>
+        <p:nvCxnSpPr>
+          <p:cNvPr id="61" name="Straight Connector 60"/>
+          <p:cNvCxnSpPr/>
+          <p:nvPr/>
+        </p:nvCxnSpPr>
+        <p:spPr>
+          <a:xfrm flipH="1">
+            <a:off x="6205749" y="3517368"/>
+            <a:ext cx="601168" cy="330707"/>
+          </a:xfrm>
+          <a:prstGeom prst="line">
+            <a:avLst/>
+          </a:prstGeom>
+          <a:ln>
+            <a:solidFill>
+              <a:schemeClr val="tx1"/>
+            </a:solidFill>
+            <a:prstDash val="dash"/>
+          </a:ln>
+        </p:spPr>
+        <p:style>
+          <a:lnRef idx="1">
+            <a:schemeClr val="accent1"/>
+          </a:lnRef>
+          <a:fillRef idx="0">
+            <a:schemeClr val="accent1"/>
+          </a:fillRef>
+          <a:effectRef idx="0">
+            <a:schemeClr val="accent1"/>
+          </a:effectRef>
+          <a:fontRef idx="minor">
+            <a:schemeClr val="tx1"/>
+          </a:fontRef>
+        </p:style>
+      </p:cxnSp>
+      <p:sp>
+        <p:nvSpPr>
+          <p:cNvPr id="60" name="TextBox 59"/>
+          <p:cNvSpPr txBox="1"/>
+          <p:nvPr/>
+        </p:nvSpPr>
+        <p:spPr>
+          <a:xfrm>
+            <a:off x="179512" y="4376059"/>
+            <a:ext cx="4124048" cy="646331"/>
+          </a:xfrm>
+          <a:prstGeom prst="rect">
+            <a:avLst/>
+          </a:prstGeom>
+          <a:noFill/>
+        </p:spPr>
+        <p:txBody>
+          <a:bodyPr wrap="square" rtlCol="0">
+            <a:spAutoFit/>
+          </a:bodyPr>
+          <a:lstStyle/>
+          <a:p>
+            <a:pPr algn="ctr"/>
+            <a:r>
+              <a:rPr lang="en-IE" i="1" u="sng" dirty="0" smtClean="0"/>
+              <a:t>Sketch of the geometry of a chipped segment of coating, in case of scratch test.</a:t>
+            </a:r>
+            <a:endParaRPr lang="en-IE" i="1" u="sng" dirty="0"/>
+          </a:p>
+        </p:txBody>
+      </p:sp>
+      <p:sp>
+        <p:nvSpPr>
+          <p:cNvPr id="64" name="TextBox 63"/>
+          <p:cNvSpPr txBox="1"/>
+          <p:nvPr/>
+        </p:nvSpPr>
+        <p:spPr>
+          <a:xfrm>
+            <a:off x="4572000" y="4376059"/>
+            <a:ext cx="4572000" cy="646331"/>
+          </a:xfrm>
+          <a:prstGeom prst="rect">
+            <a:avLst/>
+          </a:prstGeom>
+          <a:noFill/>
+        </p:spPr>
+        <p:txBody>
+          <a:bodyPr wrap="square" rtlCol="0">
+            <a:spAutoFit/>
+          </a:bodyPr>
+          <a:lstStyle/>
+          <a:p>
+            <a:pPr algn="ctr"/>
+            <a:r>
+              <a:rPr lang="en-IE" i="1" u="sng" dirty="0" smtClean="0"/>
+              <a:t>Sketch of the geometry of a chipped segment of coating, in case of indentation test.</a:t>
+            </a:r>
+            <a:endParaRPr lang="en-IE" i="1" u="sng" dirty="0"/>
+          </a:p>
+        </p:txBody>
+      </p:sp>
+      <p:sp>
+        <p:nvSpPr>
+          <p:cNvPr id="3" name="TextBox 2"/>
+          <p:cNvSpPr txBox="1"/>
+          <p:nvPr/>
+        </p:nvSpPr>
+        <p:spPr>
+          <a:xfrm>
+            <a:off x="1234578" y="332656"/>
+            <a:ext cx="6674844" cy="1231106"/>
+          </a:xfrm>
+          <a:prstGeom prst="rect">
+            <a:avLst/>
+          </a:prstGeom>
+          <a:noFill/>
+        </p:spPr>
+        <p:txBody>
+          <a:bodyPr wrap="square" rtlCol="0">
+            <a:spAutoFit/>
+          </a:bodyPr>
+          <a:lstStyle/>
+          <a:p>
+            <a:pPr algn="ctr"/>
+            <a:r>
+              <a:rPr lang="en-IE" b="1" u="sng" dirty="0" smtClean="0"/>
+              <a:t>Model of den </a:t>
+            </a:r>
+            <a:r>
+              <a:rPr lang="en-IE" b="1" u="sng" dirty="0" err="1" smtClean="0"/>
+              <a:t>Toonder</a:t>
+            </a:r>
+            <a:endParaRPr lang="en-IE" b="1" u="sng" dirty="0"/>
+          </a:p>
+          <a:p>
+            <a:pPr marL="285750" indent="-285750" algn="ctr">
+              <a:buFont typeface="Wingdings" panose="05000000000000000000" pitchFamily="2" charset="2"/>
+              <a:buChar char="§"/>
+            </a:pPr>
+            <a:r>
+              <a:rPr lang="en-IE" sz="1400" i="1" dirty="0"/>
+              <a:t>den </a:t>
+            </a:r>
+            <a:r>
+              <a:rPr lang="en-IE" sz="1400" i="1" dirty="0" err="1"/>
+              <a:t>Toonder</a:t>
+            </a:r>
+            <a:r>
+              <a:rPr lang="en-IE" sz="1400" i="1" dirty="0"/>
+              <a:t> J. et al., "Fracture toughness and adhesion energy of sol-gel coatings on glass", J. Mater. res., Vol. 17, No 1, Jan 2002</a:t>
+            </a:r>
+            <a:r>
+              <a:rPr lang="en-IE" sz="1400" i="1" dirty="0" smtClean="0"/>
+              <a:t>.</a:t>
+            </a:r>
+          </a:p>
+          <a:p>
+            <a:pPr marL="285750" indent="-285750" algn="ctr">
+              <a:buFont typeface="Wingdings" panose="05000000000000000000" pitchFamily="2" charset="2"/>
+              <a:buChar char="§"/>
+            </a:pPr>
+            <a:r>
+              <a:rPr lang="en-IE" sz="1400" i="1" dirty="0"/>
+              <a:t>Bull S.J. and </a:t>
+            </a:r>
+            <a:r>
+              <a:rPr lang="en-IE" sz="1400" i="1" dirty="0" err="1"/>
+              <a:t>Berasetegui</a:t>
+            </a:r>
+            <a:r>
+              <a:rPr lang="en-IE" sz="1400" i="1" dirty="0"/>
+              <a:t> E.G., "An overview of the potential of quantitative coating adhesion measurement by scratch testing", Tribology Intern., 39, 2009, pp. 99-114.</a:t>
+            </a:r>
+          </a:p>
+        </p:txBody>
+      </p:sp>
+      <p:cxnSp>
+        <p:nvCxnSpPr>
+          <p:cNvPr id="46" name="Straight Connector 45"/>
+          <p:cNvCxnSpPr/>
+          <p:nvPr/>
+        </p:nvCxnSpPr>
+        <p:spPr>
+          <a:xfrm flipV="1">
+            <a:off x="1494009" y="3120013"/>
+            <a:ext cx="1853855" cy="0"/>
+          </a:xfrm>
+          <a:prstGeom prst="line">
+            <a:avLst/>
+          </a:prstGeom>
+          <a:ln w="19050">
+            <a:solidFill>
+              <a:schemeClr val="tx1"/>
+            </a:solidFill>
+            <a:prstDash val="dash"/>
+            <a:headEnd type="none" w="med" len="med"/>
+            <a:tailEnd type="none" w="med" len="med"/>
+          </a:ln>
+        </p:spPr>
+        <p:style>
+          <a:lnRef idx="1">
+            <a:schemeClr val="accent1"/>
+          </a:lnRef>
+          <a:fillRef idx="0">
+            <a:schemeClr val="accent1"/>
+          </a:fillRef>
+          <a:effectRef idx="0">
+            <a:schemeClr val="accent1"/>
+          </a:effectRef>
+          <a:fontRef idx="minor">
+            <a:schemeClr val="tx1"/>
+          </a:fontRef>
+        </p:style>
+      </p:cxnSp>
+      <p:cxnSp>
+        <p:nvCxnSpPr>
+          <p:cNvPr id="48" name="Straight Connector 47"/>
+          <p:cNvCxnSpPr/>
+          <p:nvPr/>
+        </p:nvCxnSpPr>
+        <p:spPr>
+          <a:xfrm>
+            <a:off x="542680" y="2456660"/>
+            <a:ext cx="713825" cy="0"/>
+          </a:xfrm>
+          <a:prstGeom prst="line">
+            <a:avLst/>
+          </a:prstGeom>
+          <a:ln w="38100">
+            <a:solidFill>
+              <a:schemeClr val="tx1"/>
+            </a:solidFill>
+            <a:headEnd type="none" w="med" len="med"/>
+            <a:tailEnd type="triangle" w="med" len="med"/>
+          </a:ln>
+        </p:spPr>
+        <p:style>
+          <a:lnRef idx="1">
+            <a:schemeClr val="accent1"/>
+          </a:lnRef>
+          <a:fillRef idx="0">
+            <a:schemeClr val="accent1"/>
+          </a:fillRef>
+          <a:effectRef idx="0">
+            <a:schemeClr val="accent1"/>
+          </a:effectRef>
+          <a:fontRef idx="minor">
+            <a:schemeClr val="tx1"/>
+          </a:fontRef>
+        </p:style>
+      </p:cxnSp>
+      <p:sp>
+        <p:nvSpPr>
+          <p:cNvPr id="57" name="TextBox 56"/>
+          <p:cNvSpPr txBox="1"/>
+          <p:nvPr/>
+        </p:nvSpPr>
+        <p:spPr>
+          <a:xfrm>
+            <a:off x="179512" y="2180681"/>
+            <a:ext cx="1440160" cy="276999"/>
+          </a:xfrm>
+          <a:prstGeom prst="rect">
+            <a:avLst/>
+          </a:prstGeom>
+          <a:noFill/>
+        </p:spPr>
+        <p:txBody>
+          <a:bodyPr wrap="square" rtlCol="0">
+            <a:spAutoFit/>
+          </a:bodyPr>
+          <a:lstStyle/>
+          <a:p>
+            <a:pPr algn="ctr"/>
+            <a:r>
+              <a:rPr lang="en-IE" sz="1200" dirty="0" smtClean="0"/>
+              <a:t>Scratch direction</a:t>
+            </a:r>
+            <a:endParaRPr lang="en-IE" sz="1200" dirty="0"/>
+          </a:p>
+        </p:txBody>
+      </p:sp>
+      <p:sp>
+        <p:nvSpPr>
+          <p:cNvPr id="59" name="TextBox 58"/>
+          <p:cNvSpPr txBox="1"/>
+          <p:nvPr/>
+        </p:nvSpPr>
+        <p:spPr>
+          <a:xfrm>
+            <a:off x="362805" y="3852662"/>
+            <a:ext cx="1440160" cy="276999"/>
+          </a:xfrm>
+          <a:prstGeom prst="rect">
+            <a:avLst/>
+          </a:prstGeom>
+          <a:noFill/>
+        </p:spPr>
+        <p:txBody>
+          <a:bodyPr wrap="square" rtlCol="0">
+            <a:spAutoFit/>
+          </a:bodyPr>
+          <a:lstStyle/>
+          <a:p>
+            <a:r>
+              <a:rPr lang="en-IE" sz="1200" dirty="0" smtClean="0"/>
+              <a:t>a)</a:t>
+            </a:r>
+            <a:endParaRPr lang="en-IE" sz="1200" dirty="0"/>
+          </a:p>
+        </p:txBody>
+      </p:sp>
+      <p:sp>
+        <p:nvSpPr>
+          <p:cNvPr id="62" name="TextBox 61"/>
+          <p:cNvSpPr txBox="1"/>
+          <p:nvPr/>
+        </p:nvSpPr>
+        <p:spPr>
+          <a:xfrm>
+            <a:off x="4903550" y="3852662"/>
+            <a:ext cx="1440160" cy="276999"/>
+          </a:xfrm>
+          <a:prstGeom prst="rect">
+            <a:avLst/>
+          </a:prstGeom>
+          <a:noFill/>
+        </p:spPr>
+        <p:txBody>
+          <a:bodyPr wrap="square" rtlCol="0">
+            <a:spAutoFit/>
+          </a:bodyPr>
+          <a:lstStyle/>
+          <a:p>
+            <a:r>
+              <a:rPr lang="en-IE" sz="1200" dirty="0" smtClean="0"/>
+              <a:t>b)</a:t>
+            </a:r>
+            <a:endParaRPr lang="en-IE" sz="1200" dirty="0"/>
+          </a:p>
+        </p:txBody>
+      </p:sp>
+    </p:spTree>
+    <p:extLst>
+      <p:ext uri="{BB962C8B-B14F-4D97-AF65-F5344CB8AC3E}">
+        <p14:creationId xmlns:p14="http://schemas.microsoft.com/office/powerpoint/2010/main" val="430083613"/>
       </p:ext>
     </p:extLst>
   </p:cSld>

</xml_diff>

<commit_message>
corrected functions and pictures for fracture energy calculations
</commit_message>
<xml_diff>
--- a/mechanicalContact/spallationIndentationScratch/_pictures/Sketches_chippedSegmentGeometry.pptx
+++ b/mechanicalContact/spallationIndentationScratch/_pictures/Sketches_chippedSegmentGeometry.pptx
@@ -5,13 +5,14 @@
     <p:sldMasterId id="2147483648" r:id="rId1"/>
   </p:sldMasterIdLst>
   <p:notesMasterIdLst>
-    <p:notesMasterId r:id="rId6"/>
+    <p:notesMasterId r:id="rId7"/>
   </p:notesMasterIdLst>
   <p:sldIdLst>
     <p:sldId id="257" r:id="rId2"/>
     <p:sldId id="256" r:id="rId3"/>
     <p:sldId id="258" r:id="rId4"/>
     <p:sldId id="259" r:id="rId5"/>
+    <p:sldId id="260" r:id="rId6"/>
   </p:sldIdLst>
   <p:sldSz cx="9144000" cy="6858000" type="screen4x3"/>
   <p:notesSz cx="6858000" cy="9144000"/>
@@ -195,7 +196,7 @@
           <a:p>
             <a:fld id="{CC6931EE-6622-4FE6-960C-740A787E8629}" type="datetimeFigureOut">
               <a:rPr lang="en-IE" smtClean="0"/>
-              <a:t>14/04/2017</a:t>
+              <a:t>15/05/2017</a:t>
             </a:fld>
             <a:endParaRPr lang="en-IE"/>
           </a:p>
@@ -644,7 +645,7 @@
           <a:p>
             <a:fld id="{FC950D17-7299-4B36-8CE5-03DC686728C8}" type="datetimeFigureOut">
               <a:rPr lang="en-IE" smtClean="0"/>
-              <a:t>14/04/2017</a:t>
+              <a:t>15/05/2017</a:t>
             </a:fld>
             <a:endParaRPr lang="en-IE"/>
           </a:p>
@@ -814,7 +815,7 @@
           <a:p>
             <a:fld id="{FC950D17-7299-4B36-8CE5-03DC686728C8}" type="datetimeFigureOut">
               <a:rPr lang="en-IE" smtClean="0"/>
-              <a:t>14/04/2017</a:t>
+              <a:t>15/05/2017</a:t>
             </a:fld>
             <a:endParaRPr lang="en-IE"/>
           </a:p>
@@ -994,7 +995,7 @@
           <a:p>
             <a:fld id="{FC950D17-7299-4B36-8CE5-03DC686728C8}" type="datetimeFigureOut">
               <a:rPr lang="en-IE" smtClean="0"/>
-              <a:t>14/04/2017</a:t>
+              <a:t>15/05/2017</a:t>
             </a:fld>
             <a:endParaRPr lang="en-IE"/>
           </a:p>
@@ -1164,7 +1165,7 @@
           <a:p>
             <a:fld id="{FC950D17-7299-4B36-8CE5-03DC686728C8}" type="datetimeFigureOut">
               <a:rPr lang="en-IE" smtClean="0"/>
-              <a:t>14/04/2017</a:t>
+              <a:t>15/05/2017</a:t>
             </a:fld>
             <a:endParaRPr lang="en-IE"/>
           </a:p>
@@ -1410,7 +1411,7 @@
           <a:p>
             <a:fld id="{FC950D17-7299-4B36-8CE5-03DC686728C8}" type="datetimeFigureOut">
               <a:rPr lang="en-IE" smtClean="0"/>
-              <a:t>14/04/2017</a:t>
+              <a:t>15/05/2017</a:t>
             </a:fld>
             <a:endParaRPr lang="en-IE"/>
           </a:p>
@@ -1698,7 +1699,7 @@
           <a:p>
             <a:fld id="{FC950D17-7299-4B36-8CE5-03DC686728C8}" type="datetimeFigureOut">
               <a:rPr lang="en-IE" smtClean="0"/>
-              <a:t>14/04/2017</a:t>
+              <a:t>15/05/2017</a:t>
             </a:fld>
             <a:endParaRPr lang="en-IE"/>
           </a:p>
@@ -2120,7 +2121,7 @@
           <a:p>
             <a:fld id="{FC950D17-7299-4B36-8CE5-03DC686728C8}" type="datetimeFigureOut">
               <a:rPr lang="en-IE" smtClean="0"/>
-              <a:t>14/04/2017</a:t>
+              <a:t>15/05/2017</a:t>
             </a:fld>
             <a:endParaRPr lang="en-IE"/>
           </a:p>
@@ -2238,7 +2239,7 @@
           <a:p>
             <a:fld id="{FC950D17-7299-4B36-8CE5-03DC686728C8}" type="datetimeFigureOut">
               <a:rPr lang="en-IE" smtClean="0"/>
-              <a:t>14/04/2017</a:t>
+              <a:t>15/05/2017</a:t>
             </a:fld>
             <a:endParaRPr lang="en-IE"/>
           </a:p>
@@ -2333,7 +2334,7 @@
           <a:p>
             <a:fld id="{FC950D17-7299-4B36-8CE5-03DC686728C8}" type="datetimeFigureOut">
               <a:rPr lang="en-IE" smtClean="0"/>
-              <a:t>14/04/2017</a:t>
+              <a:t>15/05/2017</a:t>
             </a:fld>
             <a:endParaRPr lang="en-IE"/>
           </a:p>
@@ -2610,7 +2611,7 @@
           <a:p>
             <a:fld id="{FC950D17-7299-4B36-8CE5-03DC686728C8}" type="datetimeFigureOut">
               <a:rPr lang="en-IE" smtClean="0"/>
-              <a:t>14/04/2017</a:t>
+              <a:t>15/05/2017</a:t>
             </a:fld>
             <a:endParaRPr lang="en-IE"/>
           </a:p>
@@ -2863,7 +2864,7 @@
           <a:p>
             <a:fld id="{FC950D17-7299-4B36-8CE5-03DC686728C8}" type="datetimeFigureOut">
               <a:rPr lang="en-IE" smtClean="0"/>
-              <a:t>14/04/2017</a:t>
+              <a:t>15/05/2017</a:t>
             </a:fld>
             <a:endParaRPr lang="en-IE"/>
           </a:p>
@@ -3076,7 +3077,7 @@
           <a:p>
             <a:fld id="{FC950D17-7299-4B36-8CE5-03DC686728C8}" type="datetimeFigureOut">
               <a:rPr lang="en-IE" smtClean="0"/>
-              <a:t>14/04/2017</a:t>
+              <a:t>15/05/2017</a:t>
             </a:fld>
             <a:endParaRPr lang="en-IE"/>
           </a:p>
@@ -8111,6 +8112,696 @@
     <p:extLst>
       <p:ext uri="{BB962C8B-B14F-4D97-AF65-F5344CB8AC3E}">
         <p14:creationId xmlns:p14="http://schemas.microsoft.com/office/powerpoint/2010/main" val="430083613"/>
+      </p:ext>
+    </p:extLst>
+  </p:cSld>
+  <p:clrMapOvr>
+    <a:masterClrMapping/>
+  </p:clrMapOvr>
+</p:sld>
+</file>
+
+<file path=ppt/slides/slide5.xml><?xml version="1.0" encoding="utf-8"?>
+<p:sld xmlns:a="http://schemas.openxmlformats.org/drawingml/2006/main" xmlns:r="http://schemas.openxmlformats.org/officeDocument/2006/relationships" xmlns:p="http://schemas.openxmlformats.org/presentationml/2006/main">
+  <p:cSld>
+    <p:spTree>
+      <p:nvGrpSpPr>
+        <p:cNvPr id="1" name=""/>
+        <p:cNvGrpSpPr/>
+        <p:nvPr/>
+      </p:nvGrpSpPr>
+      <p:grpSpPr>
+        <a:xfrm>
+          <a:off x="0" y="0"/>
+          <a:ext cx="0" cy="0"/>
+          <a:chOff x="0" y="0"/>
+          <a:chExt cx="0" cy="0"/>
+        </a:xfrm>
+      </p:grpSpPr>
+      <p:graphicFrame>
+        <p:nvGraphicFramePr>
+          <p:cNvPr id="5" name="Object 4"/>
+          <p:cNvGraphicFramePr>
+            <a:graphicFrameLocks noChangeAspect="1"/>
+          </p:cNvGraphicFramePr>
+          <p:nvPr>
+            <p:extLst>
+              <p:ext uri="{D42A27DB-BD31-4B8C-83A1-F6EECF244321}">
+                <p14:modId xmlns:p14="http://schemas.microsoft.com/office/powerpoint/2010/main" val="3589056997"/>
+              </p:ext>
+            </p:extLst>
+          </p:nvPr>
+        </p:nvGraphicFramePr>
+        <p:xfrm>
+          <a:off x="3514923" y="332656"/>
+          <a:ext cx="2222500" cy="1081087"/>
+        </p:xfrm>
+        <a:graphic>
+          <a:graphicData uri="http://schemas.openxmlformats.org/presentationml/2006/ole">
+            <mc:AlternateContent xmlns:mc="http://schemas.openxmlformats.org/markup-compatibility/2006">
+              <mc:Choice xmlns:v="urn:schemas-microsoft-com:vml" Requires="v">
+                <p:oleObj spid="_x0000_s1050" name="Equation" r:id="rId3" imgW="1701800" imgH="812800" progId="Equation.3">
+                  <p:embed/>
+                </p:oleObj>
+              </mc:Choice>
+              <mc:Fallback>
+                <p:oleObj name="Equation" r:id="rId3" imgW="1701800" imgH="812800" progId="Equation.3">
+                  <p:embed/>
+                  <p:pic>
+                    <p:nvPicPr>
+                      <p:cNvPr id="0" name="Object 9"/>
+                      <p:cNvPicPr>
+                        <a:picLocks noChangeAspect="1" noChangeArrowheads="1"/>
+                      </p:cNvPicPr>
+                      <p:nvPr/>
+                    </p:nvPicPr>
+                    <p:blipFill>
+                      <a:blip r:embed="rId4">
+                        <a:extLst>
+                          <a:ext uri="{28A0092B-C50C-407E-A947-70E740481C1C}">
+                            <a14:useLocalDpi xmlns:a14="http://schemas.microsoft.com/office/drawing/2010/main" val="0"/>
+                          </a:ext>
+                        </a:extLst>
+                      </a:blip>
+                      <a:srcRect/>
+                      <a:stretch>
+                        <a:fillRect/>
+                      </a:stretch>
+                    </p:blipFill>
+                    <p:spPr bwMode="auto">
+                      <a:xfrm>
+                        <a:off x="3514923" y="332656"/>
+                        <a:ext cx="2222500" cy="1081087"/>
+                      </a:xfrm>
+                      <a:prstGeom prst="rect">
+                        <a:avLst/>
+                      </a:prstGeom>
+                      <a:noFill/>
+                      <a:ln>
+                        <a:noFill/>
+                      </a:ln>
+                      <a:extLst>
+                        <a:ext uri="{909E8E84-426E-40DD-AFC4-6F175D3DCCD1}">
+                          <a14:hiddenFill xmlns:a14="http://schemas.microsoft.com/office/drawing/2010/main">
+                            <a:solidFill>
+                              <a:srgbClr val="FFFFFF"/>
+                            </a:solidFill>
+                          </a14:hiddenFill>
+                        </a:ext>
+                        <a:ext uri="{91240B29-F687-4F45-9708-019B960494DF}">
+                          <a14:hiddenLine xmlns:a14="http://schemas.microsoft.com/office/drawing/2010/main" w="9525">
+                            <a:solidFill>
+                              <a:srgbClr val="000000"/>
+                            </a:solidFill>
+                            <a:miter lim="800000"/>
+                            <a:headEnd/>
+                            <a:tailEnd/>
+                          </a14:hiddenLine>
+                        </a:ext>
+                      </a:extLst>
+                    </p:spPr>
+                  </p:pic>
+                </p:oleObj>
+              </mc:Fallback>
+            </mc:AlternateContent>
+          </a:graphicData>
+        </a:graphic>
+      </p:graphicFrame>
+      <p:graphicFrame>
+        <p:nvGraphicFramePr>
+          <p:cNvPr id="8" name="Object 7"/>
+          <p:cNvGraphicFramePr>
+            <a:graphicFrameLocks noChangeAspect="1"/>
+          </p:cNvGraphicFramePr>
+          <p:nvPr>
+            <p:extLst>
+              <p:ext uri="{D42A27DB-BD31-4B8C-83A1-F6EECF244321}">
+                <p14:modId xmlns:p14="http://schemas.microsoft.com/office/powerpoint/2010/main" val="3771514257"/>
+              </p:ext>
+            </p:extLst>
+          </p:nvPr>
+        </p:nvGraphicFramePr>
+        <p:xfrm>
+          <a:off x="1043608" y="4655508"/>
+          <a:ext cx="830263" cy="271463"/>
+        </p:xfrm>
+        <a:graphic>
+          <a:graphicData uri="http://schemas.openxmlformats.org/presentationml/2006/ole">
+            <mc:AlternateContent xmlns:mc="http://schemas.openxmlformats.org/markup-compatibility/2006">
+              <mc:Choice xmlns:v="urn:schemas-microsoft-com:vml" Requires="v">
+                <p:oleObj spid="_x0000_s1051" name="Equation" r:id="rId5" imgW="634680" imgH="203040" progId="Equation.3">
+                  <p:embed/>
+                </p:oleObj>
+              </mc:Choice>
+              <mc:Fallback>
+                <p:oleObj name="Equation" r:id="rId5" imgW="634680" imgH="203040" progId="Equation.3">
+                  <p:embed/>
+                  <p:pic>
+                    <p:nvPicPr>
+                      <p:cNvPr id="0" name="Object 4"/>
+                      <p:cNvPicPr>
+                        <a:picLocks noChangeAspect="1" noChangeArrowheads="1"/>
+                      </p:cNvPicPr>
+                      <p:nvPr/>
+                    </p:nvPicPr>
+                    <p:blipFill>
+                      <a:blip r:embed="rId6"/>
+                      <a:srcRect/>
+                      <a:stretch>
+                        <a:fillRect/>
+                      </a:stretch>
+                    </p:blipFill>
+                    <p:spPr bwMode="auto">
+                      <a:xfrm>
+                        <a:off x="1043608" y="4655508"/>
+                        <a:ext cx="830263" cy="271463"/>
+                      </a:xfrm>
+                      <a:prstGeom prst="rect">
+                        <a:avLst/>
+                      </a:prstGeom>
+                      <a:noFill/>
+                      <a:ln>
+                        <a:noFill/>
+                      </a:ln>
+                      <a:extLst>
+                        <a:ext uri="{909E8E84-426E-40DD-AFC4-6F175D3DCCD1}">
+                          <a14:hiddenFill xmlns:a14="http://schemas.microsoft.com/office/drawing/2010/main">
+                            <a:solidFill>
+                              <a:srgbClr val="FFFFFF"/>
+                            </a:solidFill>
+                          </a14:hiddenFill>
+                        </a:ext>
+                        <a:ext uri="{91240B29-F687-4F45-9708-019B960494DF}">
+                          <a14:hiddenLine xmlns:a14="http://schemas.microsoft.com/office/drawing/2010/main" w="9525">
+                            <a:solidFill>
+                              <a:srgbClr val="000000"/>
+                            </a:solidFill>
+                            <a:miter lim="800000"/>
+                            <a:headEnd/>
+                            <a:tailEnd/>
+                          </a14:hiddenLine>
+                        </a:ext>
+                      </a:extLst>
+                    </p:spPr>
+                  </p:pic>
+                </p:oleObj>
+              </mc:Fallback>
+            </mc:AlternateContent>
+          </a:graphicData>
+        </a:graphic>
+      </p:graphicFrame>
+      <p:sp>
+        <p:nvSpPr>
+          <p:cNvPr id="9" name="TextBox 8"/>
+          <p:cNvSpPr txBox="1"/>
+          <p:nvPr/>
+        </p:nvSpPr>
+        <p:spPr>
+          <a:xfrm>
+            <a:off x="395536" y="4581128"/>
+            <a:ext cx="1800200" cy="369332"/>
+          </a:xfrm>
+          <a:prstGeom prst="rect">
+            <a:avLst/>
+          </a:prstGeom>
+          <a:noFill/>
+        </p:spPr>
+        <p:txBody>
+          <a:bodyPr wrap="square" rtlCol="0">
+            <a:spAutoFit/>
+          </a:bodyPr>
+          <a:lstStyle/>
+          <a:p>
+            <a:r>
+              <a:rPr lang="en-IE" dirty="0" smtClean="0"/>
+              <a:t>with</a:t>
+            </a:r>
+            <a:endParaRPr lang="fr-FR" dirty="0"/>
+          </a:p>
+        </p:txBody>
+      </p:sp>
+      <p:sp>
+        <p:nvSpPr>
+          <p:cNvPr id="10" name="TextBox 9"/>
+          <p:cNvSpPr txBox="1"/>
+          <p:nvPr/>
+        </p:nvSpPr>
+        <p:spPr>
+          <a:xfrm>
+            <a:off x="395536" y="5003884"/>
+            <a:ext cx="2627784" cy="369332"/>
+          </a:xfrm>
+          <a:prstGeom prst="rect">
+            <a:avLst/>
+          </a:prstGeom>
+          <a:noFill/>
+        </p:spPr>
+        <p:txBody>
+          <a:bodyPr wrap="square" rtlCol="0">
+            <a:spAutoFit/>
+          </a:bodyPr>
+          <a:lstStyle/>
+          <a:p>
+            <a:r>
+              <a:rPr lang="en-IE" dirty="0" smtClean="0">
+                <a:solidFill>
+                  <a:srgbClr val="FF0000"/>
+                </a:solidFill>
+              </a:rPr>
+              <a:t>Only for small angles…!!!</a:t>
+            </a:r>
+            <a:endParaRPr lang="fr-FR" dirty="0">
+              <a:solidFill>
+                <a:srgbClr val="FF0000"/>
+              </a:solidFill>
+            </a:endParaRPr>
+          </a:p>
+        </p:txBody>
+      </p:sp>
+      <p:graphicFrame>
+        <p:nvGraphicFramePr>
+          <p:cNvPr id="11" name="Object 10"/>
+          <p:cNvGraphicFramePr>
+            <a:graphicFrameLocks noChangeAspect="1"/>
+          </p:cNvGraphicFramePr>
+          <p:nvPr>
+            <p:extLst>
+              <p:ext uri="{D42A27DB-BD31-4B8C-83A1-F6EECF244321}">
+                <p14:modId xmlns:p14="http://schemas.microsoft.com/office/powerpoint/2010/main" val="2114998735"/>
+              </p:ext>
+            </p:extLst>
+          </p:nvPr>
+        </p:nvGraphicFramePr>
+        <p:xfrm>
+          <a:off x="3489523" y="1610376"/>
+          <a:ext cx="2273300" cy="1063625"/>
+        </p:xfrm>
+        <a:graphic>
+          <a:graphicData uri="http://schemas.openxmlformats.org/presentationml/2006/ole">
+            <mc:AlternateContent xmlns:mc="http://schemas.openxmlformats.org/markup-compatibility/2006">
+              <mc:Choice xmlns:v="urn:schemas-microsoft-com:vml" Requires="v">
+                <p:oleObj spid="_x0000_s1052" name="Equation" r:id="rId7" imgW="1739880" imgH="799920" progId="Equation.3">
+                  <p:embed/>
+                </p:oleObj>
+              </mc:Choice>
+              <mc:Fallback>
+                <p:oleObj name="Equation" r:id="rId7" imgW="1739880" imgH="799920" progId="Equation.3">
+                  <p:embed/>
+                  <p:pic>
+                    <p:nvPicPr>
+                      <p:cNvPr id="0" name="Object 4"/>
+                      <p:cNvPicPr>
+                        <a:picLocks noChangeAspect="1" noChangeArrowheads="1"/>
+                      </p:cNvPicPr>
+                      <p:nvPr/>
+                    </p:nvPicPr>
+                    <p:blipFill>
+                      <a:blip r:embed="rId8"/>
+                      <a:srcRect/>
+                      <a:stretch>
+                        <a:fillRect/>
+                      </a:stretch>
+                    </p:blipFill>
+                    <p:spPr bwMode="auto">
+                      <a:xfrm>
+                        <a:off x="3489523" y="1610376"/>
+                        <a:ext cx="2273300" cy="1063625"/>
+                      </a:xfrm>
+                      <a:prstGeom prst="rect">
+                        <a:avLst/>
+                      </a:prstGeom>
+                      <a:noFill/>
+                      <a:ln>
+                        <a:noFill/>
+                      </a:ln>
+                      <a:extLst>
+                        <a:ext uri="{909E8E84-426E-40DD-AFC4-6F175D3DCCD1}">
+                          <a14:hiddenFill xmlns:a14="http://schemas.microsoft.com/office/drawing/2010/main">
+                            <a:solidFill>
+                              <a:srgbClr val="FFFFFF"/>
+                            </a:solidFill>
+                          </a14:hiddenFill>
+                        </a:ext>
+                        <a:ext uri="{91240B29-F687-4F45-9708-019B960494DF}">
+                          <a14:hiddenLine xmlns:a14="http://schemas.microsoft.com/office/drawing/2010/main" w="9525">
+                            <a:solidFill>
+                              <a:srgbClr val="000000"/>
+                            </a:solidFill>
+                            <a:miter lim="800000"/>
+                            <a:headEnd/>
+                            <a:tailEnd/>
+                          </a14:hiddenLine>
+                        </a:ext>
+                      </a:extLst>
+                    </p:spPr>
+                  </p:pic>
+                </p:oleObj>
+              </mc:Fallback>
+            </mc:AlternateContent>
+          </a:graphicData>
+        </a:graphic>
+      </p:graphicFrame>
+      <p:graphicFrame>
+        <p:nvGraphicFramePr>
+          <p:cNvPr id="13" name="Object 12"/>
+          <p:cNvGraphicFramePr>
+            <a:graphicFrameLocks noChangeAspect="1"/>
+          </p:cNvGraphicFramePr>
+          <p:nvPr>
+            <p:extLst>
+              <p:ext uri="{D42A27DB-BD31-4B8C-83A1-F6EECF244321}">
+                <p14:modId xmlns:p14="http://schemas.microsoft.com/office/powerpoint/2010/main" val="3801433502"/>
+              </p:ext>
+            </p:extLst>
+          </p:nvPr>
+        </p:nvGraphicFramePr>
+        <p:xfrm>
+          <a:off x="3422848" y="2870634"/>
+          <a:ext cx="2406650" cy="1063625"/>
+        </p:xfrm>
+        <a:graphic>
+          <a:graphicData uri="http://schemas.openxmlformats.org/presentationml/2006/ole">
+            <mc:AlternateContent xmlns:mc="http://schemas.openxmlformats.org/markup-compatibility/2006">
+              <mc:Choice xmlns:v="urn:schemas-microsoft-com:vml" Requires="v">
+                <p:oleObj spid="_x0000_s1053" name="Equation" r:id="rId9" imgW="1841400" imgH="799920" progId="Equation.3">
+                  <p:embed/>
+                </p:oleObj>
+              </mc:Choice>
+              <mc:Fallback>
+                <p:oleObj name="Equation" r:id="rId9" imgW="1841400" imgH="799920" progId="Equation.3">
+                  <p:embed/>
+                  <p:pic>
+                    <p:nvPicPr>
+                      <p:cNvPr id="0" name="Object 10"/>
+                      <p:cNvPicPr>
+                        <a:picLocks noChangeAspect="1" noChangeArrowheads="1"/>
+                      </p:cNvPicPr>
+                      <p:nvPr/>
+                    </p:nvPicPr>
+                    <p:blipFill>
+                      <a:blip r:embed="rId10"/>
+                      <a:srcRect/>
+                      <a:stretch>
+                        <a:fillRect/>
+                      </a:stretch>
+                    </p:blipFill>
+                    <p:spPr bwMode="auto">
+                      <a:xfrm>
+                        <a:off x="3422848" y="2870634"/>
+                        <a:ext cx="2406650" cy="1063625"/>
+                      </a:xfrm>
+                      <a:prstGeom prst="rect">
+                        <a:avLst/>
+                      </a:prstGeom>
+                      <a:noFill/>
+                      <a:ln>
+                        <a:noFill/>
+                      </a:ln>
+                      <a:extLst>
+                        <a:ext uri="{909E8E84-426E-40DD-AFC4-6F175D3DCCD1}">
+                          <a14:hiddenFill xmlns:a14="http://schemas.microsoft.com/office/drawing/2010/main">
+                            <a:solidFill>
+                              <a:srgbClr val="FFFFFF"/>
+                            </a:solidFill>
+                          </a14:hiddenFill>
+                        </a:ext>
+                        <a:ext uri="{91240B29-F687-4F45-9708-019B960494DF}">
+                          <a14:hiddenLine xmlns:a14="http://schemas.microsoft.com/office/drawing/2010/main" w="9525">
+                            <a:solidFill>
+                              <a:srgbClr val="000000"/>
+                            </a:solidFill>
+                            <a:miter lim="800000"/>
+                            <a:headEnd/>
+                            <a:tailEnd/>
+                          </a14:hiddenLine>
+                        </a:ext>
+                      </a:extLst>
+                    </p:spPr>
+                  </p:pic>
+                </p:oleObj>
+              </mc:Fallback>
+            </mc:AlternateContent>
+          </a:graphicData>
+        </a:graphic>
+      </p:graphicFrame>
+      <p:graphicFrame>
+        <p:nvGraphicFramePr>
+          <p:cNvPr id="14" name="Object 13"/>
+          <p:cNvGraphicFramePr>
+            <a:graphicFrameLocks noChangeAspect="1"/>
+          </p:cNvGraphicFramePr>
+          <p:nvPr>
+            <p:extLst>
+              <p:ext uri="{D42A27DB-BD31-4B8C-83A1-F6EECF244321}">
+                <p14:modId xmlns:p14="http://schemas.microsoft.com/office/powerpoint/2010/main" val="1905654134"/>
+              </p:ext>
+            </p:extLst>
+          </p:nvPr>
+        </p:nvGraphicFramePr>
+        <p:xfrm>
+          <a:off x="3605411" y="4130892"/>
+          <a:ext cx="2041525" cy="1063625"/>
+        </p:xfrm>
+        <a:graphic>
+          <a:graphicData uri="http://schemas.openxmlformats.org/presentationml/2006/ole">
+            <mc:AlternateContent xmlns:mc="http://schemas.openxmlformats.org/markup-compatibility/2006">
+              <mc:Choice xmlns:v="urn:schemas-microsoft-com:vml" Requires="v">
+                <p:oleObj spid="_x0000_s1054" name="Equation" r:id="rId11" imgW="1562040" imgH="799920" progId="Equation.3">
+                  <p:embed/>
+                </p:oleObj>
+              </mc:Choice>
+              <mc:Fallback>
+                <p:oleObj name="Equation" r:id="rId11" imgW="1562040" imgH="799920" progId="Equation.3">
+                  <p:embed/>
+                  <p:pic>
+                    <p:nvPicPr>
+                      <p:cNvPr id="0" name="Object 12"/>
+                      <p:cNvPicPr>
+                        <a:picLocks noChangeAspect="1" noChangeArrowheads="1"/>
+                      </p:cNvPicPr>
+                      <p:nvPr/>
+                    </p:nvPicPr>
+                    <p:blipFill>
+                      <a:blip r:embed="rId12"/>
+                      <a:srcRect/>
+                      <a:stretch>
+                        <a:fillRect/>
+                      </a:stretch>
+                    </p:blipFill>
+                    <p:spPr bwMode="auto">
+                      <a:xfrm>
+                        <a:off x="3605411" y="4130892"/>
+                        <a:ext cx="2041525" cy="1063625"/>
+                      </a:xfrm>
+                      <a:prstGeom prst="rect">
+                        <a:avLst/>
+                      </a:prstGeom>
+                      <a:noFill/>
+                      <a:ln>
+                        <a:noFill/>
+                      </a:ln>
+                      <a:extLst>
+                        <a:ext uri="{909E8E84-426E-40DD-AFC4-6F175D3DCCD1}">
+                          <a14:hiddenFill xmlns:a14="http://schemas.microsoft.com/office/drawing/2010/main">
+                            <a:solidFill>
+                              <a:srgbClr val="FFFFFF"/>
+                            </a:solidFill>
+                          </a14:hiddenFill>
+                        </a:ext>
+                        <a:ext uri="{91240B29-F687-4F45-9708-019B960494DF}">
+                          <a14:hiddenLine xmlns:a14="http://schemas.microsoft.com/office/drawing/2010/main" w="9525">
+                            <a:solidFill>
+                              <a:srgbClr val="000000"/>
+                            </a:solidFill>
+                            <a:miter lim="800000"/>
+                            <a:headEnd/>
+                            <a:tailEnd/>
+                          </a14:hiddenLine>
+                        </a:ext>
+                      </a:extLst>
+                    </p:spPr>
+                  </p:pic>
+                </p:oleObj>
+              </mc:Fallback>
+            </mc:AlternateContent>
+          </a:graphicData>
+        </a:graphic>
+      </p:graphicFrame>
+      <p:graphicFrame>
+        <p:nvGraphicFramePr>
+          <p:cNvPr id="15" name="Object 14"/>
+          <p:cNvGraphicFramePr>
+            <a:graphicFrameLocks noChangeAspect="1"/>
+          </p:cNvGraphicFramePr>
+          <p:nvPr>
+            <p:extLst>
+              <p:ext uri="{D42A27DB-BD31-4B8C-83A1-F6EECF244321}">
+                <p14:modId xmlns:p14="http://schemas.microsoft.com/office/powerpoint/2010/main" val="4106991479"/>
+              </p:ext>
+            </p:extLst>
+          </p:nvPr>
+        </p:nvGraphicFramePr>
+        <p:xfrm>
+          <a:off x="3546673" y="5391150"/>
+          <a:ext cx="2159000" cy="1081088"/>
+        </p:xfrm>
+        <a:graphic>
+          <a:graphicData uri="http://schemas.openxmlformats.org/presentationml/2006/ole">
+            <mc:AlternateContent xmlns:mc="http://schemas.openxmlformats.org/markup-compatibility/2006">
+              <mc:Choice xmlns:v="urn:schemas-microsoft-com:vml" Requires="v">
+                <p:oleObj spid="_x0000_s1055" name="Equation" r:id="rId13" imgW="1650960" imgH="812520" progId="Equation.3">
+                  <p:embed/>
+                </p:oleObj>
+              </mc:Choice>
+              <mc:Fallback>
+                <p:oleObj name="Equation" r:id="rId13" imgW="1650960" imgH="812520" progId="Equation.3">
+                  <p:embed/>
+                  <p:pic>
+                    <p:nvPicPr>
+                      <p:cNvPr id="0" name="Object 13"/>
+                      <p:cNvPicPr>
+                        <a:picLocks noChangeAspect="1" noChangeArrowheads="1"/>
+                      </p:cNvPicPr>
+                      <p:nvPr/>
+                    </p:nvPicPr>
+                    <p:blipFill>
+                      <a:blip r:embed="rId14"/>
+                      <a:srcRect/>
+                      <a:stretch>
+                        <a:fillRect/>
+                      </a:stretch>
+                    </p:blipFill>
+                    <p:spPr bwMode="auto">
+                      <a:xfrm>
+                        <a:off x="3546673" y="5391150"/>
+                        <a:ext cx="2159000" cy="1081088"/>
+                      </a:xfrm>
+                      <a:prstGeom prst="rect">
+                        <a:avLst/>
+                      </a:prstGeom>
+                      <a:noFill/>
+                      <a:ln>
+                        <a:noFill/>
+                      </a:ln>
+                      <a:extLst>
+                        <a:ext uri="{909E8E84-426E-40DD-AFC4-6F175D3DCCD1}">
+                          <a14:hiddenFill xmlns:a14="http://schemas.microsoft.com/office/drawing/2010/main">
+                            <a:solidFill>
+                              <a:srgbClr val="FFFFFF"/>
+                            </a:solidFill>
+                          </a14:hiddenFill>
+                        </a:ext>
+                        <a:ext uri="{91240B29-F687-4F45-9708-019B960494DF}">
+                          <a14:hiddenLine xmlns:a14="http://schemas.microsoft.com/office/drawing/2010/main" w="9525">
+                            <a:solidFill>
+                              <a:srgbClr val="000000"/>
+                            </a:solidFill>
+                            <a:miter lim="800000"/>
+                            <a:headEnd/>
+                            <a:tailEnd/>
+                          </a14:hiddenLine>
+                        </a:ext>
+                      </a:extLst>
+                    </p:spPr>
+                  </p:pic>
+                </p:oleObj>
+              </mc:Fallback>
+            </mc:AlternateContent>
+          </a:graphicData>
+        </a:graphic>
+      </p:graphicFrame>
+      <p:sp>
+        <p:nvSpPr>
+          <p:cNvPr id="16" name="TextBox 15"/>
+          <p:cNvSpPr txBox="1"/>
+          <p:nvPr/>
+        </p:nvSpPr>
+        <p:spPr>
+          <a:xfrm>
+            <a:off x="547936" y="692696"/>
+            <a:ext cx="2627784" cy="369332"/>
+          </a:xfrm>
+          <a:prstGeom prst="rect">
+            <a:avLst/>
+          </a:prstGeom>
+          <a:noFill/>
+        </p:spPr>
+        <p:txBody>
+          <a:bodyPr wrap="square" rtlCol="0">
+            <a:spAutoFit/>
+          </a:bodyPr>
+          <a:lstStyle/>
+          <a:p>
+            <a:r>
+              <a:rPr lang="en-IE" dirty="0" smtClean="0"/>
+              <a:t>Model of den </a:t>
+            </a:r>
+            <a:r>
+              <a:rPr lang="en-IE" dirty="0" err="1" smtClean="0"/>
+              <a:t>Toonder</a:t>
+            </a:r>
+            <a:r>
+              <a:rPr lang="en-IE" dirty="0" smtClean="0"/>
+              <a:t> </a:t>
+            </a:r>
+            <a:r>
+              <a:rPr lang="en-IE" dirty="0" smtClean="0">
+                <a:sym typeface="Wingdings" panose="05000000000000000000" pitchFamily="2" charset="2"/>
+              </a:rPr>
+              <a:t></a:t>
+            </a:r>
+            <a:endParaRPr lang="fr-FR" dirty="0"/>
+          </a:p>
+        </p:txBody>
+      </p:sp>
+      <p:sp>
+        <p:nvSpPr>
+          <p:cNvPr id="17" name="TextBox 16"/>
+          <p:cNvSpPr txBox="1"/>
+          <p:nvPr/>
+        </p:nvSpPr>
+        <p:spPr>
+          <a:xfrm>
+            <a:off x="6084168" y="5661248"/>
+            <a:ext cx="2915816" cy="646331"/>
+          </a:xfrm>
+          <a:prstGeom prst="rect">
+            <a:avLst/>
+          </a:prstGeom>
+          <a:noFill/>
+        </p:spPr>
+        <p:txBody>
+          <a:bodyPr wrap="square" rtlCol="0">
+            <a:spAutoFit/>
+          </a:bodyPr>
+          <a:lstStyle/>
+          <a:p>
+            <a:r>
+              <a:rPr lang="en-IE" dirty="0" smtClean="0">
+                <a:sym typeface="Wingdings" panose="05000000000000000000" pitchFamily="2" charset="2"/>
+              </a:rPr>
+              <a:t> </a:t>
+            </a:r>
+            <a:r>
+              <a:rPr lang="en-IE" dirty="0" smtClean="0"/>
+              <a:t>Model of </a:t>
+            </a:r>
+            <a:r>
+              <a:rPr lang="en-IE" dirty="0" err="1" smtClean="0"/>
+              <a:t>Thouless</a:t>
+            </a:r>
+            <a:r>
+              <a:rPr lang="en-IE" dirty="0" smtClean="0"/>
+              <a:t> when residual stress equal to zero..</a:t>
+            </a:r>
+            <a:endParaRPr lang="fr-FR" dirty="0"/>
+          </a:p>
+        </p:txBody>
+      </p:sp>
+    </p:spTree>
+    <p:extLst>
+      <p:ext uri="{BB962C8B-B14F-4D97-AF65-F5344CB8AC3E}">
+        <p14:creationId xmlns:p14="http://schemas.microsoft.com/office/powerpoint/2010/main" val="1835438679"/>
       </p:ext>
     </p:extLst>
   </p:cSld>

</xml_diff>

<commit_message>
updated schemes on ppt
</commit_message>
<xml_diff>
--- a/mechanicalContact/spallationIndentationScratch/_pictures/Sketches_chippedSegmentGeometry.pptx
+++ b/mechanicalContact/spallationIndentationScratch/_pictures/Sketches_chippedSegmentGeometry.pptx
@@ -5,7 +5,7 @@
     <p:sldMasterId id="2147483648" r:id="rId1"/>
   </p:sldMasterIdLst>
   <p:notesMasterIdLst>
-    <p:notesMasterId r:id="rId7"/>
+    <p:notesMasterId r:id="rId9"/>
   </p:notesMasterIdLst>
   <p:sldIdLst>
     <p:sldId id="257" r:id="rId2"/>
@@ -13,6 +13,8 @@
     <p:sldId id="258" r:id="rId4"/>
     <p:sldId id="259" r:id="rId5"/>
     <p:sldId id="260" r:id="rId6"/>
+    <p:sldId id="261" r:id="rId7"/>
+    <p:sldId id="262" r:id="rId8"/>
   </p:sldIdLst>
   <p:sldSz cx="9144000" cy="6858000" type="screen4x3"/>
   <p:notesSz cx="6858000" cy="9144000"/>
@@ -196,7 +198,7 @@
           <a:p>
             <a:fld id="{CC6931EE-6622-4FE6-960C-740A787E8629}" type="datetimeFigureOut">
               <a:rPr lang="en-IE" smtClean="0"/>
-              <a:t>15/05/2017</a:t>
+              <a:t>15/12/2017</a:t>
             </a:fld>
             <a:endParaRPr lang="en-IE"/>
           </a:p>
@@ -645,7 +647,7 @@
           <a:p>
             <a:fld id="{FC950D17-7299-4B36-8CE5-03DC686728C8}" type="datetimeFigureOut">
               <a:rPr lang="en-IE" smtClean="0"/>
-              <a:t>15/05/2017</a:t>
+              <a:t>15/12/2017</a:t>
             </a:fld>
             <a:endParaRPr lang="en-IE"/>
           </a:p>
@@ -815,7 +817,7 @@
           <a:p>
             <a:fld id="{FC950D17-7299-4B36-8CE5-03DC686728C8}" type="datetimeFigureOut">
               <a:rPr lang="en-IE" smtClean="0"/>
-              <a:t>15/05/2017</a:t>
+              <a:t>15/12/2017</a:t>
             </a:fld>
             <a:endParaRPr lang="en-IE"/>
           </a:p>
@@ -995,7 +997,7 @@
           <a:p>
             <a:fld id="{FC950D17-7299-4B36-8CE5-03DC686728C8}" type="datetimeFigureOut">
               <a:rPr lang="en-IE" smtClean="0"/>
-              <a:t>15/05/2017</a:t>
+              <a:t>15/12/2017</a:t>
             </a:fld>
             <a:endParaRPr lang="en-IE"/>
           </a:p>
@@ -1165,7 +1167,7 @@
           <a:p>
             <a:fld id="{FC950D17-7299-4B36-8CE5-03DC686728C8}" type="datetimeFigureOut">
               <a:rPr lang="en-IE" smtClean="0"/>
-              <a:t>15/05/2017</a:t>
+              <a:t>15/12/2017</a:t>
             </a:fld>
             <a:endParaRPr lang="en-IE"/>
           </a:p>
@@ -1411,7 +1413,7 @@
           <a:p>
             <a:fld id="{FC950D17-7299-4B36-8CE5-03DC686728C8}" type="datetimeFigureOut">
               <a:rPr lang="en-IE" smtClean="0"/>
-              <a:t>15/05/2017</a:t>
+              <a:t>15/12/2017</a:t>
             </a:fld>
             <a:endParaRPr lang="en-IE"/>
           </a:p>
@@ -1699,7 +1701,7 @@
           <a:p>
             <a:fld id="{FC950D17-7299-4B36-8CE5-03DC686728C8}" type="datetimeFigureOut">
               <a:rPr lang="en-IE" smtClean="0"/>
-              <a:t>15/05/2017</a:t>
+              <a:t>15/12/2017</a:t>
             </a:fld>
             <a:endParaRPr lang="en-IE"/>
           </a:p>
@@ -2121,7 +2123,7 @@
           <a:p>
             <a:fld id="{FC950D17-7299-4B36-8CE5-03DC686728C8}" type="datetimeFigureOut">
               <a:rPr lang="en-IE" smtClean="0"/>
-              <a:t>15/05/2017</a:t>
+              <a:t>15/12/2017</a:t>
             </a:fld>
             <a:endParaRPr lang="en-IE"/>
           </a:p>
@@ -2239,7 +2241,7 @@
           <a:p>
             <a:fld id="{FC950D17-7299-4B36-8CE5-03DC686728C8}" type="datetimeFigureOut">
               <a:rPr lang="en-IE" smtClean="0"/>
-              <a:t>15/05/2017</a:t>
+              <a:t>15/12/2017</a:t>
             </a:fld>
             <a:endParaRPr lang="en-IE"/>
           </a:p>
@@ -2334,7 +2336,7 @@
           <a:p>
             <a:fld id="{FC950D17-7299-4B36-8CE5-03DC686728C8}" type="datetimeFigureOut">
               <a:rPr lang="en-IE" smtClean="0"/>
-              <a:t>15/05/2017</a:t>
+              <a:t>15/12/2017</a:t>
             </a:fld>
             <a:endParaRPr lang="en-IE"/>
           </a:p>
@@ -2611,7 +2613,7 @@
           <a:p>
             <a:fld id="{FC950D17-7299-4B36-8CE5-03DC686728C8}" type="datetimeFigureOut">
               <a:rPr lang="en-IE" smtClean="0"/>
-              <a:t>15/05/2017</a:t>
+              <a:t>15/12/2017</a:t>
             </a:fld>
             <a:endParaRPr lang="en-IE"/>
           </a:p>
@@ -2864,7 +2866,7 @@
           <a:p>
             <a:fld id="{FC950D17-7299-4B36-8CE5-03DC686728C8}" type="datetimeFigureOut">
               <a:rPr lang="en-IE" smtClean="0"/>
-              <a:t>15/05/2017</a:t>
+              <a:t>15/12/2017</a:t>
             </a:fld>
             <a:endParaRPr lang="en-IE"/>
           </a:p>
@@ -3077,7 +3079,7 @@
           <a:p>
             <a:fld id="{FC950D17-7299-4B36-8CE5-03DC686728C8}" type="datetimeFigureOut">
               <a:rPr lang="en-IE" smtClean="0"/>
-              <a:t>15/05/2017</a:t>
+              <a:t>15/12/2017</a:t>
             </a:fld>
             <a:endParaRPr lang="en-IE"/>
           </a:p>
@@ -8160,7 +8162,7 @@
           <a:graphicData uri="http://schemas.openxmlformats.org/presentationml/2006/ole">
             <mc:AlternateContent xmlns:mc="http://schemas.openxmlformats.org/markup-compatibility/2006">
               <mc:Choice xmlns:v="urn:schemas-microsoft-com:vml" Requires="v">
-                <p:oleObj spid="_x0000_s1050" name="Equation" r:id="rId3" imgW="1701800" imgH="812800" progId="Equation.3">
+                <p:oleObj spid="_x0000_s1062" name="Equation" r:id="rId3" imgW="1701800" imgH="812800" progId="Equation.3">
                   <p:embed/>
                 </p:oleObj>
               </mc:Choice>
@@ -8249,7 +8251,7 @@
           <a:graphicData uri="http://schemas.openxmlformats.org/presentationml/2006/ole">
             <mc:AlternateContent xmlns:mc="http://schemas.openxmlformats.org/markup-compatibility/2006">
               <mc:Choice xmlns:v="urn:schemas-microsoft-com:vml" Requires="v">
-                <p:oleObj spid="_x0000_s1051" name="Equation" r:id="rId5" imgW="634680" imgH="203040" progId="Equation.3">
+                <p:oleObj spid="_x0000_s1063" name="Equation" r:id="rId5" imgW="634680" imgH="203040" progId="Equation.3">
                   <p:embed/>
                 </p:oleObj>
               </mc:Choice>
@@ -8400,7 +8402,7 @@
           <a:graphicData uri="http://schemas.openxmlformats.org/presentationml/2006/ole">
             <mc:AlternateContent xmlns:mc="http://schemas.openxmlformats.org/markup-compatibility/2006">
               <mc:Choice xmlns:v="urn:schemas-microsoft-com:vml" Requires="v">
-                <p:oleObj spid="_x0000_s1052" name="Equation" r:id="rId7" imgW="1739880" imgH="799920" progId="Equation.3">
+                <p:oleObj spid="_x0000_s1064" name="Equation" r:id="rId7" imgW="1739880" imgH="799920" progId="Equation.3">
                   <p:embed/>
                 </p:oleObj>
               </mc:Choice>
@@ -8483,7 +8485,7 @@
           <a:graphicData uri="http://schemas.openxmlformats.org/presentationml/2006/ole">
             <mc:AlternateContent xmlns:mc="http://schemas.openxmlformats.org/markup-compatibility/2006">
               <mc:Choice xmlns:v="urn:schemas-microsoft-com:vml" Requires="v">
-                <p:oleObj spid="_x0000_s1053" name="Equation" r:id="rId9" imgW="1841400" imgH="799920" progId="Equation.3">
+                <p:oleObj spid="_x0000_s1065" name="Equation" r:id="rId9" imgW="1841400" imgH="799920" progId="Equation.3">
                   <p:embed/>
                 </p:oleObj>
               </mc:Choice>
@@ -8566,7 +8568,7 @@
           <a:graphicData uri="http://schemas.openxmlformats.org/presentationml/2006/ole">
             <mc:AlternateContent xmlns:mc="http://schemas.openxmlformats.org/markup-compatibility/2006">
               <mc:Choice xmlns:v="urn:schemas-microsoft-com:vml" Requires="v">
-                <p:oleObj spid="_x0000_s1054" name="Equation" r:id="rId11" imgW="1562040" imgH="799920" progId="Equation.3">
+                <p:oleObj spid="_x0000_s1066" name="Equation" r:id="rId11" imgW="1562040" imgH="799920" progId="Equation.3">
                   <p:embed/>
                 </p:oleObj>
               </mc:Choice>
@@ -8649,7 +8651,7 @@
           <a:graphicData uri="http://schemas.openxmlformats.org/presentationml/2006/ole">
             <mc:AlternateContent xmlns:mc="http://schemas.openxmlformats.org/markup-compatibility/2006">
               <mc:Choice xmlns:v="urn:schemas-microsoft-com:vml" Requires="v">
-                <p:oleObj spid="_x0000_s1055" name="Equation" r:id="rId13" imgW="1650960" imgH="812520" progId="Equation.3">
+                <p:oleObj spid="_x0000_s1067" name="Equation" r:id="rId13" imgW="1650960" imgH="812520" progId="Equation.3">
                   <p:embed/>
                 </p:oleObj>
               </mc:Choice>
@@ -8802,6 +8804,2708 @@
     <p:extLst>
       <p:ext uri="{BB962C8B-B14F-4D97-AF65-F5344CB8AC3E}">
         <p14:creationId xmlns:p14="http://schemas.microsoft.com/office/powerpoint/2010/main" val="1835438679"/>
+      </p:ext>
+    </p:extLst>
+  </p:cSld>
+  <p:clrMapOvr>
+    <a:masterClrMapping/>
+  </p:clrMapOvr>
+</p:sld>
+</file>
+
+<file path=ppt/slides/slide6.xml><?xml version="1.0" encoding="utf-8"?>
+<p:sld xmlns:a="http://schemas.openxmlformats.org/drawingml/2006/main" xmlns:r="http://schemas.openxmlformats.org/officeDocument/2006/relationships" xmlns:p="http://schemas.openxmlformats.org/presentationml/2006/main">
+  <p:cSld>
+    <p:spTree>
+      <p:nvGrpSpPr>
+        <p:cNvPr id="1" name=""/>
+        <p:cNvGrpSpPr/>
+        <p:nvPr/>
+      </p:nvGrpSpPr>
+      <p:grpSpPr>
+        <a:xfrm>
+          <a:off x="0" y="0"/>
+          <a:ext cx="0" cy="0"/>
+          <a:chOff x="0" y="0"/>
+          <a:chExt cx="0" cy="0"/>
+        </a:xfrm>
+      </p:grpSpPr>
+      <p:cxnSp>
+        <p:nvCxnSpPr>
+          <p:cNvPr id="4" name="Straight Connector 3"/>
+          <p:cNvCxnSpPr/>
+          <p:nvPr/>
+        </p:nvCxnSpPr>
+        <p:spPr>
+          <a:xfrm flipV="1">
+            <a:off x="4543843" y="2696837"/>
+            <a:ext cx="1260000" cy="360000"/>
+          </a:xfrm>
+          <a:prstGeom prst="line">
+            <a:avLst/>
+          </a:prstGeom>
+          <a:ln w="28575">
+            <a:solidFill>
+              <a:schemeClr val="tx1"/>
+            </a:solidFill>
+          </a:ln>
+        </p:spPr>
+        <p:style>
+          <a:lnRef idx="1">
+            <a:schemeClr val="accent1"/>
+          </a:lnRef>
+          <a:fillRef idx="0">
+            <a:schemeClr val="accent1"/>
+          </a:fillRef>
+          <a:effectRef idx="0">
+            <a:schemeClr val="accent1"/>
+          </a:effectRef>
+          <a:fontRef idx="minor">
+            <a:schemeClr val="tx1"/>
+          </a:fontRef>
+        </p:style>
+      </p:cxnSp>
+      <p:cxnSp>
+        <p:nvCxnSpPr>
+          <p:cNvPr id="5" name="Straight Connector 4"/>
+          <p:cNvCxnSpPr/>
+          <p:nvPr/>
+        </p:nvCxnSpPr>
+        <p:spPr>
+          <a:xfrm>
+            <a:off x="4543843" y="3421903"/>
+            <a:ext cx="1280333" cy="360000"/>
+          </a:xfrm>
+          <a:prstGeom prst="line">
+            <a:avLst/>
+          </a:prstGeom>
+          <a:ln w="28575">
+            <a:solidFill>
+              <a:schemeClr val="tx1"/>
+            </a:solidFill>
+          </a:ln>
+        </p:spPr>
+        <p:style>
+          <a:lnRef idx="1">
+            <a:schemeClr val="accent1"/>
+          </a:lnRef>
+          <a:fillRef idx="0">
+            <a:schemeClr val="accent1"/>
+          </a:fillRef>
+          <a:effectRef idx="0">
+            <a:schemeClr val="accent1"/>
+          </a:effectRef>
+          <a:fontRef idx="minor">
+            <a:schemeClr val="tx1"/>
+          </a:fontRef>
+        </p:style>
+      </p:cxnSp>
+      <p:cxnSp>
+        <p:nvCxnSpPr>
+          <p:cNvPr id="6" name="Straight Connector 5"/>
+          <p:cNvCxnSpPr/>
+          <p:nvPr/>
+        </p:nvCxnSpPr>
+        <p:spPr>
+          <a:xfrm flipH="1">
+            <a:off x="5593665" y="2537143"/>
+            <a:ext cx="635402" cy="370244"/>
+          </a:xfrm>
+          <a:prstGeom prst="line">
+            <a:avLst/>
+          </a:prstGeom>
+          <a:ln w="28575">
+            <a:solidFill>
+              <a:schemeClr val="tx1"/>
+            </a:solidFill>
+            <a:headEnd type="none" w="med" len="med"/>
+            <a:tailEnd type="triangle" w="med" len="med"/>
+          </a:ln>
+        </p:spPr>
+        <p:style>
+          <a:lnRef idx="1">
+            <a:schemeClr val="accent1"/>
+          </a:lnRef>
+          <a:fillRef idx="0">
+            <a:schemeClr val="accent1"/>
+          </a:fillRef>
+          <a:effectRef idx="0">
+            <a:schemeClr val="accent1"/>
+          </a:effectRef>
+          <a:fontRef idx="minor">
+            <a:schemeClr val="tx1"/>
+          </a:fontRef>
+        </p:style>
+      </p:cxnSp>
+      <p:sp>
+        <p:nvSpPr>
+          <p:cNvPr id="7" name="TextBox 6"/>
+          <p:cNvSpPr txBox="1"/>
+          <p:nvPr/>
+        </p:nvSpPr>
+        <p:spPr>
+          <a:xfrm>
+            <a:off x="5869027" y="2112412"/>
+            <a:ext cx="1440160" cy="461665"/>
+          </a:xfrm>
+          <a:prstGeom prst="rect">
+            <a:avLst/>
+          </a:prstGeom>
+          <a:noFill/>
+        </p:spPr>
+        <p:txBody>
+          <a:bodyPr wrap="square" rtlCol="0">
+            <a:spAutoFit/>
+          </a:bodyPr>
+          <a:lstStyle/>
+          <a:p>
+            <a:r>
+              <a:rPr lang="en-IE" sz="1200" dirty="0" smtClean="0"/>
+              <a:t>Chipped coating segment</a:t>
+            </a:r>
+            <a:endParaRPr lang="en-IE" sz="1200" dirty="0"/>
+          </a:p>
+        </p:txBody>
+      </p:sp>
+      <p:cxnSp>
+        <p:nvCxnSpPr>
+          <p:cNvPr id="8" name="Straight Connector 7"/>
+          <p:cNvCxnSpPr/>
+          <p:nvPr/>
+        </p:nvCxnSpPr>
+        <p:spPr>
+          <a:xfrm>
+            <a:off x="4768957" y="2382676"/>
+            <a:ext cx="516868" cy="441342"/>
+          </a:xfrm>
+          <a:prstGeom prst="line">
+            <a:avLst/>
+          </a:prstGeom>
+          <a:ln w="28575">
+            <a:solidFill>
+              <a:schemeClr val="tx1"/>
+            </a:solidFill>
+            <a:headEnd type="none" w="med" len="med"/>
+            <a:tailEnd type="triangle" w="med" len="med"/>
+          </a:ln>
+        </p:spPr>
+        <p:style>
+          <a:lnRef idx="1">
+            <a:schemeClr val="accent1"/>
+          </a:lnRef>
+          <a:fillRef idx="0">
+            <a:schemeClr val="accent1"/>
+          </a:fillRef>
+          <a:effectRef idx="0">
+            <a:schemeClr val="accent1"/>
+          </a:effectRef>
+          <a:fontRef idx="minor">
+            <a:schemeClr val="tx1"/>
+          </a:fontRef>
+        </p:style>
+      </p:cxnSp>
+      <p:sp>
+        <p:nvSpPr>
+          <p:cNvPr id="9" name="TextBox 8"/>
+          <p:cNvSpPr txBox="1"/>
+          <p:nvPr/>
+        </p:nvSpPr>
+        <p:spPr>
+          <a:xfrm>
+            <a:off x="4025685" y="2105677"/>
+            <a:ext cx="1440160" cy="276999"/>
+          </a:xfrm>
+          <a:prstGeom prst="rect">
+            <a:avLst/>
+          </a:prstGeom>
+          <a:noFill/>
+        </p:spPr>
+        <p:txBody>
+          <a:bodyPr wrap="square" rtlCol="0">
+            <a:spAutoFit/>
+          </a:bodyPr>
+          <a:lstStyle/>
+          <a:p>
+            <a:r>
+              <a:rPr lang="en-IE" sz="1200" dirty="0" smtClean="0"/>
+              <a:t>Radial crack</a:t>
+            </a:r>
+            <a:endParaRPr lang="en-IE" sz="1200" dirty="0"/>
+          </a:p>
+        </p:txBody>
+      </p:sp>
+      <p:cxnSp>
+        <p:nvCxnSpPr>
+          <p:cNvPr id="11" name="Straight Connector 10"/>
+          <p:cNvCxnSpPr>
+            <a:stCxn id="18" idx="3"/>
+          </p:cNvCxnSpPr>
+          <p:nvPr/>
+        </p:nvCxnSpPr>
+        <p:spPr>
+          <a:xfrm>
+            <a:off x="4546385" y="3236824"/>
+            <a:ext cx="1277791" cy="73"/>
+          </a:xfrm>
+          <a:prstGeom prst="line">
+            <a:avLst/>
+          </a:prstGeom>
+          <a:ln w="28575">
+            <a:solidFill>
+              <a:schemeClr val="tx1"/>
+            </a:solidFill>
+            <a:headEnd type="triangle" w="med" len="med"/>
+            <a:tailEnd type="triangle" w="med" len="med"/>
+          </a:ln>
+        </p:spPr>
+        <p:style>
+          <a:lnRef idx="1">
+            <a:schemeClr val="accent1"/>
+          </a:lnRef>
+          <a:fillRef idx="0">
+            <a:schemeClr val="accent1"/>
+          </a:fillRef>
+          <a:effectRef idx="0">
+            <a:schemeClr val="accent1"/>
+          </a:effectRef>
+          <a:fontRef idx="minor">
+            <a:schemeClr val="tx1"/>
+          </a:fontRef>
+        </p:style>
+      </p:cxnSp>
+      <p:sp>
+        <p:nvSpPr>
+          <p:cNvPr id="12" name="Arc 11"/>
+          <p:cNvSpPr/>
+          <p:nvPr/>
+        </p:nvSpPr>
+        <p:spPr>
+          <a:xfrm>
+            <a:off x="4651857" y="2852936"/>
+            <a:ext cx="396044" cy="424302"/>
+          </a:xfrm>
+          <a:prstGeom prst="arc">
+            <a:avLst>
+              <a:gd name="adj1" fmla="val 18872415"/>
+              <a:gd name="adj2" fmla="val 164123"/>
+            </a:avLst>
+          </a:prstGeom>
+          <a:ln w="28575">
+            <a:solidFill>
+              <a:schemeClr val="tx1"/>
+            </a:solidFill>
+          </a:ln>
+        </p:spPr>
+        <p:style>
+          <a:lnRef idx="1">
+            <a:schemeClr val="accent1"/>
+          </a:lnRef>
+          <a:fillRef idx="0">
+            <a:schemeClr val="accent1"/>
+          </a:fillRef>
+          <a:effectRef idx="0">
+            <a:schemeClr val="accent1"/>
+          </a:effectRef>
+          <a:fontRef idx="minor">
+            <a:schemeClr val="tx1"/>
+          </a:fontRef>
+        </p:style>
+        <p:txBody>
+          <a:bodyPr rtlCol="0" anchor="ctr"/>
+          <a:lstStyle/>
+          <a:p>
+            <a:pPr algn="ctr"/>
+            <a:endParaRPr lang="en-IE"/>
+          </a:p>
+        </p:txBody>
+      </p:sp>
+      <p:cxnSp>
+        <p:nvCxnSpPr>
+          <p:cNvPr id="14" name="Straight Connector 13"/>
+          <p:cNvCxnSpPr/>
+          <p:nvPr/>
+        </p:nvCxnSpPr>
+        <p:spPr>
+          <a:xfrm>
+            <a:off x="4555203" y="2841312"/>
+            <a:ext cx="0" cy="220671"/>
+          </a:xfrm>
+          <a:prstGeom prst="line">
+            <a:avLst/>
+          </a:prstGeom>
+          <a:ln w="28575">
+            <a:solidFill>
+              <a:schemeClr val="tx1"/>
+            </a:solidFill>
+            <a:headEnd type="none" w="med" len="med"/>
+            <a:tailEnd type="triangle" w="med" len="med"/>
+          </a:ln>
+        </p:spPr>
+        <p:style>
+          <a:lnRef idx="1">
+            <a:schemeClr val="accent1"/>
+          </a:lnRef>
+          <a:fillRef idx="0">
+            <a:schemeClr val="accent1"/>
+          </a:fillRef>
+          <a:effectRef idx="0">
+            <a:schemeClr val="accent1"/>
+          </a:effectRef>
+          <a:fontRef idx="minor">
+            <a:schemeClr val="tx1"/>
+          </a:fontRef>
+        </p:style>
+      </p:cxnSp>
+      <p:cxnSp>
+        <p:nvCxnSpPr>
+          <p:cNvPr id="15" name="Straight Connector 14"/>
+          <p:cNvCxnSpPr/>
+          <p:nvPr/>
+        </p:nvCxnSpPr>
+        <p:spPr>
+          <a:xfrm flipV="1">
+            <a:off x="4548239" y="3402209"/>
+            <a:ext cx="0" cy="220671"/>
+          </a:xfrm>
+          <a:prstGeom prst="line">
+            <a:avLst/>
+          </a:prstGeom>
+          <a:ln w="28575">
+            <a:solidFill>
+              <a:schemeClr val="tx1"/>
+            </a:solidFill>
+            <a:headEnd type="none" w="med" len="med"/>
+            <a:tailEnd type="triangle" w="med" len="med"/>
+          </a:ln>
+        </p:spPr>
+        <p:style>
+          <a:lnRef idx="1">
+            <a:schemeClr val="accent1"/>
+          </a:lnRef>
+          <a:fillRef idx="0">
+            <a:schemeClr val="accent1"/>
+          </a:fillRef>
+          <a:effectRef idx="0">
+            <a:schemeClr val="accent1"/>
+          </a:effectRef>
+          <a:fontRef idx="minor">
+            <a:schemeClr val="tx1"/>
+          </a:fontRef>
+        </p:style>
+      </p:cxnSp>
+      <p:cxnSp>
+        <p:nvCxnSpPr>
+          <p:cNvPr id="17" name="Straight Connector 16"/>
+          <p:cNvCxnSpPr/>
+          <p:nvPr/>
+        </p:nvCxnSpPr>
+        <p:spPr>
+          <a:xfrm>
+            <a:off x="5800051" y="2687897"/>
+            <a:ext cx="24125" cy="1098000"/>
+          </a:xfrm>
+          <a:prstGeom prst="line">
+            <a:avLst/>
+          </a:prstGeom>
+          <a:ln w="28575">
+            <a:solidFill>
+              <a:schemeClr val="tx1"/>
+            </a:solidFill>
+          </a:ln>
+        </p:spPr>
+        <p:style>
+          <a:lnRef idx="1">
+            <a:schemeClr val="accent1"/>
+          </a:lnRef>
+          <a:fillRef idx="0">
+            <a:schemeClr val="accent1"/>
+          </a:fillRef>
+          <a:effectRef idx="0">
+            <a:schemeClr val="accent1"/>
+          </a:effectRef>
+          <a:fontRef idx="minor">
+            <a:schemeClr val="tx1"/>
+          </a:fontRef>
+        </p:style>
+      </p:cxnSp>
+      <p:sp>
+        <p:nvSpPr>
+          <p:cNvPr id="18" name="Isosceles Triangle 17"/>
+          <p:cNvSpPr/>
+          <p:nvPr/>
+        </p:nvSpPr>
+        <p:spPr>
+          <a:xfrm rot="16200000">
+            <a:off x="3389477" y="2259916"/>
+            <a:ext cx="360000" cy="1953816"/>
+          </a:xfrm>
+          <a:prstGeom prst="triangle">
+            <a:avLst/>
+          </a:prstGeom>
+          <a:pattFill prst="wdDnDiag">
+            <a:fgClr>
+              <a:schemeClr val="bg1">
+                <a:lumMod val="65000"/>
+              </a:schemeClr>
+            </a:fgClr>
+            <a:bgClr>
+              <a:schemeClr val="bg1"/>
+            </a:bgClr>
+          </a:pattFill>
+          <a:ln>
+            <a:solidFill>
+              <a:schemeClr val="tx1"/>
+            </a:solidFill>
+          </a:ln>
+        </p:spPr>
+        <p:style>
+          <a:lnRef idx="2">
+            <a:schemeClr val="accent1">
+              <a:shade val="50000"/>
+            </a:schemeClr>
+          </a:lnRef>
+          <a:fillRef idx="1">
+            <a:schemeClr val="accent1"/>
+          </a:fillRef>
+          <a:effectRef idx="0">
+            <a:schemeClr val="accent1"/>
+          </a:effectRef>
+          <a:fontRef idx="minor">
+            <a:schemeClr val="lt1"/>
+          </a:fontRef>
+        </p:style>
+        <p:txBody>
+          <a:bodyPr rtlCol="0" anchor="ctr"/>
+          <a:lstStyle/>
+          <a:p>
+            <a:pPr algn="ctr"/>
+            <a:endParaRPr lang="en-IE"/>
+          </a:p>
+        </p:txBody>
+      </p:sp>
+      <p:cxnSp>
+        <p:nvCxnSpPr>
+          <p:cNvPr id="19" name="Straight Connector 18"/>
+          <p:cNvCxnSpPr/>
+          <p:nvPr/>
+        </p:nvCxnSpPr>
+        <p:spPr>
+          <a:xfrm>
+            <a:off x="3660317" y="2803936"/>
+            <a:ext cx="516868" cy="441342"/>
+          </a:xfrm>
+          <a:prstGeom prst="line">
+            <a:avLst/>
+          </a:prstGeom>
+          <a:ln w="28575">
+            <a:solidFill>
+              <a:schemeClr val="tx1"/>
+            </a:solidFill>
+            <a:headEnd type="none" w="med" len="med"/>
+            <a:tailEnd type="triangle" w="med" len="med"/>
+          </a:ln>
+        </p:spPr>
+        <p:style>
+          <a:lnRef idx="1">
+            <a:schemeClr val="accent1"/>
+          </a:lnRef>
+          <a:fillRef idx="0">
+            <a:schemeClr val="accent1"/>
+          </a:fillRef>
+          <a:effectRef idx="0">
+            <a:schemeClr val="accent1"/>
+          </a:effectRef>
+          <a:fontRef idx="minor">
+            <a:schemeClr val="tx1"/>
+          </a:fontRef>
+        </p:style>
+      </p:cxnSp>
+      <p:sp>
+        <p:nvSpPr>
+          <p:cNvPr id="20" name="TextBox 19"/>
+          <p:cNvSpPr txBox="1"/>
+          <p:nvPr/>
+        </p:nvSpPr>
+        <p:spPr>
+          <a:xfrm>
+            <a:off x="2917045" y="2526937"/>
+            <a:ext cx="1440160" cy="276999"/>
+          </a:xfrm>
+          <a:prstGeom prst="rect">
+            <a:avLst/>
+          </a:prstGeom>
+          <a:noFill/>
+        </p:spPr>
+        <p:txBody>
+          <a:bodyPr wrap="square" rtlCol="0">
+            <a:spAutoFit/>
+          </a:bodyPr>
+          <a:lstStyle/>
+          <a:p>
+            <a:r>
+              <a:rPr lang="en-IE" sz="1200" dirty="0" smtClean="0"/>
+              <a:t>Indenter / Stylus</a:t>
+            </a:r>
+            <a:endParaRPr lang="en-IE" sz="1200" dirty="0"/>
+          </a:p>
+        </p:txBody>
+      </p:sp>
+      <p:cxnSp>
+        <p:nvCxnSpPr>
+          <p:cNvPr id="21" name="Straight Connector 20"/>
+          <p:cNvCxnSpPr/>
+          <p:nvPr/>
+        </p:nvCxnSpPr>
+        <p:spPr>
+          <a:xfrm>
+            <a:off x="4560102" y="3071790"/>
+            <a:ext cx="1277791" cy="73"/>
+          </a:xfrm>
+          <a:prstGeom prst="line">
+            <a:avLst/>
+          </a:prstGeom>
+          <a:ln w="19050">
+            <a:solidFill>
+              <a:schemeClr val="tx1"/>
+            </a:solidFill>
+            <a:prstDash val="dash"/>
+            <a:headEnd type="none" w="med" len="med"/>
+            <a:tailEnd type="none" w="med" len="med"/>
+          </a:ln>
+        </p:spPr>
+        <p:style>
+          <a:lnRef idx="1">
+            <a:schemeClr val="accent1"/>
+          </a:lnRef>
+          <a:fillRef idx="0">
+            <a:schemeClr val="accent1"/>
+          </a:fillRef>
+          <a:effectRef idx="0">
+            <a:schemeClr val="accent1"/>
+          </a:effectRef>
+          <a:fontRef idx="minor">
+            <a:schemeClr val="tx1"/>
+          </a:fontRef>
+        </p:style>
+      </p:cxnSp>
+      <p:cxnSp>
+        <p:nvCxnSpPr>
+          <p:cNvPr id="22" name="Straight Connector 21"/>
+          <p:cNvCxnSpPr/>
+          <p:nvPr/>
+        </p:nvCxnSpPr>
+        <p:spPr>
+          <a:xfrm>
+            <a:off x="2630912" y="2419868"/>
+            <a:ext cx="713825" cy="0"/>
+          </a:xfrm>
+          <a:prstGeom prst="line">
+            <a:avLst/>
+          </a:prstGeom>
+          <a:ln w="38100">
+            <a:solidFill>
+              <a:schemeClr val="tx1"/>
+            </a:solidFill>
+            <a:headEnd type="none" w="med" len="med"/>
+            <a:tailEnd type="triangle" w="med" len="med"/>
+          </a:ln>
+        </p:spPr>
+        <p:style>
+          <a:lnRef idx="1">
+            <a:schemeClr val="accent1"/>
+          </a:lnRef>
+          <a:fillRef idx="0">
+            <a:schemeClr val="accent1"/>
+          </a:fillRef>
+          <a:effectRef idx="0">
+            <a:schemeClr val="accent1"/>
+          </a:effectRef>
+          <a:fontRef idx="minor">
+            <a:schemeClr val="tx1"/>
+          </a:fontRef>
+        </p:style>
+      </p:cxnSp>
+      <p:sp>
+        <p:nvSpPr>
+          <p:cNvPr id="23" name="TextBox 22"/>
+          <p:cNvSpPr txBox="1"/>
+          <p:nvPr/>
+        </p:nvSpPr>
+        <p:spPr>
+          <a:xfrm>
+            <a:off x="2267744" y="2143889"/>
+            <a:ext cx="1440160" cy="276999"/>
+          </a:xfrm>
+          <a:prstGeom prst="rect">
+            <a:avLst/>
+          </a:prstGeom>
+          <a:noFill/>
+        </p:spPr>
+        <p:txBody>
+          <a:bodyPr wrap="square" rtlCol="0">
+            <a:spAutoFit/>
+          </a:bodyPr>
+          <a:lstStyle/>
+          <a:p>
+            <a:pPr algn="ctr"/>
+            <a:r>
+              <a:rPr lang="en-IE" sz="1200" dirty="0" smtClean="0"/>
+              <a:t>Scratch direction</a:t>
+            </a:r>
+            <a:endParaRPr lang="en-IE" sz="1200" dirty="0"/>
+          </a:p>
+        </p:txBody>
+      </p:sp>
+      <mc:AlternateContent xmlns:mc="http://schemas.openxmlformats.org/markup-compatibility/2006" xmlns:a14="http://schemas.microsoft.com/office/drawing/2010/main">
+        <mc:Choice Requires="a14">
+          <p:sp>
+            <p:nvSpPr>
+              <p:cNvPr id="24" name="TextBox 23"/>
+              <p:cNvSpPr txBox="1"/>
+              <p:nvPr/>
+            </p:nvSpPr>
+            <p:spPr>
+              <a:xfrm>
+                <a:off x="5093817" y="2818704"/>
+                <a:ext cx="317586" cy="276999"/>
+              </a:xfrm>
+              <a:prstGeom prst="rect">
+                <a:avLst/>
+              </a:prstGeom>
+              <a:noFill/>
+            </p:spPr>
+            <p:txBody>
+              <a:bodyPr wrap="none" rtlCol="0">
+                <a:spAutoFit/>
+              </a:bodyPr>
+              <a:lstStyle/>
+              <a:p>
+                <a:pPr/>
+                <a14:m>
+                  <m:oMathPara xmlns:m="http://schemas.openxmlformats.org/officeDocument/2006/math">
+                    <m:oMathParaPr>
+                      <m:jc m:val="centerGroup"/>
+                    </m:oMathParaPr>
+                    <m:oMath xmlns:m="http://schemas.openxmlformats.org/officeDocument/2006/math">
+                      <m:r>
+                        <a:rPr lang="fr-FR" sz="1200" i="1" smtClean="0">
+                          <a:latin typeface="Cambria Math"/>
+                          <a:ea typeface="Cambria Math"/>
+                        </a:rPr>
+                        <m:t>𝛽</m:t>
+                      </m:r>
+                    </m:oMath>
+                  </m:oMathPara>
+                </a14:m>
+                <a:endParaRPr lang="fr-FR" sz="1200" dirty="0"/>
+              </a:p>
+            </p:txBody>
+          </p:sp>
+        </mc:Choice>
+        <mc:Fallback xmlns="">
+          <p:sp>
+            <p:nvSpPr>
+              <p:cNvPr id="24" name="TextBox 23"/>
+              <p:cNvSpPr txBox="1">
+                <a:spLocks noRot="1" noChangeAspect="1" noMove="1" noResize="1" noEditPoints="1" noAdjustHandles="1" noChangeArrowheads="1" noChangeShapeType="1" noTextEdit="1"/>
+              </p:cNvSpPr>
+              <p:nvPr/>
+            </p:nvSpPr>
+            <p:spPr>
+              <a:xfrm>
+                <a:off x="5093817" y="2818704"/>
+                <a:ext cx="317586" cy="276999"/>
+              </a:xfrm>
+              <a:prstGeom prst="rect">
+                <a:avLst/>
+              </a:prstGeom>
+              <a:blipFill rotWithShape="1">
+                <a:blip r:embed="rId2"/>
+                <a:stretch>
+                  <a:fillRect b="-2174"/>
+                </a:stretch>
+              </a:blipFill>
+            </p:spPr>
+            <p:txBody>
+              <a:bodyPr/>
+              <a:lstStyle/>
+              <a:p>
+                <a:r>
+                  <a:rPr lang="fr-FR">
+                    <a:noFill/>
+                  </a:rPr>
+                  <a:t> </a:t>
+                </a:r>
+              </a:p>
+            </p:txBody>
+          </p:sp>
+        </mc:Fallback>
+      </mc:AlternateContent>
+      <mc:AlternateContent xmlns:mc="http://schemas.openxmlformats.org/markup-compatibility/2006" xmlns:a14="http://schemas.microsoft.com/office/drawing/2010/main">
+        <mc:Choice Requires="a14">
+          <p:sp>
+            <p:nvSpPr>
+              <p:cNvPr id="25" name="TextBox 24"/>
+              <p:cNvSpPr txBox="1"/>
+              <p:nvPr/>
+            </p:nvSpPr>
+            <p:spPr>
+              <a:xfrm>
+                <a:off x="5100422" y="3235545"/>
+                <a:ext cx="272895" cy="276999"/>
+              </a:xfrm>
+              <a:prstGeom prst="rect">
+                <a:avLst/>
+              </a:prstGeom>
+              <a:noFill/>
+            </p:spPr>
+            <p:txBody>
+              <a:bodyPr wrap="none" rtlCol="0">
+                <a:spAutoFit/>
+              </a:bodyPr>
+              <a:lstStyle/>
+              <a:p>
+                <a:pPr/>
+                <a14:m>
+                  <m:oMathPara xmlns:m="http://schemas.openxmlformats.org/officeDocument/2006/math">
+                    <m:oMathParaPr>
+                      <m:jc m:val="centerGroup"/>
+                    </m:oMathParaPr>
+                    <m:oMath xmlns:m="http://schemas.openxmlformats.org/officeDocument/2006/math">
+                      <m:r>
+                        <a:rPr lang="en-IE" sz="1200" b="0" i="1" smtClean="0">
+                          <a:latin typeface="Cambria Math"/>
+                          <a:ea typeface="Cambria Math"/>
+                        </a:rPr>
+                        <m:t>𝑙</m:t>
+                      </m:r>
+                    </m:oMath>
+                  </m:oMathPara>
+                </a14:m>
+                <a:endParaRPr lang="fr-FR" sz="1200" dirty="0"/>
+              </a:p>
+            </p:txBody>
+          </p:sp>
+        </mc:Choice>
+        <mc:Fallback xmlns="">
+          <p:sp>
+            <p:nvSpPr>
+              <p:cNvPr id="25" name="TextBox 24"/>
+              <p:cNvSpPr txBox="1">
+                <a:spLocks noRot="1" noChangeAspect="1" noMove="1" noResize="1" noEditPoints="1" noAdjustHandles="1" noChangeArrowheads="1" noChangeShapeType="1" noTextEdit="1"/>
+              </p:cNvSpPr>
+              <p:nvPr/>
+            </p:nvSpPr>
+            <p:spPr>
+              <a:xfrm>
+                <a:off x="5100422" y="3235545"/>
+                <a:ext cx="272895" cy="276999"/>
+              </a:xfrm>
+              <a:prstGeom prst="rect">
+                <a:avLst/>
+              </a:prstGeom>
+              <a:blipFill rotWithShape="1">
+                <a:blip r:embed="rId3"/>
+                <a:stretch>
+                  <a:fillRect/>
+                </a:stretch>
+              </a:blipFill>
+            </p:spPr>
+            <p:txBody>
+              <a:bodyPr/>
+              <a:lstStyle/>
+              <a:p>
+                <a:r>
+                  <a:rPr lang="fr-FR">
+                    <a:noFill/>
+                  </a:rPr>
+                  <a:t> </a:t>
+                </a:r>
+              </a:p>
+            </p:txBody>
+          </p:sp>
+        </mc:Fallback>
+      </mc:AlternateContent>
+      <mc:AlternateContent xmlns:mc="http://schemas.openxmlformats.org/markup-compatibility/2006" xmlns:a14="http://schemas.microsoft.com/office/drawing/2010/main">
+        <mc:Choice Requires="a14">
+          <p:sp>
+            <p:nvSpPr>
+              <p:cNvPr id="26" name="TextBox 25"/>
+              <p:cNvSpPr txBox="1"/>
+              <p:nvPr/>
+            </p:nvSpPr>
+            <p:spPr>
+              <a:xfrm>
+                <a:off x="4396410" y="3622880"/>
+                <a:ext cx="338233" cy="276999"/>
+              </a:xfrm>
+              <a:prstGeom prst="rect">
+                <a:avLst/>
+              </a:prstGeom>
+              <a:noFill/>
+            </p:spPr>
+            <p:txBody>
+              <a:bodyPr wrap="none" rtlCol="0">
+                <a:spAutoFit/>
+              </a:bodyPr>
+              <a:lstStyle/>
+              <a:p>
+                <a:pPr/>
+                <a14:m>
+                  <m:oMathPara xmlns:m="http://schemas.openxmlformats.org/officeDocument/2006/math">
+                    <m:oMathParaPr>
+                      <m:jc m:val="centerGroup"/>
+                    </m:oMathParaPr>
+                    <m:oMath xmlns:m="http://schemas.openxmlformats.org/officeDocument/2006/math">
+                      <m:r>
+                        <a:rPr lang="en-IE" sz="1200" b="0" i="1" smtClean="0">
+                          <a:latin typeface="Cambria Math"/>
+                          <a:ea typeface="Cambria Math"/>
+                        </a:rPr>
+                        <m:t>𝑤</m:t>
+                      </m:r>
+                    </m:oMath>
+                  </m:oMathPara>
+                </a14:m>
+                <a:endParaRPr lang="fr-FR" sz="1200" dirty="0"/>
+              </a:p>
+            </p:txBody>
+          </p:sp>
+        </mc:Choice>
+        <mc:Fallback xmlns="">
+          <p:sp>
+            <p:nvSpPr>
+              <p:cNvPr id="26" name="TextBox 25"/>
+              <p:cNvSpPr txBox="1">
+                <a:spLocks noRot="1" noChangeAspect="1" noMove="1" noResize="1" noEditPoints="1" noAdjustHandles="1" noChangeArrowheads="1" noChangeShapeType="1" noTextEdit="1"/>
+              </p:cNvSpPr>
+              <p:nvPr/>
+            </p:nvSpPr>
+            <p:spPr>
+              <a:xfrm>
+                <a:off x="4396410" y="3622880"/>
+                <a:ext cx="338233" cy="276999"/>
+              </a:xfrm>
+              <a:prstGeom prst="rect">
+                <a:avLst/>
+              </a:prstGeom>
+              <a:blipFill rotWithShape="1">
+                <a:blip r:embed="rId4"/>
+                <a:stretch>
+                  <a:fillRect/>
+                </a:stretch>
+              </a:blipFill>
+            </p:spPr>
+            <p:txBody>
+              <a:bodyPr/>
+              <a:lstStyle/>
+              <a:p>
+                <a:r>
+                  <a:rPr lang="fr-FR">
+                    <a:noFill/>
+                  </a:rPr>
+                  <a:t> </a:t>
+                </a:r>
+              </a:p>
+            </p:txBody>
+          </p:sp>
+        </mc:Fallback>
+      </mc:AlternateContent>
+    </p:spTree>
+    <p:extLst>
+      <p:ext uri="{BB962C8B-B14F-4D97-AF65-F5344CB8AC3E}">
+        <p14:creationId xmlns:p14="http://schemas.microsoft.com/office/powerpoint/2010/main" val="3833308028"/>
+      </p:ext>
+    </p:extLst>
+  </p:cSld>
+  <p:clrMapOvr>
+    <a:masterClrMapping/>
+  </p:clrMapOvr>
+</p:sld>
+</file>
+
+<file path=ppt/slides/slide7.xml><?xml version="1.0" encoding="utf-8"?>
+<p:sld xmlns:a="http://schemas.openxmlformats.org/drawingml/2006/main" xmlns:r="http://schemas.openxmlformats.org/officeDocument/2006/relationships" xmlns:p="http://schemas.openxmlformats.org/presentationml/2006/main">
+  <p:cSld>
+    <p:spTree>
+      <p:nvGrpSpPr>
+        <p:cNvPr id="1" name=""/>
+        <p:cNvGrpSpPr/>
+        <p:nvPr/>
+      </p:nvGrpSpPr>
+      <p:grpSpPr>
+        <a:xfrm>
+          <a:off x="0" y="0"/>
+          <a:ext cx="0" cy="0"/>
+          <a:chOff x="0" y="0"/>
+          <a:chExt cx="0" cy="0"/>
+        </a:xfrm>
+      </p:grpSpPr>
+      <p:sp>
+        <p:nvSpPr>
+          <p:cNvPr id="4" name="Oval 3"/>
+          <p:cNvSpPr/>
+          <p:nvPr/>
+        </p:nvSpPr>
+        <p:spPr>
+          <a:xfrm>
+            <a:off x="1259632" y="3119433"/>
+            <a:ext cx="360040" cy="360040"/>
+          </a:xfrm>
+          <a:prstGeom prst="ellipse">
+            <a:avLst/>
+          </a:prstGeom>
+          <a:solidFill>
+            <a:schemeClr val="bg1">
+              <a:lumMod val="65000"/>
+            </a:schemeClr>
+          </a:solidFill>
+          <a:ln>
+            <a:solidFill>
+              <a:schemeClr val="tx1"/>
+            </a:solidFill>
+          </a:ln>
+        </p:spPr>
+        <p:style>
+          <a:lnRef idx="2">
+            <a:schemeClr val="accent1">
+              <a:shade val="50000"/>
+            </a:schemeClr>
+          </a:lnRef>
+          <a:fillRef idx="1">
+            <a:schemeClr val="accent1"/>
+          </a:fillRef>
+          <a:effectRef idx="0">
+            <a:schemeClr val="accent1"/>
+          </a:effectRef>
+          <a:fontRef idx="minor">
+            <a:schemeClr val="lt1"/>
+          </a:fontRef>
+        </p:style>
+        <p:txBody>
+          <a:bodyPr rtlCol="0" anchor="ctr"/>
+          <a:lstStyle/>
+          <a:p>
+            <a:pPr algn="ctr"/>
+            <a:endParaRPr lang="en-IE"/>
+          </a:p>
+        </p:txBody>
+      </p:sp>
+      <p:sp>
+        <p:nvSpPr>
+          <p:cNvPr id="5" name="Isosceles Triangle 4"/>
+          <p:cNvSpPr/>
+          <p:nvPr/>
+        </p:nvSpPr>
+        <p:spPr>
+          <a:xfrm>
+            <a:off x="6378280" y="3157368"/>
+            <a:ext cx="432000" cy="360000"/>
+          </a:xfrm>
+          <a:prstGeom prst="triangle">
+            <a:avLst/>
+          </a:prstGeom>
+          <a:solidFill>
+            <a:schemeClr val="bg1">
+              <a:lumMod val="65000"/>
+            </a:schemeClr>
+          </a:solidFill>
+          <a:ln>
+            <a:solidFill>
+              <a:schemeClr val="tx1"/>
+            </a:solidFill>
+          </a:ln>
+        </p:spPr>
+        <p:style>
+          <a:lnRef idx="2">
+            <a:schemeClr val="accent1">
+              <a:shade val="50000"/>
+            </a:schemeClr>
+          </a:lnRef>
+          <a:fillRef idx="1">
+            <a:schemeClr val="accent1"/>
+          </a:fillRef>
+          <a:effectRef idx="0">
+            <a:schemeClr val="accent1"/>
+          </a:effectRef>
+          <a:fontRef idx="minor">
+            <a:schemeClr val="lt1"/>
+          </a:fontRef>
+        </p:style>
+        <p:txBody>
+          <a:bodyPr rtlCol="0" anchor="ctr"/>
+          <a:lstStyle/>
+          <a:p>
+            <a:pPr algn="ctr"/>
+            <a:endParaRPr lang="en-IE"/>
+          </a:p>
+        </p:txBody>
+      </p:sp>
+      <p:cxnSp>
+        <p:nvCxnSpPr>
+          <p:cNvPr id="6" name="Straight Connector 5"/>
+          <p:cNvCxnSpPr>
+            <a:stCxn id="4" idx="0"/>
+          </p:cNvCxnSpPr>
+          <p:nvPr/>
+        </p:nvCxnSpPr>
+        <p:spPr>
+          <a:xfrm flipV="1">
+            <a:off x="1439652" y="2759393"/>
+            <a:ext cx="1260000" cy="360000"/>
+          </a:xfrm>
+          <a:prstGeom prst="line">
+            <a:avLst/>
+          </a:prstGeom>
+          <a:ln w="28575">
+            <a:solidFill>
+              <a:schemeClr val="tx1"/>
+            </a:solidFill>
+          </a:ln>
+        </p:spPr>
+        <p:style>
+          <a:lnRef idx="1">
+            <a:schemeClr val="accent1"/>
+          </a:lnRef>
+          <a:fillRef idx="0">
+            <a:schemeClr val="accent1"/>
+          </a:fillRef>
+          <a:effectRef idx="0">
+            <a:schemeClr val="accent1"/>
+          </a:effectRef>
+          <a:fontRef idx="minor">
+            <a:schemeClr val="tx1"/>
+          </a:fontRef>
+        </p:style>
+      </p:cxnSp>
+      <p:cxnSp>
+        <p:nvCxnSpPr>
+          <p:cNvPr id="7" name="Straight Connector 6"/>
+          <p:cNvCxnSpPr/>
+          <p:nvPr/>
+        </p:nvCxnSpPr>
+        <p:spPr>
+          <a:xfrm>
+            <a:off x="1439650" y="3479473"/>
+            <a:ext cx="1260000" cy="360000"/>
+          </a:xfrm>
+          <a:prstGeom prst="line">
+            <a:avLst/>
+          </a:prstGeom>
+          <a:ln w="28575">
+            <a:solidFill>
+              <a:schemeClr val="tx1"/>
+            </a:solidFill>
+          </a:ln>
+        </p:spPr>
+        <p:style>
+          <a:lnRef idx="1">
+            <a:schemeClr val="accent1"/>
+          </a:lnRef>
+          <a:fillRef idx="0">
+            <a:schemeClr val="accent1"/>
+          </a:fillRef>
+          <a:effectRef idx="0">
+            <a:schemeClr val="accent1"/>
+          </a:effectRef>
+          <a:fontRef idx="minor">
+            <a:schemeClr val="tx1"/>
+          </a:fontRef>
+        </p:style>
+      </p:cxnSp>
+      <p:sp>
+        <p:nvSpPr>
+          <p:cNvPr id="8" name="Arc 7"/>
+          <p:cNvSpPr/>
+          <p:nvPr/>
+        </p:nvSpPr>
+        <p:spPr>
+          <a:xfrm>
+            <a:off x="1979872" y="2759393"/>
+            <a:ext cx="1440000" cy="1080080"/>
+          </a:xfrm>
+          <a:prstGeom prst="arc">
+            <a:avLst>
+              <a:gd name="adj1" fmla="val 16200000"/>
+              <a:gd name="adj2" fmla="val 5410194"/>
+            </a:avLst>
+          </a:prstGeom>
+          <a:ln w="28575">
+            <a:solidFill>
+              <a:schemeClr val="tx1"/>
+            </a:solidFill>
+          </a:ln>
+        </p:spPr>
+        <p:style>
+          <a:lnRef idx="1">
+            <a:schemeClr val="accent1"/>
+          </a:lnRef>
+          <a:fillRef idx="0">
+            <a:schemeClr val="accent1"/>
+          </a:fillRef>
+          <a:effectRef idx="0">
+            <a:schemeClr val="accent1"/>
+          </a:effectRef>
+          <a:fontRef idx="minor">
+            <a:schemeClr val="tx1"/>
+          </a:fontRef>
+        </p:style>
+        <p:txBody>
+          <a:bodyPr rtlCol="0" anchor="ctr"/>
+          <a:lstStyle/>
+          <a:p>
+            <a:pPr algn="ctr"/>
+            <a:endParaRPr lang="en-IE"/>
+          </a:p>
+        </p:txBody>
+      </p:sp>
+      <p:sp>
+        <p:nvSpPr>
+          <p:cNvPr id="9" name="Arc 8"/>
+          <p:cNvSpPr/>
+          <p:nvPr/>
+        </p:nvSpPr>
+        <p:spPr>
+          <a:xfrm>
+            <a:off x="5850128" y="2606704"/>
+            <a:ext cx="1476000" cy="1764136"/>
+          </a:xfrm>
+          <a:prstGeom prst="arc">
+            <a:avLst>
+              <a:gd name="adj1" fmla="val 16200000"/>
+              <a:gd name="adj2" fmla="val 1441878"/>
+            </a:avLst>
+          </a:prstGeom>
+          <a:ln w="28575">
+            <a:solidFill>
+              <a:schemeClr val="tx1"/>
+            </a:solidFill>
+          </a:ln>
+        </p:spPr>
+        <p:style>
+          <a:lnRef idx="1">
+            <a:schemeClr val="accent1"/>
+          </a:lnRef>
+          <a:fillRef idx="0">
+            <a:schemeClr val="accent1"/>
+          </a:fillRef>
+          <a:effectRef idx="0">
+            <a:schemeClr val="accent1"/>
+          </a:effectRef>
+          <a:fontRef idx="minor">
+            <a:schemeClr val="tx1"/>
+          </a:fontRef>
+        </p:style>
+        <p:txBody>
+          <a:bodyPr rtlCol="0" anchor="ctr"/>
+          <a:lstStyle/>
+          <a:p>
+            <a:pPr algn="ctr"/>
+            <a:endParaRPr lang="en-IE"/>
+          </a:p>
+        </p:txBody>
+      </p:sp>
+      <p:cxnSp>
+        <p:nvCxnSpPr>
+          <p:cNvPr id="10" name="Straight Connector 9"/>
+          <p:cNvCxnSpPr/>
+          <p:nvPr/>
+        </p:nvCxnSpPr>
+        <p:spPr>
+          <a:xfrm flipH="1" flipV="1">
+            <a:off x="6602144" y="2617368"/>
+            <a:ext cx="0" cy="540000"/>
+          </a:xfrm>
+          <a:prstGeom prst="line">
+            <a:avLst/>
+          </a:prstGeom>
+          <a:ln w="28575">
+            <a:solidFill>
+              <a:schemeClr val="tx1"/>
+            </a:solidFill>
+          </a:ln>
+        </p:spPr>
+        <p:style>
+          <a:lnRef idx="1">
+            <a:schemeClr val="accent1"/>
+          </a:lnRef>
+          <a:fillRef idx="0">
+            <a:schemeClr val="accent1"/>
+          </a:fillRef>
+          <a:effectRef idx="0">
+            <a:schemeClr val="accent1"/>
+          </a:effectRef>
+          <a:fontRef idx="minor">
+            <a:schemeClr val="tx1"/>
+          </a:fontRef>
+        </p:style>
+      </p:cxnSp>
+      <p:cxnSp>
+        <p:nvCxnSpPr>
+          <p:cNvPr id="11" name="Straight Connector 10"/>
+          <p:cNvCxnSpPr/>
+          <p:nvPr/>
+        </p:nvCxnSpPr>
+        <p:spPr>
+          <a:xfrm flipH="1" flipV="1">
+            <a:off x="6810280" y="3517368"/>
+            <a:ext cx="468000" cy="270000"/>
+          </a:xfrm>
+          <a:prstGeom prst="line">
+            <a:avLst/>
+          </a:prstGeom>
+          <a:ln w="28575">
+            <a:solidFill>
+              <a:schemeClr val="tx1"/>
+            </a:solidFill>
+          </a:ln>
+        </p:spPr>
+        <p:style>
+          <a:lnRef idx="1">
+            <a:schemeClr val="accent1"/>
+          </a:lnRef>
+          <a:fillRef idx="0">
+            <a:schemeClr val="accent1"/>
+          </a:fillRef>
+          <a:effectRef idx="0">
+            <a:schemeClr val="accent1"/>
+          </a:effectRef>
+          <a:fontRef idx="minor">
+            <a:schemeClr val="tx1"/>
+          </a:fontRef>
+        </p:style>
+      </p:cxnSp>
+      <p:cxnSp>
+        <p:nvCxnSpPr>
+          <p:cNvPr id="12" name="Straight Connector 11"/>
+          <p:cNvCxnSpPr/>
+          <p:nvPr/>
+        </p:nvCxnSpPr>
+        <p:spPr>
+          <a:xfrm>
+            <a:off x="922784" y="2858091"/>
+            <a:ext cx="516868" cy="441342"/>
+          </a:xfrm>
+          <a:prstGeom prst="line">
+            <a:avLst/>
+          </a:prstGeom>
+          <a:ln w="28575">
+            <a:solidFill>
+              <a:schemeClr val="tx1"/>
+            </a:solidFill>
+            <a:headEnd type="none" w="med" len="med"/>
+            <a:tailEnd type="triangle" w="med" len="med"/>
+          </a:ln>
+        </p:spPr>
+        <p:style>
+          <a:lnRef idx="1">
+            <a:schemeClr val="accent1"/>
+          </a:lnRef>
+          <a:fillRef idx="0">
+            <a:schemeClr val="accent1"/>
+          </a:fillRef>
+          <a:effectRef idx="0">
+            <a:schemeClr val="accent1"/>
+          </a:effectRef>
+          <a:fontRef idx="minor">
+            <a:schemeClr val="tx1"/>
+          </a:fontRef>
+        </p:style>
+      </p:cxnSp>
+      <p:cxnSp>
+        <p:nvCxnSpPr>
+          <p:cNvPr id="13" name="Straight Connector 12"/>
+          <p:cNvCxnSpPr/>
+          <p:nvPr/>
+        </p:nvCxnSpPr>
+        <p:spPr>
+          <a:xfrm>
+            <a:off x="6085276" y="2985434"/>
+            <a:ext cx="516868" cy="441342"/>
+          </a:xfrm>
+          <a:prstGeom prst="line">
+            <a:avLst/>
+          </a:prstGeom>
+          <a:ln w="28575">
+            <a:solidFill>
+              <a:schemeClr val="tx1"/>
+            </a:solidFill>
+            <a:headEnd type="none" w="med" len="med"/>
+            <a:tailEnd type="triangle" w="med" len="med"/>
+          </a:ln>
+        </p:spPr>
+        <p:style>
+          <a:lnRef idx="1">
+            <a:schemeClr val="accent1"/>
+          </a:lnRef>
+          <a:fillRef idx="0">
+            <a:schemeClr val="accent1"/>
+          </a:fillRef>
+          <a:effectRef idx="0">
+            <a:schemeClr val="accent1"/>
+          </a:effectRef>
+          <a:fontRef idx="minor">
+            <a:schemeClr val="tx1"/>
+          </a:fontRef>
+        </p:style>
+      </p:cxnSp>
+      <p:cxnSp>
+        <p:nvCxnSpPr>
+          <p:cNvPr id="14" name="Straight Connector 13"/>
+          <p:cNvCxnSpPr/>
+          <p:nvPr/>
+        </p:nvCxnSpPr>
+        <p:spPr>
+          <a:xfrm flipV="1">
+            <a:off x="6606472" y="2869610"/>
+            <a:ext cx="530043" cy="324334"/>
+          </a:xfrm>
+          <a:prstGeom prst="line">
+            <a:avLst/>
+          </a:prstGeom>
+          <a:ln w="28575">
+            <a:solidFill>
+              <a:schemeClr val="tx1"/>
+            </a:solidFill>
+            <a:headEnd type="triangle" w="med" len="med"/>
+            <a:tailEnd type="triangle" w="med" len="med"/>
+          </a:ln>
+        </p:spPr>
+        <p:style>
+          <a:lnRef idx="1">
+            <a:schemeClr val="accent1"/>
+          </a:lnRef>
+          <a:fillRef idx="0">
+            <a:schemeClr val="accent1"/>
+          </a:fillRef>
+          <a:effectRef idx="0">
+            <a:schemeClr val="accent1"/>
+          </a:effectRef>
+          <a:fontRef idx="minor">
+            <a:schemeClr val="tx1"/>
+          </a:fontRef>
+        </p:style>
+      </p:cxnSp>
+      <p:cxnSp>
+        <p:nvCxnSpPr>
+          <p:cNvPr id="15" name="Straight Connector 14"/>
+          <p:cNvCxnSpPr/>
+          <p:nvPr/>
+        </p:nvCxnSpPr>
+        <p:spPr>
+          <a:xfrm flipH="1">
+            <a:off x="2987824" y="2594713"/>
+            <a:ext cx="635402" cy="370244"/>
+          </a:xfrm>
+          <a:prstGeom prst="line">
+            <a:avLst/>
+          </a:prstGeom>
+          <a:ln w="28575">
+            <a:solidFill>
+              <a:schemeClr val="tx1"/>
+            </a:solidFill>
+            <a:headEnd type="none" w="med" len="med"/>
+            <a:tailEnd type="triangle" w="med" len="med"/>
+          </a:ln>
+        </p:spPr>
+        <p:style>
+          <a:lnRef idx="1">
+            <a:schemeClr val="accent1"/>
+          </a:lnRef>
+          <a:fillRef idx="0">
+            <a:schemeClr val="accent1"/>
+          </a:fillRef>
+          <a:effectRef idx="0">
+            <a:schemeClr val="accent1"/>
+          </a:effectRef>
+          <a:fontRef idx="minor">
+            <a:schemeClr val="tx1"/>
+          </a:fontRef>
+        </p:style>
+      </p:cxnSp>
+      <p:cxnSp>
+        <p:nvCxnSpPr>
+          <p:cNvPr id="16" name="Straight Connector 15"/>
+          <p:cNvCxnSpPr/>
+          <p:nvPr/>
+        </p:nvCxnSpPr>
+        <p:spPr>
+          <a:xfrm flipH="1">
+            <a:off x="7134619" y="3056532"/>
+            <a:ext cx="635402" cy="370244"/>
+          </a:xfrm>
+          <a:prstGeom prst="line">
+            <a:avLst/>
+          </a:prstGeom>
+          <a:ln w="28575">
+            <a:solidFill>
+              <a:schemeClr val="tx1"/>
+            </a:solidFill>
+            <a:headEnd type="none" w="med" len="med"/>
+            <a:tailEnd type="triangle" w="med" len="med"/>
+          </a:ln>
+        </p:spPr>
+        <p:style>
+          <a:lnRef idx="1">
+            <a:schemeClr val="accent1"/>
+          </a:lnRef>
+          <a:fillRef idx="0">
+            <a:schemeClr val="accent1"/>
+          </a:fillRef>
+          <a:effectRef idx="0">
+            <a:schemeClr val="accent1"/>
+          </a:effectRef>
+          <a:fontRef idx="minor">
+            <a:schemeClr val="tx1"/>
+          </a:fontRef>
+        </p:style>
+      </p:cxnSp>
+      <p:sp>
+        <p:nvSpPr>
+          <p:cNvPr id="17" name="TextBox 16"/>
+          <p:cNvSpPr txBox="1"/>
+          <p:nvPr/>
+        </p:nvSpPr>
+        <p:spPr>
+          <a:xfrm>
+            <a:off x="179512" y="2581092"/>
+            <a:ext cx="1440160" cy="276999"/>
+          </a:xfrm>
+          <a:prstGeom prst="rect">
+            <a:avLst/>
+          </a:prstGeom>
+          <a:noFill/>
+        </p:spPr>
+        <p:txBody>
+          <a:bodyPr wrap="square" rtlCol="0">
+            <a:spAutoFit/>
+          </a:bodyPr>
+          <a:lstStyle/>
+          <a:p>
+            <a:r>
+              <a:rPr lang="en-IE" sz="1200" dirty="0" smtClean="0"/>
+              <a:t>Indenter / Stylus</a:t>
+            </a:r>
+            <a:endParaRPr lang="en-IE" sz="1200" dirty="0"/>
+          </a:p>
+        </p:txBody>
+      </p:sp>
+      <p:sp>
+        <p:nvSpPr>
+          <p:cNvPr id="18" name="TextBox 17"/>
+          <p:cNvSpPr txBox="1"/>
+          <p:nvPr/>
+        </p:nvSpPr>
+        <p:spPr>
+          <a:xfrm>
+            <a:off x="5506096" y="2754778"/>
+            <a:ext cx="1440160" cy="276999"/>
+          </a:xfrm>
+          <a:prstGeom prst="rect">
+            <a:avLst/>
+          </a:prstGeom>
+          <a:noFill/>
+        </p:spPr>
+        <p:txBody>
+          <a:bodyPr wrap="square" rtlCol="0">
+            <a:spAutoFit/>
+          </a:bodyPr>
+          <a:lstStyle/>
+          <a:p>
+            <a:r>
+              <a:rPr lang="en-IE" sz="1200" dirty="0" smtClean="0"/>
+              <a:t>Indenter</a:t>
+            </a:r>
+            <a:endParaRPr lang="en-IE" sz="1200" dirty="0"/>
+          </a:p>
+        </p:txBody>
+      </p:sp>
+      <p:sp>
+        <p:nvSpPr>
+          <p:cNvPr id="19" name="TextBox 18"/>
+          <p:cNvSpPr txBox="1"/>
+          <p:nvPr/>
+        </p:nvSpPr>
+        <p:spPr>
+          <a:xfrm>
+            <a:off x="3263186" y="2169982"/>
+            <a:ext cx="1440160" cy="461665"/>
+          </a:xfrm>
+          <a:prstGeom prst="rect">
+            <a:avLst/>
+          </a:prstGeom>
+          <a:noFill/>
+        </p:spPr>
+        <p:txBody>
+          <a:bodyPr wrap="square" rtlCol="0">
+            <a:spAutoFit/>
+          </a:bodyPr>
+          <a:lstStyle/>
+          <a:p>
+            <a:r>
+              <a:rPr lang="en-IE" sz="1200" dirty="0" smtClean="0"/>
+              <a:t>Chipped coating segment</a:t>
+            </a:r>
+            <a:endParaRPr lang="en-IE" sz="1200" dirty="0"/>
+          </a:p>
+        </p:txBody>
+      </p:sp>
+      <p:sp>
+        <p:nvSpPr>
+          <p:cNvPr id="20" name="TextBox 19"/>
+          <p:cNvSpPr txBox="1"/>
+          <p:nvPr/>
+        </p:nvSpPr>
+        <p:spPr>
+          <a:xfrm>
+            <a:off x="7452320" y="2628583"/>
+            <a:ext cx="1440160" cy="461665"/>
+          </a:xfrm>
+          <a:prstGeom prst="rect">
+            <a:avLst/>
+          </a:prstGeom>
+          <a:noFill/>
+        </p:spPr>
+        <p:txBody>
+          <a:bodyPr wrap="square" rtlCol="0">
+            <a:spAutoFit/>
+          </a:bodyPr>
+          <a:lstStyle/>
+          <a:p>
+            <a:r>
+              <a:rPr lang="en-IE" sz="1200" dirty="0" smtClean="0"/>
+              <a:t>Chipped coating segment</a:t>
+            </a:r>
+            <a:endParaRPr lang="en-IE" sz="1200" dirty="0"/>
+          </a:p>
+        </p:txBody>
+      </p:sp>
+      <p:cxnSp>
+        <p:nvCxnSpPr>
+          <p:cNvPr id="21" name="Straight Connector 20"/>
+          <p:cNvCxnSpPr/>
+          <p:nvPr/>
+        </p:nvCxnSpPr>
+        <p:spPr>
+          <a:xfrm>
+            <a:off x="2124329" y="2456660"/>
+            <a:ext cx="57303" cy="424928"/>
+          </a:xfrm>
+          <a:prstGeom prst="line">
+            <a:avLst/>
+          </a:prstGeom>
+          <a:ln w="28575">
+            <a:solidFill>
+              <a:schemeClr val="tx1"/>
+            </a:solidFill>
+            <a:headEnd type="none" w="med" len="med"/>
+            <a:tailEnd type="triangle" w="med" len="med"/>
+          </a:ln>
+        </p:spPr>
+        <p:style>
+          <a:lnRef idx="1">
+            <a:schemeClr val="accent1"/>
+          </a:lnRef>
+          <a:fillRef idx="0">
+            <a:schemeClr val="accent1"/>
+          </a:fillRef>
+          <a:effectRef idx="0">
+            <a:schemeClr val="accent1"/>
+          </a:effectRef>
+          <a:fontRef idx="minor">
+            <a:schemeClr val="tx1"/>
+          </a:fontRef>
+        </p:style>
+      </p:cxnSp>
+      <p:sp>
+        <p:nvSpPr>
+          <p:cNvPr id="22" name="TextBox 21"/>
+          <p:cNvSpPr txBox="1"/>
+          <p:nvPr/>
+        </p:nvSpPr>
+        <p:spPr>
+          <a:xfrm>
+            <a:off x="1578742" y="2201107"/>
+            <a:ext cx="1440160" cy="276999"/>
+          </a:xfrm>
+          <a:prstGeom prst="rect">
+            <a:avLst/>
+          </a:prstGeom>
+          <a:noFill/>
+        </p:spPr>
+        <p:txBody>
+          <a:bodyPr wrap="square" rtlCol="0">
+            <a:spAutoFit/>
+          </a:bodyPr>
+          <a:lstStyle/>
+          <a:p>
+            <a:r>
+              <a:rPr lang="en-IE" sz="1200" dirty="0" smtClean="0"/>
+              <a:t>Radial crack</a:t>
+            </a:r>
+            <a:endParaRPr lang="en-IE" sz="1200" dirty="0"/>
+          </a:p>
+        </p:txBody>
+      </p:sp>
+      <p:cxnSp>
+        <p:nvCxnSpPr>
+          <p:cNvPr id="23" name="Straight Connector 22"/>
+          <p:cNvCxnSpPr/>
+          <p:nvPr/>
+        </p:nvCxnSpPr>
+        <p:spPr>
+          <a:xfrm>
+            <a:off x="6010152" y="2409855"/>
+            <a:ext cx="516868" cy="441342"/>
+          </a:xfrm>
+          <a:prstGeom prst="line">
+            <a:avLst/>
+          </a:prstGeom>
+          <a:ln w="28575">
+            <a:solidFill>
+              <a:schemeClr val="tx1"/>
+            </a:solidFill>
+            <a:headEnd type="none" w="med" len="med"/>
+            <a:tailEnd type="triangle" w="med" len="med"/>
+          </a:ln>
+        </p:spPr>
+        <p:style>
+          <a:lnRef idx="1">
+            <a:schemeClr val="accent1"/>
+          </a:lnRef>
+          <a:fillRef idx="0">
+            <a:schemeClr val="accent1"/>
+          </a:fillRef>
+          <a:effectRef idx="0">
+            <a:schemeClr val="accent1"/>
+          </a:effectRef>
+          <a:fontRef idx="minor">
+            <a:schemeClr val="tx1"/>
+          </a:fontRef>
+        </p:style>
+      </p:cxnSp>
+      <p:sp>
+        <p:nvSpPr>
+          <p:cNvPr id="24" name="TextBox 23"/>
+          <p:cNvSpPr txBox="1"/>
+          <p:nvPr/>
+        </p:nvSpPr>
+        <p:spPr>
+          <a:xfrm>
+            <a:off x="5266880" y="2132856"/>
+            <a:ext cx="1440160" cy="276999"/>
+          </a:xfrm>
+          <a:prstGeom prst="rect">
+            <a:avLst/>
+          </a:prstGeom>
+          <a:noFill/>
+        </p:spPr>
+        <p:txBody>
+          <a:bodyPr wrap="square" rtlCol="0">
+            <a:spAutoFit/>
+          </a:bodyPr>
+          <a:lstStyle/>
+          <a:p>
+            <a:r>
+              <a:rPr lang="en-IE" sz="1200" dirty="0" smtClean="0"/>
+              <a:t>Radial crack</a:t>
+            </a:r>
+            <a:endParaRPr lang="en-IE" sz="1200" dirty="0"/>
+          </a:p>
+        </p:txBody>
+      </p:sp>
+      <p:cxnSp>
+        <p:nvCxnSpPr>
+          <p:cNvPr id="26" name="Straight Connector 25"/>
+          <p:cNvCxnSpPr/>
+          <p:nvPr/>
+        </p:nvCxnSpPr>
+        <p:spPr>
+          <a:xfrm>
+            <a:off x="1619672" y="3296315"/>
+            <a:ext cx="1805184" cy="0"/>
+          </a:xfrm>
+          <a:prstGeom prst="line">
+            <a:avLst/>
+          </a:prstGeom>
+          <a:ln w="28575">
+            <a:solidFill>
+              <a:schemeClr val="tx1"/>
+            </a:solidFill>
+            <a:headEnd type="triangle" w="med" len="med"/>
+            <a:tailEnd type="triangle" w="med" len="med"/>
+          </a:ln>
+        </p:spPr>
+        <p:style>
+          <a:lnRef idx="1">
+            <a:schemeClr val="accent1"/>
+          </a:lnRef>
+          <a:fillRef idx="0">
+            <a:schemeClr val="accent1"/>
+          </a:fillRef>
+          <a:effectRef idx="0">
+            <a:schemeClr val="accent1"/>
+          </a:effectRef>
+          <a:fontRef idx="minor">
+            <a:schemeClr val="tx1"/>
+          </a:fontRef>
+        </p:style>
+      </p:cxnSp>
+      <p:sp>
+        <p:nvSpPr>
+          <p:cNvPr id="28" name="Arc 27"/>
+          <p:cNvSpPr/>
+          <p:nvPr/>
+        </p:nvSpPr>
+        <p:spPr>
+          <a:xfrm>
+            <a:off x="1547664" y="2891162"/>
+            <a:ext cx="396044" cy="424302"/>
+          </a:xfrm>
+          <a:prstGeom prst="arc">
+            <a:avLst>
+              <a:gd name="adj1" fmla="val 19396671"/>
+              <a:gd name="adj2" fmla="val 353118"/>
+            </a:avLst>
+          </a:prstGeom>
+          <a:ln w="28575">
+            <a:solidFill>
+              <a:schemeClr val="tx1"/>
+            </a:solidFill>
+          </a:ln>
+        </p:spPr>
+        <p:style>
+          <a:lnRef idx="1">
+            <a:schemeClr val="accent1"/>
+          </a:lnRef>
+          <a:fillRef idx="0">
+            <a:schemeClr val="accent1"/>
+          </a:fillRef>
+          <a:effectRef idx="0">
+            <a:schemeClr val="accent1"/>
+          </a:effectRef>
+          <a:fontRef idx="minor">
+            <a:schemeClr val="tx1"/>
+          </a:fontRef>
+        </p:style>
+        <p:txBody>
+          <a:bodyPr rtlCol="0" anchor="ctr"/>
+          <a:lstStyle/>
+          <a:p>
+            <a:pPr algn="ctr"/>
+            <a:endParaRPr lang="en-IE"/>
+          </a:p>
+        </p:txBody>
+      </p:sp>
+      <p:sp>
+        <p:nvSpPr>
+          <p:cNvPr id="29" name="Arc 28"/>
+          <p:cNvSpPr/>
+          <p:nvPr/>
+        </p:nvSpPr>
+        <p:spPr>
+          <a:xfrm rot="18000000">
+            <a:off x="6502343" y="3003923"/>
+            <a:ext cx="282865" cy="255533"/>
+          </a:xfrm>
+          <a:prstGeom prst="arc">
+            <a:avLst>
+              <a:gd name="adj1" fmla="val 18619117"/>
+              <a:gd name="adj2" fmla="val 2604193"/>
+            </a:avLst>
+          </a:prstGeom>
+          <a:ln w="28575">
+            <a:solidFill>
+              <a:schemeClr val="tx1"/>
+            </a:solidFill>
+          </a:ln>
+        </p:spPr>
+        <p:style>
+          <a:lnRef idx="1">
+            <a:schemeClr val="accent1"/>
+          </a:lnRef>
+          <a:fillRef idx="0">
+            <a:schemeClr val="accent1"/>
+          </a:fillRef>
+          <a:effectRef idx="0">
+            <a:schemeClr val="accent1"/>
+          </a:effectRef>
+          <a:fontRef idx="minor">
+            <a:schemeClr val="tx1"/>
+          </a:fontRef>
+        </p:style>
+        <p:txBody>
+          <a:bodyPr rtlCol="0" anchor="ctr"/>
+          <a:lstStyle/>
+          <a:p>
+            <a:pPr algn="ctr"/>
+            <a:endParaRPr lang="en-IE"/>
+          </a:p>
+        </p:txBody>
+      </p:sp>
+      <p:cxnSp>
+        <p:nvCxnSpPr>
+          <p:cNvPr id="32" name="Straight Connector 31"/>
+          <p:cNvCxnSpPr/>
+          <p:nvPr/>
+        </p:nvCxnSpPr>
+        <p:spPr>
+          <a:xfrm>
+            <a:off x="1451010" y="2898882"/>
+            <a:ext cx="0" cy="220671"/>
+          </a:xfrm>
+          <a:prstGeom prst="line">
+            <a:avLst/>
+          </a:prstGeom>
+          <a:ln w="28575">
+            <a:solidFill>
+              <a:schemeClr val="tx1"/>
+            </a:solidFill>
+            <a:headEnd type="none" w="med" len="med"/>
+            <a:tailEnd type="triangle" w="med" len="med"/>
+          </a:ln>
+        </p:spPr>
+        <p:style>
+          <a:lnRef idx="1">
+            <a:schemeClr val="accent1"/>
+          </a:lnRef>
+          <a:fillRef idx="0">
+            <a:schemeClr val="accent1"/>
+          </a:fillRef>
+          <a:effectRef idx="0">
+            <a:schemeClr val="accent1"/>
+          </a:effectRef>
+          <a:fontRef idx="minor">
+            <a:schemeClr val="tx1"/>
+          </a:fontRef>
+        </p:style>
+      </p:cxnSp>
+      <p:cxnSp>
+        <p:nvCxnSpPr>
+          <p:cNvPr id="33" name="Straight Connector 32"/>
+          <p:cNvCxnSpPr/>
+          <p:nvPr/>
+        </p:nvCxnSpPr>
+        <p:spPr>
+          <a:xfrm flipV="1">
+            <a:off x="1444046" y="3459779"/>
+            <a:ext cx="0" cy="220671"/>
+          </a:xfrm>
+          <a:prstGeom prst="line">
+            <a:avLst/>
+          </a:prstGeom>
+          <a:ln w="28575">
+            <a:solidFill>
+              <a:schemeClr val="tx1"/>
+            </a:solidFill>
+            <a:headEnd type="none" w="med" len="med"/>
+            <a:tailEnd type="triangle" w="med" len="med"/>
+          </a:ln>
+        </p:spPr>
+        <p:style>
+          <a:lnRef idx="1">
+            <a:schemeClr val="accent1"/>
+          </a:lnRef>
+          <a:fillRef idx="0">
+            <a:schemeClr val="accent1"/>
+          </a:fillRef>
+          <a:effectRef idx="0">
+            <a:schemeClr val="accent1"/>
+          </a:effectRef>
+          <a:fontRef idx="minor">
+            <a:schemeClr val="tx1"/>
+          </a:fontRef>
+        </p:style>
+      </p:cxnSp>
+      <p:cxnSp>
+        <p:nvCxnSpPr>
+          <p:cNvPr id="36" name="Straight Connector 35"/>
+          <p:cNvCxnSpPr/>
+          <p:nvPr/>
+        </p:nvCxnSpPr>
+        <p:spPr>
+          <a:xfrm>
+            <a:off x="6051284" y="3462760"/>
+            <a:ext cx="216000" cy="359276"/>
+          </a:xfrm>
+          <a:prstGeom prst="line">
+            <a:avLst/>
+          </a:prstGeom>
+          <a:ln w="28575">
+            <a:solidFill>
+              <a:schemeClr val="tx1"/>
+            </a:solidFill>
+            <a:headEnd type="triangle" w="med" len="med"/>
+            <a:tailEnd type="triangle" w="med" len="med"/>
+          </a:ln>
+        </p:spPr>
+        <p:style>
+          <a:lnRef idx="1">
+            <a:schemeClr val="accent1"/>
+          </a:lnRef>
+          <a:fillRef idx="0">
+            <a:schemeClr val="accent1"/>
+          </a:fillRef>
+          <a:effectRef idx="0">
+            <a:schemeClr val="accent1"/>
+          </a:effectRef>
+          <a:fontRef idx="minor">
+            <a:schemeClr val="tx1"/>
+          </a:fontRef>
+        </p:style>
+      </p:cxnSp>
+      <p:cxnSp>
+        <p:nvCxnSpPr>
+          <p:cNvPr id="37" name="Straight Connector 36"/>
+          <p:cNvCxnSpPr/>
+          <p:nvPr/>
+        </p:nvCxnSpPr>
+        <p:spPr>
+          <a:xfrm flipH="1">
+            <a:off x="5986960" y="3158065"/>
+            <a:ext cx="601168" cy="330707"/>
+          </a:xfrm>
+          <a:prstGeom prst="line">
+            <a:avLst/>
+          </a:prstGeom>
+          <a:ln>
+            <a:solidFill>
+              <a:schemeClr val="tx1"/>
+            </a:solidFill>
+            <a:prstDash val="dash"/>
+          </a:ln>
+        </p:spPr>
+        <p:style>
+          <a:lnRef idx="1">
+            <a:schemeClr val="accent1"/>
+          </a:lnRef>
+          <a:fillRef idx="0">
+            <a:schemeClr val="accent1"/>
+          </a:fillRef>
+          <a:effectRef idx="0">
+            <a:schemeClr val="accent1"/>
+          </a:effectRef>
+          <a:fontRef idx="minor">
+            <a:schemeClr val="tx1"/>
+          </a:fontRef>
+        </p:style>
+      </p:cxnSp>
+      <p:cxnSp>
+        <p:nvCxnSpPr>
+          <p:cNvPr id="38" name="Straight Connector 37"/>
+          <p:cNvCxnSpPr/>
+          <p:nvPr/>
+        </p:nvCxnSpPr>
+        <p:spPr>
+          <a:xfrm flipH="1">
+            <a:off x="6205749" y="3517368"/>
+            <a:ext cx="601168" cy="330707"/>
+          </a:xfrm>
+          <a:prstGeom prst="line">
+            <a:avLst/>
+          </a:prstGeom>
+          <a:ln>
+            <a:solidFill>
+              <a:schemeClr val="tx1"/>
+            </a:solidFill>
+            <a:prstDash val="dash"/>
+          </a:ln>
+        </p:spPr>
+        <p:style>
+          <a:lnRef idx="1">
+            <a:schemeClr val="accent1"/>
+          </a:lnRef>
+          <a:fillRef idx="0">
+            <a:schemeClr val="accent1"/>
+          </a:fillRef>
+          <a:effectRef idx="0">
+            <a:schemeClr val="accent1"/>
+          </a:effectRef>
+          <a:fontRef idx="minor">
+            <a:schemeClr val="tx1"/>
+          </a:fontRef>
+        </p:style>
+      </p:cxnSp>
+      <p:cxnSp>
+        <p:nvCxnSpPr>
+          <p:cNvPr id="39" name="Straight Connector 38"/>
+          <p:cNvCxnSpPr/>
+          <p:nvPr/>
+        </p:nvCxnSpPr>
+        <p:spPr>
+          <a:xfrm flipV="1">
+            <a:off x="1494009" y="3120013"/>
+            <a:ext cx="1853855" cy="0"/>
+          </a:xfrm>
+          <a:prstGeom prst="line">
+            <a:avLst/>
+          </a:prstGeom>
+          <a:ln w="19050">
+            <a:solidFill>
+              <a:schemeClr val="tx1"/>
+            </a:solidFill>
+            <a:prstDash val="dash"/>
+            <a:headEnd type="none" w="med" len="med"/>
+            <a:tailEnd type="none" w="med" len="med"/>
+          </a:ln>
+        </p:spPr>
+        <p:style>
+          <a:lnRef idx="1">
+            <a:schemeClr val="accent1"/>
+          </a:lnRef>
+          <a:fillRef idx="0">
+            <a:schemeClr val="accent1"/>
+          </a:fillRef>
+          <a:effectRef idx="0">
+            <a:schemeClr val="accent1"/>
+          </a:effectRef>
+          <a:fontRef idx="minor">
+            <a:schemeClr val="tx1"/>
+          </a:fontRef>
+        </p:style>
+      </p:cxnSp>
+      <p:cxnSp>
+        <p:nvCxnSpPr>
+          <p:cNvPr id="40" name="Straight Connector 39"/>
+          <p:cNvCxnSpPr/>
+          <p:nvPr/>
+        </p:nvCxnSpPr>
+        <p:spPr>
+          <a:xfrm>
+            <a:off x="542680" y="2456660"/>
+            <a:ext cx="713825" cy="0"/>
+          </a:xfrm>
+          <a:prstGeom prst="line">
+            <a:avLst/>
+          </a:prstGeom>
+          <a:ln w="38100">
+            <a:solidFill>
+              <a:schemeClr val="tx1"/>
+            </a:solidFill>
+            <a:headEnd type="none" w="med" len="med"/>
+            <a:tailEnd type="triangle" w="med" len="med"/>
+          </a:ln>
+        </p:spPr>
+        <p:style>
+          <a:lnRef idx="1">
+            <a:schemeClr val="accent1"/>
+          </a:lnRef>
+          <a:fillRef idx="0">
+            <a:schemeClr val="accent1"/>
+          </a:fillRef>
+          <a:effectRef idx="0">
+            <a:schemeClr val="accent1"/>
+          </a:effectRef>
+          <a:fontRef idx="minor">
+            <a:schemeClr val="tx1"/>
+          </a:fontRef>
+        </p:style>
+      </p:cxnSp>
+      <p:sp>
+        <p:nvSpPr>
+          <p:cNvPr id="41" name="TextBox 40"/>
+          <p:cNvSpPr txBox="1"/>
+          <p:nvPr/>
+        </p:nvSpPr>
+        <p:spPr>
+          <a:xfrm>
+            <a:off x="179512" y="2180681"/>
+            <a:ext cx="1440160" cy="276999"/>
+          </a:xfrm>
+          <a:prstGeom prst="rect">
+            <a:avLst/>
+          </a:prstGeom>
+          <a:noFill/>
+        </p:spPr>
+        <p:txBody>
+          <a:bodyPr wrap="square" rtlCol="0">
+            <a:spAutoFit/>
+          </a:bodyPr>
+          <a:lstStyle/>
+          <a:p>
+            <a:pPr algn="ctr"/>
+            <a:r>
+              <a:rPr lang="en-IE" sz="1200" dirty="0" smtClean="0"/>
+              <a:t>Scratch direction</a:t>
+            </a:r>
+            <a:endParaRPr lang="en-IE" sz="1200" dirty="0"/>
+          </a:p>
+        </p:txBody>
+      </p:sp>
+      <p:sp>
+        <p:nvSpPr>
+          <p:cNvPr id="42" name="TextBox 41"/>
+          <p:cNvSpPr txBox="1"/>
+          <p:nvPr/>
+        </p:nvSpPr>
+        <p:spPr>
+          <a:xfrm>
+            <a:off x="362805" y="3852662"/>
+            <a:ext cx="1440160" cy="276999"/>
+          </a:xfrm>
+          <a:prstGeom prst="rect">
+            <a:avLst/>
+          </a:prstGeom>
+          <a:noFill/>
+        </p:spPr>
+        <p:txBody>
+          <a:bodyPr wrap="square" rtlCol="0">
+            <a:spAutoFit/>
+          </a:bodyPr>
+          <a:lstStyle/>
+          <a:p>
+            <a:r>
+              <a:rPr lang="en-IE" sz="1200" dirty="0" smtClean="0"/>
+              <a:t>a)</a:t>
+            </a:r>
+            <a:endParaRPr lang="en-IE" sz="1200" dirty="0"/>
+          </a:p>
+        </p:txBody>
+      </p:sp>
+      <p:sp>
+        <p:nvSpPr>
+          <p:cNvPr id="43" name="TextBox 42"/>
+          <p:cNvSpPr txBox="1"/>
+          <p:nvPr/>
+        </p:nvSpPr>
+        <p:spPr>
+          <a:xfrm>
+            <a:off x="4903550" y="3852662"/>
+            <a:ext cx="1440160" cy="276999"/>
+          </a:xfrm>
+          <a:prstGeom prst="rect">
+            <a:avLst/>
+          </a:prstGeom>
+          <a:noFill/>
+        </p:spPr>
+        <p:txBody>
+          <a:bodyPr wrap="square" rtlCol="0">
+            <a:spAutoFit/>
+          </a:bodyPr>
+          <a:lstStyle/>
+          <a:p>
+            <a:r>
+              <a:rPr lang="en-IE" sz="1200" dirty="0" smtClean="0"/>
+              <a:t>b)</a:t>
+            </a:r>
+            <a:endParaRPr lang="en-IE" sz="1200" dirty="0"/>
+          </a:p>
+        </p:txBody>
+      </p:sp>
+      <mc:AlternateContent xmlns:mc="http://schemas.openxmlformats.org/markup-compatibility/2006">
+        <mc:Choice xmlns:a14="http://schemas.microsoft.com/office/drawing/2010/main" Requires="a14">
+          <p:sp>
+            <p:nvSpPr>
+              <p:cNvPr id="44" name="TextBox 43"/>
+              <p:cNvSpPr txBox="1"/>
+              <p:nvPr/>
+            </p:nvSpPr>
+            <p:spPr>
+              <a:xfrm>
+                <a:off x="6586343" y="2719591"/>
+                <a:ext cx="317586" cy="276999"/>
+              </a:xfrm>
+              <a:prstGeom prst="rect">
+                <a:avLst/>
+              </a:prstGeom>
+              <a:noFill/>
+            </p:spPr>
+            <p:txBody>
+              <a:bodyPr wrap="none" rtlCol="0">
+                <a:spAutoFit/>
+              </a:bodyPr>
+              <a:lstStyle/>
+              <a:p>
+                <a:pPr/>
+                <a14:m>
+                  <m:oMathPara xmlns:m="http://schemas.openxmlformats.org/officeDocument/2006/math">
+                    <m:oMathParaPr>
+                      <m:jc m:val="centerGroup"/>
+                    </m:oMathParaPr>
+                    <m:oMath xmlns:m="http://schemas.openxmlformats.org/officeDocument/2006/math">
+                      <m:r>
+                        <a:rPr lang="fr-FR" sz="1200" i="1" smtClean="0">
+                          <a:latin typeface="Cambria Math"/>
+                          <a:ea typeface="Cambria Math"/>
+                        </a:rPr>
+                        <m:t>𝛽</m:t>
+                      </m:r>
+                    </m:oMath>
+                  </m:oMathPara>
+                </a14:m>
+                <a:endParaRPr lang="fr-FR" sz="1200" dirty="0"/>
+              </a:p>
+            </p:txBody>
+          </p:sp>
+        </mc:Choice>
+        <mc:Fallback>
+          <p:sp>
+            <p:nvSpPr>
+              <p:cNvPr id="44" name="TextBox 43"/>
+              <p:cNvSpPr txBox="1">
+                <a:spLocks noRot="1" noChangeAspect="1" noMove="1" noResize="1" noEditPoints="1" noAdjustHandles="1" noChangeArrowheads="1" noChangeShapeType="1" noTextEdit="1"/>
+              </p:cNvSpPr>
+              <p:nvPr/>
+            </p:nvSpPr>
+            <p:spPr>
+              <a:xfrm>
+                <a:off x="6586343" y="2719591"/>
+                <a:ext cx="317586" cy="276999"/>
+              </a:xfrm>
+              <a:prstGeom prst="rect">
+                <a:avLst/>
+              </a:prstGeom>
+              <a:blipFill rotWithShape="1">
+                <a:blip r:embed="rId2"/>
+                <a:stretch>
+                  <a:fillRect b="-2174"/>
+                </a:stretch>
+              </a:blipFill>
+            </p:spPr>
+            <p:txBody>
+              <a:bodyPr/>
+              <a:lstStyle/>
+              <a:p>
+                <a:r>
+                  <a:rPr lang="fr-FR">
+                    <a:noFill/>
+                  </a:rPr>
+                  <a:t> </a:t>
+                </a:r>
+              </a:p>
+            </p:txBody>
+          </p:sp>
+        </mc:Fallback>
+      </mc:AlternateContent>
+      <mc:AlternateContent xmlns:mc="http://schemas.openxmlformats.org/markup-compatibility/2006">
+        <mc:Choice xmlns:a14="http://schemas.microsoft.com/office/drawing/2010/main" Requires="a14">
+          <p:sp>
+            <p:nvSpPr>
+              <p:cNvPr id="45" name="TextBox 44"/>
+              <p:cNvSpPr txBox="1"/>
+              <p:nvPr/>
+            </p:nvSpPr>
+            <p:spPr>
+              <a:xfrm>
+                <a:off x="6806917" y="3007985"/>
+                <a:ext cx="272895" cy="276999"/>
+              </a:xfrm>
+              <a:prstGeom prst="rect">
+                <a:avLst/>
+              </a:prstGeom>
+              <a:noFill/>
+            </p:spPr>
+            <p:txBody>
+              <a:bodyPr wrap="none" rtlCol="0">
+                <a:spAutoFit/>
+              </a:bodyPr>
+              <a:lstStyle/>
+              <a:p>
+                <a:pPr/>
+                <a14:m>
+                  <m:oMathPara xmlns:m="http://schemas.openxmlformats.org/officeDocument/2006/math">
+                    <m:oMathParaPr>
+                      <m:jc m:val="centerGroup"/>
+                    </m:oMathParaPr>
+                    <m:oMath xmlns:m="http://schemas.openxmlformats.org/officeDocument/2006/math">
+                      <m:r>
+                        <a:rPr lang="en-IE" sz="1200" b="0" i="1" smtClean="0">
+                          <a:latin typeface="Cambria Math"/>
+                          <a:ea typeface="Cambria Math"/>
+                        </a:rPr>
+                        <m:t>𝑙</m:t>
+                      </m:r>
+                    </m:oMath>
+                  </m:oMathPara>
+                </a14:m>
+                <a:endParaRPr lang="fr-FR" sz="1200" dirty="0"/>
+              </a:p>
+            </p:txBody>
+          </p:sp>
+        </mc:Choice>
+        <mc:Fallback>
+          <p:sp>
+            <p:nvSpPr>
+              <p:cNvPr id="45" name="TextBox 44"/>
+              <p:cNvSpPr txBox="1">
+                <a:spLocks noRot="1" noChangeAspect="1" noMove="1" noResize="1" noEditPoints="1" noAdjustHandles="1" noChangeArrowheads="1" noChangeShapeType="1" noTextEdit="1"/>
+              </p:cNvSpPr>
+              <p:nvPr/>
+            </p:nvSpPr>
+            <p:spPr>
+              <a:xfrm>
+                <a:off x="6806917" y="3007985"/>
+                <a:ext cx="272895" cy="276999"/>
+              </a:xfrm>
+              <a:prstGeom prst="rect">
+                <a:avLst/>
+              </a:prstGeom>
+              <a:blipFill rotWithShape="1">
+                <a:blip r:embed="rId3"/>
+                <a:stretch>
+                  <a:fillRect/>
+                </a:stretch>
+              </a:blipFill>
+            </p:spPr>
+            <p:txBody>
+              <a:bodyPr/>
+              <a:lstStyle/>
+              <a:p>
+                <a:r>
+                  <a:rPr lang="fr-FR">
+                    <a:noFill/>
+                  </a:rPr>
+                  <a:t> </a:t>
+                </a:r>
+              </a:p>
+            </p:txBody>
+          </p:sp>
+        </mc:Fallback>
+      </mc:AlternateContent>
+      <mc:AlternateContent xmlns:mc="http://schemas.openxmlformats.org/markup-compatibility/2006">
+        <mc:Choice xmlns:a14="http://schemas.microsoft.com/office/drawing/2010/main" Requires="a14">
+          <p:sp>
+            <p:nvSpPr>
+              <p:cNvPr id="46" name="TextBox 45"/>
+              <p:cNvSpPr txBox="1"/>
+              <p:nvPr/>
+            </p:nvSpPr>
+            <p:spPr>
+              <a:xfrm>
+                <a:off x="1274929" y="3683536"/>
+                <a:ext cx="338233" cy="276999"/>
+              </a:xfrm>
+              <a:prstGeom prst="rect">
+                <a:avLst/>
+              </a:prstGeom>
+              <a:noFill/>
+            </p:spPr>
+            <p:txBody>
+              <a:bodyPr wrap="none" rtlCol="0">
+                <a:spAutoFit/>
+              </a:bodyPr>
+              <a:lstStyle/>
+              <a:p>
+                <a:pPr/>
+                <a14:m>
+                  <m:oMathPara xmlns:m="http://schemas.openxmlformats.org/officeDocument/2006/math">
+                    <m:oMathParaPr>
+                      <m:jc m:val="centerGroup"/>
+                    </m:oMathParaPr>
+                    <m:oMath xmlns:m="http://schemas.openxmlformats.org/officeDocument/2006/math">
+                      <m:r>
+                        <a:rPr lang="en-IE" sz="1200" b="0" i="1" smtClean="0">
+                          <a:latin typeface="Cambria Math"/>
+                          <a:ea typeface="Cambria Math"/>
+                        </a:rPr>
+                        <m:t>𝑤</m:t>
+                      </m:r>
+                    </m:oMath>
+                  </m:oMathPara>
+                </a14:m>
+                <a:endParaRPr lang="fr-FR" sz="1200" dirty="0"/>
+              </a:p>
+            </p:txBody>
+          </p:sp>
+        </mc:Choice>
+        <mc:Fallback>
+          <p:sp>
+            <p:nvSpPr>
+              <p:cNvPr id="46" name="TextBox 45"/>
+              <p:cNvSpPr txBox="1">
+                <a:spLocks noRot="1" noChangeAspect="1" noMove="1" noResize="1" noEditPoints="1" noAdjustHandles="1" noChangeArrowheads="1" noChangeShapeType="1" noTextEdit="1"/>
+              </p:cNvSpPr>
+              <p:nvPr/>
+            </p:nvSpPr>
+            <p:spPr>
+              <a:xfrm>
+                <a:off x="1274929" y="3683536"/>
+                <a:ext cx="338233" cy="276999"/>
+              </a:xfrm>
+              <a:prstGeom prst="rect">
+                <a:avLst/>
+              </a:prstGeom>
+              <a:blipFill rotWithShape="1">
+                <a:blip r:embed="rId4"/>
+                <a:stretch>
+                  <a:fillRect/>
+                </a:stretch>
+              </a:blipFill>
+            </p:spPr>
+            <p:txBody>
+              <a:bodyPr/>
+              <a:lstStyle/>
+              <a:p>
+                <a:r>
+                  <a:rPr lang="fr-FR">
+                    <a:noFill/>
+                  </a:rPr>
+                  <a:t> </a:t>
+                </a:r>
+              </a:p>
+            </p:txBody>
+          </p:sp>
+        </mc:Fallback>
+      </mc:AlternateContent>
+      <mc:AlternateContent xmlns:mc="http://schemas.openxmlformats.org/markup-compatibility/2006">
+        <mc:Choice xmlns:a14="http://schemas.microsoft.com/office/drawing/2010/main" Requires="a14">
+          <p:sp>
+            <p:nvSpPr>
+              <p:cNvPr id="47" name="TextBox 46"/>
+              <p:cNvSpPr txBox="1"/>
+              <p:nvPr/>
+            </p:nvSpPr>
+            <p:spPr>
+              <a:xfrm>
+                <a:off x="5841035" y="3556244"/>
+                <a:ext cx="338233" cy="276999"/>
+              </a:xfrm>
+              <a:prstGeom prst="rect">
+                <a:avLst/>
+              </a:prstGeom>
+              <a:noFill/>
+            </p:spPr>
+            <p:txBody>
+              <a:bodyPr wrap="none" rtlCol="0">
+                <a:spAutoFit/>
+              </a:bodyPr>
+              <a:lstStyle/>
+              <a:p>
+                <a:pPr/>
+                <a14:m>
+                  <m:oMathPara xmlns:m="http://schemas.openxmlformats.org/officeDocument/2006/math">
+                    <m:oMathParaPr>
+                      <m:jc m:val="centerGroup"/>
+                    </m:oMathParaPr>
+                    <m:oMath xmlns:m="http://schemas.openxmlformats.org/officeDocument/2006/math">
+                      <m:r>
+                        <a:rPr lang="en-IE" sz="1200" b="0" i="1" smtClean="0">
+                          <a:latin typeface="Cambria Math"/>
+                          <a:ea typeface="Cambria Math"/>
+                        </a:rPr>
+                        <m:t>𝑤</m:t>
+                      </m:r>
+                    </m:oMath>
+                  </m:oMathPara>
+                </a14:m>
+                <a:endParaRPr lang="fr-FR" sz="1200" dirty="0"/>
+              </a:p>
+            </p:txBody>
+          </p:sp>
+        </mc:Choice>
+        <mc:Fallback>
+          <p:sp>
+            <p:nvSpPr>
+              <p:cNvPr id="47" name="TextBox 46"/>
+              <p:cNvSpPr txBox="1">
+                <a:spLocks noRot="1" noChangeAspect="1" noMove="1" noResize="1" noEditPoints="1" noAdjustHandles="1" noChangeArrowheads="1" noChangeShapeType="1" noTextEdit="1"/>
+              </p:cNvSpPr>
+              <p:nvPr/>
+            </p:nvSpPr>
+            <p:spPr>
+              <a:xfrm>
+                <a:off x="5841035" y="3556244"/>
+                <a:ext cx="338233" cy="276999"/>
+              </a:xfrm>
+              <a:prstGeom prst="rect">
+                <a:avLst/>
+              </a:prstGeom>
+              <a:blipFill rotWithShape="1">
+                <a:blip r:embed="rId4"/>
+                <a:stretch>
+                  <a:fillRect/>
+                </a:stretch>
+              </a:blipFill>
+            </p:spPr>
+            <p:txBody>
+              <a:bodyPr/>
+              <a:lstStyle/>
+              <a:p>
+                <a:r>
+                  <a:rPr lang="fr-FR">
+                    <a:noFill/>
+                  </a:rPr>
+                  <a:t> </a:t>
+                </a:r>
+              </a:p>
+            </p:txBody>
+          </p:sp>
+        </mc:Fallback>
+      </mc:AlternateContent>
+      <mc:AlternateContent xmlns:mc="http://schemas.openxmlformats.org/markup-compatibility/2006">
+        <mc:Choice xmlns:a14="http://schemas.microsoft.com/office/drawing/2010/main" Requires="a14">
+          <p:sp>
+            <p:nvSpPr>
+              <p:cNvPr id="48" name="TextBox 47"/>
+              <p:cNvSpPr txBox="1"/>
+              <p:nvPr/>
+            </p:nvSpPr>
+            <p:spPr>
+              <a:xfrm>
+                <a:off x="2028795" y="2871991"/>
+                <a:ext cx="317586" cy="276999"/>
+              </a:xfrm>
+              <a:prstGeom prst="rect">
+                <a:avLst/>
+              </a:prstGeom>
+              <a:noFill/>
+            </p:spPr>
+            <p:txBody>
+              <a:bodyPr wrap="none" rtlCol="0">
+                <a:spAutoFit/>
+              </a:bodyPr>
+              <a:lstStyle/>
+              <a:p>
+                <a:pPr/>
+                <a14:m>
+                  <m:oMathPara xmlns:m="http://schemas.openxmlformats.org/officeDocument/2006/math">
+                    <m:oMathParaPr>
+                      <m:jc m:val="centerGroup"/>
+                    </m:oMathParaPr>
+                    <m:oMath xmlns:m="http://schemas.openxmlformats.org/officeDocument/2006/math">
+                      <m:r>
+                        <a:rPr lang="fr-FR" sz="1200" i="1" smtClean="0">
+                          <a:latin typeface="Cambria Math"/>
+                          <a:ea typeface="Cambria Math"/>
+                        </a:rPr>
+                        <m:t>𝛽</m:t>
+                      </m:r>
+                    </m:oMath>
+                  </m:oMathPara>
+                </a14:m>
+                <a:endParaRPr lang="fr-FR" sz="1200" dirty="0"/>
+              </a:p>
+            </p:txBody>
+          </p:sp>
+        </mc:Choice>
+        <mc:Fallback>
+          <p:sp>
+            <p:nvSpPr>
+              <p:cNvPr id="48" name="TextBox 47"/>
+              <p:cNvSpPr txBox="1">
+                <a:spLocks noRot="1" noChangeAspect="1" noMove="1" noResize="1" noEditPoints="1" noAdjustHandles="1" noChangeArrowheads="1" noChangeShapeType="1" noTextEdit="1"/>
+              </p:cNvSpPr>
+              <p:nvPr/>
+            </p:nvSpPr>
+            <p:spPr>
+              <a:xfrm>
+                <a:off x="2028795" y="2871991"/>
+                <a:ext cx="317586" cy="276999"/>
+              </a:xfrm>
+              <a:prstGeom prst="rect">
+                <a:avLst/>
+              </a:prstGeom>
+              <a:blipFill rotWithShape="1">
+                <a:blip r:embed="rId5"/>
+                <a:stretch>
+                  <a:fillRect b="-2174"/>
+                </a:stretch>
+              </a:blipFill>
+            </p:spPr>
+            <p:txBody>
+              <a:bodyPr/>
+              <a:lstStyle/>
+              <a:p>
+                <a:r>
+                  <a:rPr lang="fr-FR">
+                    <a:noFill/>
+                  </a:rPr>
+                  <a:t> </a:t>
+                </a:r>
+              </a:p>
+            </p:txBody>
+          </p:sp>
+        </mc:Fallback>
+      </mc:AlternateContent>
+      <mc:AlternateContent xmlns:mc="http://schemas.openxmlformats.org/markup-compatibility/2006">
+        <mc:Choice xmlns:a14="http://schemas.microsoft.com/office/drawing/2010/main" Requires="a14">
+          <p:sp>
+            <p:nvSpPr>
+              <p:cNvPr id="49" name="TextBox 48"/>
+              <p:cNvSpPr txBox="1"/>
+              <p:nvPr/>
+            </p:nvSpPr>
+            <p:spPr>
+              <a:xfrm>
+                <a:off x="2346381" y="3296017"/>
+                <a:ext cx="272895" cy="276999"/>
+              </a:xfrm>
+              <a:prstGeom prst="rect">
+                <a:avLst/>
+              </a:prstGeom>
+              <a:noFill/>
+            </p:spPr>
+            <p:txBody>
+              <a:bodyPr wrap="none" rtlCol="0">
+                <a:spAutoFit/>
+              </a:bodyPr>
+              <a:lstStyle/>
+              <a:p>
+                <a:pPr/>
+                <a14:m>
+                  <m:oMathPara xmlns:m="http://schemas.openxmlformats.org/officeDocument/2006/math">
+                    <m:oMathParaPr>
+                      <m:jc m:val="centerGroup"/>
+                    </m:oMathParaPr>
+                    <m:oMath xmlns:m="http://schemas.openxmlformats.org/officeDocument/2006/math">
+                      <m:r>
+                        <a:rPr lang="en-IE" sz="1200" b="0" i="1" smtClean="0">
+                          <a:latin typeface="Cambria Math"/>
+                          <a:ea typeface="Cambria Math"/>
+                        </a:rPr>
+                        <m:t>𝑙</m:t>
+                      </m:r>
+                    </m:oMath>
+                  </m:oMathPara>
+                </a14:m>
+                <a:endParaRPr lang="fr-FR" sz="1200" dirty="0"/>
+              </a:p>
+            </p:txBody>
+          </p:sp>
+        </mc:Choice>
+        <mc:Fallback>
+          <p:sp>
+            <p:nvSpPr>
+              <p:cNvPr id="49" name="TextBox 48"/>
+              <p:cNvSpPr txBox="1">
+                <a:spLocks noRot="1" noChangeAspect="1" noMove="1" noResize="1" noEditPoints="1" noAdjustHandles="1" noChangeArrowheads="1" noChangeShapeType="1" noTextEdit="1"/>
+              </p:cNvSpPr>
+              <p:nvPr/>
+            </p:nvSpPr>
+            <p:spPr>
+              <a:xfrm>
+                <a:off x="2346381" y="3296017"/>
+                <a:ext cx="272895" cy="276999"/>
+              </a:xfrm>
+              <a:prstGeom prst="rect">
+                <a:avLst/>
+              </a:prstGeom>
+              <a:blipFill rotWithShape="1">
+                <a:blip r:embed="rId6"/>
+                <a:stretch>
+                  <a:fillRect/>
+                </a:stretch>
+              </a:blipFill>
+            </p:spPr>
+            <p:txBody>
+              <a:bodyPr/>
+              <a:lstStyle/>
+              <a:p>
+                <a:r>
+                  <a:rPr lang="fr-FR">
+                    <a:noFill/>
+                  </a:rPr>
+                  <a:t> </a:t>
+                </a:r>
+              </a:p>
+            </p:txBody>
+          </p:sp>
+        </mc:Fallback>
+      </mc:AlternateContent>
+    </p:spTree>
+    <p:extLst>
+      <p:ext uri="{BB962C8B-B14F-4D97-AF65-F5344CB8AC3E}">
+        <p14:creationId xmlns:p14="http://schemas.microsoft.com/office/powerpoint/2010/main" val="1783110769"/>
       </p:ext>
     </p:extLst>
   </p:cSld>

</xml_diff>